<commit_message>
Update toolchain schema proposal
</commit_message>
<xml_diff>
--- a/PositionPapers/CEA/2013_08_28_D7.1_Toolchain_schema_proposal/2013_08_28_Toolchain_proposal.pptx
+++ b/PositionPapers/CEA/2013_08_28_D7.1_Toolchain_schema_proposal/2013_08_28_Toolchain_proposal.pptx
@@ -6,6 +6,7 @@
   </p:sldMasterIdLst>
   <p:sldIdLst>
     <p:sldId id="259" r:id="rId2"/>
+    <p:sldId id="260" r:id="rId3"/>
   </p:sldIdLst>
   <p:sldSz cx="9144000" cy="6858000" type="screen4x3"/>
   <p:notesSz cx="6858000" cy="9144000"/>
@@ -288,7 +289,7 @@
           <a:p>
             <a:fld id="{AA309A6D-C09C-4548-B29A-6CF363A7E532}" type="datetimeFigureOut">
               <a:rPr lang="fr-FR" smtClean="0"/>
-              <a:t>30/08/2013</a:t>
+              <a:t>02/09/2013</a:t>
             </a:fld>
             <a:endParaRPr lang="fr-BE"/>
           </a:p>
@@ -453,7 +454,7 @@
           <a:p>
             <a:fld id="{AA309A6D-C09C-4548-B29A-6CF363A7E532}" type="datetimeFigureOut">
               <a:rPr lang="fr-FR" smtClean="0"/>
-              <a:t>30/08/2013</a:t>
+              <a:t>02/09/2013</a:t>
             </a:fld>
             <a:endParaRPr lang="fr-BE"/>
           </a:p>
@@ -628,7 +629,7 @@
           <a:p>
             <a:fld id="{AA309A6D-C09C-4548-B29A-6CF363A7E532}" type="datetimeFigureOut">
               <a:rPr lang="fr-FR" smtClean="0"/>
-              <a:t>30/08/2013</a:t>
+              <a:t>02/09/2013</a:t>
             </a:fld>
             <a:endParaRPr lang="fr-BE"/>
           </a:p>
@@ -793,7 +794,7 @@
           <a:p>
             <a:fld id="{AA309A6D-C09C-4548-B29A-6CF363A7E532}" type="datetimeFigureOut">
               <a:rPr lang="fr-FR" smtClean="0"/>
-              <a:t>30/08/2013</a:t>
+              <a:t>02/09/2013</a:t>
             </a:fld>
             <a:endParaRPr lang="fr-BE"/>
           </a:p>
@@ -1034,7 +1035,7 @@
           <a:p>
             <a:fld id="{AA309A6D-C09C-4548-B29A-6CF363A7E532}" type="datetimeFigureOut">
               <a:rPr lang="fr-FR" smtClean="0"/>
-              <a:t>30/08/2013</a:t>
+              <a:t>02/09/2013</a:t>
             </a:fld>
             <a:endParaRPr lang="fr-BE"/>
           </a:p>
@@ -1317,7 +1318,7 @@
           <a:p>
             <a:fld id="{AA309A6D-C09C-4548-B29A-6CF363A7E532}" type="datetimeFigureOut">
               <a:rPr lang="fr-FR" smtClean="0"/>
-              <a:t>30/08/2013</a:t>
+              <a:t>02/09/2013</a:t>
             </a:fld>
             <a:endParaRPr lang="fr-BE"/>
           </a:p>
@@ -1734,7 +1735,7 @@
           <a:p>
             <a:fld id="{AA309A6D-C09C-4548-B29A-6CF363A7E532}" type="datetimeFigureOut">
               <a:rPr lang="fr-FR" smtClean="0"/>
-              <a:t>30/08/2013</a:t>
+              <a:t>02/09/2013</a:t>
             </a:fld>
             <a:endParaRPr lang="fr-BE"/>
           </a:p>
@@ -1847,7 +1848,7 @@
           <a:p>
             <a:fld id="{AA309A6D-C09C-4548-B29A-6CF363A7E532}" type="datetimeFigureOut">
               <a:rPr lang="fr-FR" smtClean="0"/>
-              <a:t>30/08/2013</a:t>
+              <a:t>02/09/2013</a:t>
             </a:fld>
             <a:endParaRPr lang="fr-BE"/>
           </a:p>
@@ -1937,7 +1938,7 @@
           <a:p>
             <a:fld id="{AA309A6D-C09C-4548-B29A-6CF363A7E532}" type="datetimeFigureOut">
               <a:rPr lang="fr-FR" smtClean="0"/>
-              <a:t>30/08/2013</a:t>
+              <a:t>02/09/2013</a:t>
             </a:fld>
             <a:endParaRPr lang="fr-BE"/>
           </a:p>
@@ -2209,7 +2210,7 @@
           <a:p>
             <a:fld id="{AA309A6D-C09C-4548-B29A-6CF363A7E532}" type="datetimeFigureOut">
               <a:rPr lang="fr-FR" smtClean="0"/>
-              <a:t>30/08/2013</a:t>
+              <a:t>02/09/2013</a:t>
             </a:fld>
             <a:endParaRPr lang="fr-BE"/>
           </a:p>
@@ -2457,7 +2458,7 @@
           <a:p>
             <a:fld id="{AA309A6D-C09C-4548-B29A-6CF363A7E532}" type="datetimeFigureOut">
               <a:rPr lang="fr-FR" smtClean="0"/>
-              <a:t>30/08/2013</a:t>
+              <a:t>02/09/2013</a:t>
             </a:fld>
             <a:endParaRPr lang="fr-BE"/>
           </a:p>
@@ -2665,7 +2666,7 @@
           <a:p>
             <a:fld id="{AA309A6D-C09C-4548-B29A-6CF363A7E532}" type="datetimeFigureOut">
               <a:rPr lang="fr-FR" smtClean="0"/>
-              <a:t>30/08/2013</a:t>
+              <a:t>02/09/2013</a:t>
             </a:fld>
             <a:endParaRPr lang="fr-BE"/>
           </a:p>
@@ -4336,23 +4337,7 @@
                     <a:schemeClr val="tx1"/>
                   </a:solidFill>
                 </a:rPr>
-                <a:t>of OSS Code Spec</a:t>
-              </a:r>
-              <a:r>
-                <a:rPr lang="en-US" sz="1400" dirty="0" smtClean="0">
-                  <a:solidFill>
-                    <a:schemeClr val="tx1"/>
-                  </a:solidFill>
-                </a:rPr>
-                <a:t>. (</a:t>
-              </a:r>
-              <a:r>
-                <a:rPr lang="en-US" sz="1400" dirty="0" smtClean="0">
-                  <a:solidFill>
-                    <a:schemeClr val="tx1"/>
-                  </a:solidFill>
-                </a:rPr>
-                <a:t>B,EFS)</a:t>
+                <a:t>of OSS Code Spec. (B,EFS)</a:t>
               </a:r>
               <a:endParaRPr lang="en-US" sz="1400" dirty="0">
                 <a:solidFill>
@@ -4562,15 +4547,7 @@
                     <a:schemeClr val="tx1"/>
                   </a:solidFill>
                 </a:rPr>
-                <a:t>Code </a:t>
-              </a:r>
-              <a:r>
-                <a:rPr lang="fr-FR" sz="1400" dirty="0" smtClean="0">
-                  <a:solidFill>
-                    <a:schemeClr val="tx1"/>
-                  </a:solidFill>
-                </a:rPr>
-                <a:t>SIL4</a:t>
+                <a:t>Code SIL4</a:t>
               </a:r>
               <a:endParaRPr lang="fr-FR" sz="1400" dirty="0">
                 <a:solidFill>
@@ -4912,23 +4889,7 @@
                     <a:schemeClr val="tx1"/>
                   </a:solidFill>
                 </a:rPr>
-                <a:t> Code </a:t>
-              </a:r>
-              <a:r>
-                <a:rPr lang="en-US" sz="1400" dirty="0" smtClean="0">
-                  <a:solidFill>
-                    <a:schemeClr val="tx1"/>
-                  </a:solidFill>
-                </a:rPr>
-                <a:t>Spec</a:t>
-              </a:r>
-              <a:r>
-                <a:rPr lang="en-US" sz="1400" dirty="0" smtClean="0">
-                  <a:solidFill>
-                    <a:schemeClr val="tx1"/>
-                  </a:solidFill>
-                </a:rPr>
-                <a:t>.</a:t>
+                <a:t> Code Spec.</a:t>
               </a:r>
               <a:endParaRPr lang="en-US" sz="1400" dirty="0">
                 <a:solidFill>
@@ -5656,6 +5617,3725 @@
 </p:sld>
 </file>
 
+<file path=ppt/slides/slide2.xml><?xml version="1.0" encoding="utf-8"?>
+<p:sld xmlns:a="http://schemas.openxmlformats.org/drawingml/2006/main" xmlns:r="http://schemas.openxmlformats.org/officeDocument/2006/relationships" xmlns:p="http://schemas.openxmlformats.org/presentationml/2006/main">
+  <p:cSld>
+    <p:spTree>
+      <p:nvGrpSpPr>
+        <p:cNvPr id="1" name=""/>
+        <p:cNvGrpSpPr/>
+        <p:nvPr/>
+      </p:nvGrpSpPr>
+      <p:grpSpPr>
+        <a:xfrm>
+          <a:off x="0" y="0"/>
+          <a:ext cx="0" cy="0"/>
+          <a:chOff x="0" y="0"/>
+          <a:chExt cx="0" cy="0"/>
+        </a:xfrm>
+      </p:grpSpPr>
+      <p:sp>
+        <p:nvSpPr>
+          <p:cNvPr id="92" name="Flèche à angle droit 91"/>
+          <p:cNvSpPr/>
+          <p:nvPr/>
+        </p:nvSpPr>
+        <p:spPr>
+          <a:xfrm>
+            <a:off x="1115616" y="2276874"/>
+            <a:ext cx="4638979" cy="2247485"/>
+          </a:xfrm>
+          <a:prstGeom prst="bentUpArrow">
+            <a:avLst>
+              <a:gd name="adj1" fmla="val 6469"/>
+              <a:gd name="adj2" fmla="val 5775"/>
+              <a:gd name="adj3" fmla="val 6530"/>
+            </a:avLst>
+          </a:prstGeom>
+          <a:solidFill>
+            <a:schemeClr val="accent3">
+              <a:lumMod val="20000"/>
+              <a:lumOff val="80000"/>
+            </a:schemeClr>
+          </a:solidFill>
+          <a:ln>
+            <a:solidFill>
+              <a:schemeClr val="accent3">
+                <a:lumMod val="75000"/>
+              </a:schemeClr>
+            </a:solidFill>
+          </a:ln>
+        </p:spPr>
+        <p:style>
+          <a:lnRef idx="2">
+            <a:schemeClr val="accent1">
+              <a:shade val="50000"/>
+            </a:schemeClr>
+          </a:lnRef>
+          <a:fillRef idx="1">
+            <a:schemeClr val="accent1"/>
+          </a:fillRef>
+          <a:effectRef idx="0">
+            <a:schemeClr val="accent1"/>
+          </a:effectRef>
+          <a:fontRef idx="minor">
+            <a:schemeClr val="lt1"/>
+          </a:fontRef>
+        </p:style>
+        <p:txBody>
+          <a:bodyPr rtlCol="0" anchor="ctr"/>
+          <a:lstStyle/>
+          <a:p>
+            <a:pPr algn="ctr"/>
+            <a:endParaRPr lang="fr-FR" sz="1400" dirty="0"/>
+          </a:p>
+        </p:txBody>
+      </p:sp>
+      <p:sp>
+        <p:nvSpPr>
+          <p:cNvPr id="64" name="Flèche à angle droit 63"/>
+          <p:cNvSpPr/>
+          <p:nvPr/>
+        </p:nvSpPr>
+        <p:spPr>
+          <a:xfrm>
+            <a:off x="1115616" y="5631938"/>
+            <a:ext cx="7092788" cy="605374"/>
+          </a:xfrm>
+          <a:prstGeom prst="bentUpArrow">
+            <a:avLst>
+              <a:gd name="adj1" fmla="val 15836"/>
+              <a:gd name="adj2" fmla="val 16345"/>
+              <a:gd name="adj3" fmla="val 19909"/>
+            </a:avLst>
+          </a:prstGeom>
+          <a:solidFill>
+            <a:schemeClr val="accent4">
+              <a:lumMod val="20000"/>
+              <a:lumOff val="80000"/>
+            </a:schemeClr>
+          </a:solidFill>
+          <a:ln>
+            <a:solidFill>
+              <a:schemeClr val="accent4">
+                <a:lumMod val="75000"/>
+              </a:schemeClr>
+            </a:solidFill>
+          </a:ln>
+        </p:spPr>
+        <p:style>
+          <a:lnRef idx="2">
+            <a:schemeClr val="accent1">
+              <a:shade val="50000"/>
+            </a:schemeClr>
+          </a:lnRef>
+          <a:fillRef idx="1">
+            <a:schemeClr val="accent1"/>
+          </a:fillRef>
+          <a:effectRef idx="0">
+            <a:schemeClr val="accent1"/>
+          </a:effectRef>
+          <a:fontRef idx="minor">
+            <a:schemeClr val="lt1"/>
+          </a:fontRef>
+        </p:style>
+        <p:txBody>
+          <a:bodyPr rtlCol="0" anchor="ctr"/>
+          <a:lstStyle/>
+          <a:p>
+            <a:pPr algn="ctr"/>
+            <a:endParaRPr lang="fr-FR" sz="1400"/>
+          </a:p>
+        </p:txBody>
+      </p:sp>
+      <p:sp>
+        <p:nvSpPr>
+          <p:cNvPr id="5" name="Cylindre 4"/>
+          <p:cNvSpPr/>
+          <p:nvPr/>
+        </p:nvSpPr>
+        <p:spPr>
+          <a:xfrm>
+            <a:off x="1772182" y="1378645"/>
+            <a:ext cx="5104074" cy="898227"/>
+          </a:xfrm>
+          <a:prstGeom prst="can">
+            <a:avLst>
+              <a:gd name="adj" fmla="val 17342"/>
+            </a:avLst>
+          </a:prstGeom>
+          <a:solidFill>
+            <a:schemeClr val="bg1"/>
+          </a:solidFill>
+          <a:ln>
+            <a:solidFill>
+              <a:schemeClr val="accent6">
+                <a:lumMod val="75000"/>
+              </a:schemeClr>
+            </a:solidFill>
+          </a:ln>
+        </p:spPr>
+        <p:style>
+          <a:lnRef idx="2">
+            <a:schemeClr val="accent1">
+              <a:shade val="50000"/>
+            </a:schemeClr>
+          </a:lnRef>
+          <a:fillRef idx="1">
+            <a:schemeClr val="accent1"/>
+          </a:fillRef>
+          <a:effectRef idx="0">
+            <a:schemeClr val="accent1"/>
+          </a:effectRef>
+          <a:fontRef idx="minor">
+            <a:schemeClr val="lt1"/>
+          </a:fontRef>
+        </p:style>
+        <p:txBody>
+          <a:bodyPr rtlCol="0" anchor="ctr"/>
+          <a:lstStyle/>
+          <a:p>
+            <a:pPr algn="ctr"/>
+            <a:r>
+              <a:rPr lang="en-US" sz="1100" dirty="0" smtClean="0">
+                <a:solidFill>
+                  <a:schemeClr val="tx1"/>
+                </a:solidFill>
+              </a:rPr>
+              <a:t>SysML Semi-formal Model</a:t>
+            </a:r>
+          </a:p>
+          <a:p>
+            <a:pPr algn="ctr"/>
+            <a:r>
+              <a:rPr lang="en-US" sz="1100" dirty="0" smtClean="0">
+                <a:solidFill>
+                  <a:schemeClr val="tx1"/>
+                </a:solidFill>
+              </a:rPr>
+              <a:t>(Papyrus)</a:t>
+            </a:r>
+          </a:p>
+          <a:p>
+            <a:pPr algn="ctr"/>
+            <a:r>
+              <a:rPr lang="en-US" sz="1100" dirty="0" smtClean="0">
+                <a:solidFill>
+                  <a:schemeClr val="tx1"/>
+                </a:solidFill>
+              </a:rPr>
+              <a:t>Architecture (functional and organic), SSRS (OBU and Wayside at high-level)</a:t>
+            </a:r>
+          </a:p>
+        </p:txBody>
+      </p:sp>
+      <p:sp>
+        <p:nvSpPr>
+          <p:cNvPr id="6" name="Ellipse 5"/>
+          <p:cNvSpPr/>
+          <p:nvPr/>
+        </p:nvSpPr>
+        <p:spPr>
+          <a:xfrm>
+            <a:off x="3529639" y="332656"/>
+            <a:ext cx="1693531" cy="544349"/>
+          </a:xfrm>
+          <a:prstGeom prst="ellipse">
+            <a:avLst/>
+          </a:prstGeom>
+          <a:solidFill>
+            <a:schemeClr val="bg1"/>
+          </a:solidFill>
+          <a:ln>
+            <a:solidFill>
+              <a:schemeClr val="accent6">
+                <a:lumMod val="75000"/>
+              </a:schemeClr>
+            </a:solidFill>
+          </a:ln>
+        </p:spPr>
+        <p:style>
+          <a:lnRef idx="2">
+            <a:schemeClr val="accent1">
+              <a:shade val="50000"/>
+            </a:schemeClr>
+          </a:lnRef>
+          <a:fillRef idx="1">
+            <a:schemeClr val="accent1"/>
+          </a:fillRef>
+          <a:effectRef idx="0">
+            <a:schemeClr val="accent1"/>
+          </a:effectRef>
+          <a:fontRef idx="minor">
+            <a:schemeClr val="lt1"/>
+          </a:fontRef>
+        </p:style>
+        <p:txBody>
+          <a:bodyPr rtlCol="0" anchor="ctr"/>
+          <a:lstStyle/>
+          <a:p>
+            <a:pPr algn="ctr"/>
+            <a:r>
+              <a:rPr lang="en-US" sz="1100" dirty="0" smtClean="0">
+                <a:solidFill>
+                  <a:schemeClr val="tx1"/>
+                </a:solidFill>
+              </a:rPr>
+              <a:t>System Analysis on prose</a:t>
+            </a:r>
+            <a:endParaRPr lang="en-US" sz="1100" dirty="0">
+              <a:solidFill>
+                <a:schemeClr val="tx1"/>
+              </a:solidFill>
+            </a:endParaRPr>
+          </a:p>
+        </p:txBody>
+      </p:sp>
+      <p:sp>
+        <p:nvSpPr>
+          <p:cNvPr id="21" name="ZoneTexte 20"/>
+          <p:cNvSpPr txBox="1"/>
+          <p:nvPr/>
+        </p:nvSpPr>
+        <p:spPr>
+          <a:xfrm>
+            <a:off x="-36512" y="6298210"/>
+            <a:ext cx="1756554" cy="523220"/>
+          </a:xfrm>
+          <a:prstGeom prst="rect">
+            <a:avLst/>
+          </a:prstGeom>
+          <a:noFill/>
+        </p:spPr>
+        <p:txBody>
+          <a:bodyPr wrap="square" rtlCol="0">
+            <a:spAutoFit/>
+          </a:bodyPr>
+          <a:lstStyle/>
+          <a:p>
+            <a:pPr algn="ctr"/>
+            <a:r>
+              <a:rPr lang="en-US" sz="1400" dirty="0" smtClean="0"/>
+              <a:t>WP7 </a:t>
+            </a:r>
+            <a:r>
+              <a:rPr lang="en-US" sz="1400" dirty="0" smtClean="0"/>
+              <a:t>OSS tools </a:t>
+            </a:r>
+          </a:p>
+          <a:p>
+            <a:pPr algn="ctr"/>
+            <a:r>
+              <a:rPr lang="en-US" sz="1400" dirty="0" smtClean="0"/>
+              <a:t>chain </a:t>
+            </a:r>
+            <a:r>
+              <a:rPr lang="en-US" sz="1400" dirty="0" smtClean="0"/>
+              <a:t>Development</a:t>
+            </a:r>
+            <a:endParaRPr lang="en-US" sz="1400" dirty="0"/>
+          </a:p>
+        </p:txBody>
+      </p:sp>
+      <p:sp>
+        <p:nvSpPr>
+          <p:cNvPr id="22" name="ZoneTexte 21"/>
+          <p:cNvSpPr txBox="1"/>
+          <p:nvPr/>
+        </p:nvSpPr>
+        <p:spPr>
+          <a:xfrm>
+            <a:off x="1755225" y="6298210"/>
+            <a:ext cx="1425743" cy="523220"/>
+          </a:xfrm>
+          <a:prstGeom prst="rect">
+            <a:avLst/>
+          </a:prstGeom>
+          <a:noFill/>
+        </p:spPr>
+        <p:txBody>
+          <a:bodyPr wrap="square" rtlCol="0">
+            <a:spAutoFit/>
+          </a:bodyPr>
+          <a:lstStyle/>
+          <a:p>
+            <a:pPr algn="ctr"/>
+            <a:r>
+              <a:rPr lang="en-US" sz="1400" dirty="0" smtClean="0"/>
+              <a:t>WP3 </a:t>
+            </a:r>
+            <a:r>
+              <a:rPr lang="en-US" sz="1400" dirty="0" smtClean="0"/>
+              <a:t>SCADE</a:t>
+            </a:r>
+            <a:r>
+              <a:rPr lang="en-US" sz="1400" dirty="0"/>
+              <a:t> </a:t>
+            </a:r>
+            <a:r>
+              <a:rPr lang="en-US" sz="1400" dirty="0" smtClean="0"/>
+              <a:t>based Modeling</a:t>
+            </a:r>
+          </a:p>
+        </p:txBody>
+      </p:sp>
+      <p:sp>
+        <p:nvSpPr>
+          <p:cNvPr id="23" name="ZoneTexte 22"/>
+          <p:cNvSpPr txBox="1"/>
+          <p:nvPr/>
+        </p:nvSpPr>
+        <p:spPr>
+          <a:xfrm>
+            <a:off x="5661717" y="6405932"/>
+            <a:ext cx="1043194" cy="307777"/>
+          </a:xfrm>
+          <a:prstGeom prst="rect">
+            <a:avLst/>
+          </a:prstGeom>
+          <a:noFill/>
+        </p:spPr>
+        <p:txBody>
+          <a:bodyPr wrap="square" rtlCol="0">
+            <a:spAutoFit/>
+          </a:bodyPr>
+          <a:lstStyle/>
+          <a:p>
+            <a:pPr algn="ctr"/>
+            <a:r>
+              <a:rPr lang="en-US" sz="1400" dirty="0" smtClean="0"/>
+              <a:t>WP4 (V&amp;V)</a:t>
+            </a:r>
+            <a:endParaRPr lang="en-US" sz="1400" dirty="0"/>
+          </a:p>
+        </p:txBody>
+      </p:sp>
+      <p:sp>
+        <p:nvSpPr>
+          <p:cNvPr id="24" name="ZoneTexte 23"/>
+          <p:cNvSpPr txBox="1"/>
+          <p:nvPr/>
+        </p:nvSpPr>
+        <p:spPr>
+          <a:xfrm>
+            <a:off x="7452321" y="6405932"/>
+            <a:ext cx="1512167" cy="307777"/>
+          </a:xfrm>
+          <a:prstGeom prst="rect">
+            <a:avLst/>
+          </a:prstGeom>
+          <a:noFill/>
+        </p:spPr>
+        <p:txBody>
+          <a:bodyPr wrap="square" rtlCol="0">
+            <a:spAutoFit/>
+          </a:bodyPr>
+          <a:lstStyle/>
+          <a:p>
+            <a:pPr algn="ctr"/>
+            <a:r>
+              <a:rPr lang="en-US" sz="1400" dirty="0" smtClean="0"/>
+              <a:t>WP5 (Simulation)</a:t>
+            </a:r>
+            <a:endParaRPr lang="en-US" sz="1400" dirty="0"/>
+          </a:p>
+        </p:txBody>
+      </p:sp>
+      <p:sp>
+        <p:nvSpPr>
+          <p:cNvPr id="25" name="Double flèche horizontale 24"/>
+          <p:cNvSpPr/>
+          <p:nvPr/>
+        </p:nvSpPr>
+        <p:spPr>
+          <a:xfrm>
+            <a:off x="2088553" y="476673"/>
+            <a:ext cx="1303173" cy="302416"/>
+          </a:xfrm>
+          <a:prstGeom prst="leftRightArrow">
+            <a:avLst/>
+          </a:prstGeom>
+          <a:solidFill>
+            <a:schemeClr val="accent6">
+              <a:lumMod val="20000"/>
+              <a:lumOff val="80000"/>
+            </a:schemeClr>
+          </a:solidFill>
+          <a:ln>
+            <a:solidFill>
+              <a:schemeClr val="accent6">
+                <a:lumMod val="75000"/>
+              </a:schemeClr>
+            </a:solidFill>
+          </a:ln>
+        </p:spPr>
+        <p:style>
+          <a:lnRef idx="2">
+            <a:schemeClr val="accent1">
+              <a:shade val="50000"/>
+            </a:schemeClr>
+          </a:lnRef>
+          <a:fillRef idx="1">
+            <a:schemeClr val="accent1"/>
+          </a:fillRef>
+          <a:effectRef idx="0">
+            <a:schemeClr val="accent1"/>
+          </a:effectRef>
+          <a:fontRef idx="minor">
+            <a:schemeClr val="lt1"/>
+          </a:fontRef>
+        </p:style>
+        <p:txBody>
+          <a:bodyPr rtlCol="0" anchor="ctr"/>
+          <a:lstStyle/>
+          <a:p>
+            <a:pPr algn="ctr"/>
+            <a:endParaRPr lang="fr-FR" sz="1400"/>
+          </a:p>
+        </p:txBody>
+      </p:sp>
+      <p:sp>
+        <p:nvSpPr>
+          <p:cNvPr id="26" name="Double flèche horizontale 25"/>
+          <p:cNvSpPr/>
+          <p:nvPr/>
+        </p:nvSpPr>
+        <p:spPr>
+          <a:xfrm rot="5400000">
+            <a:off x="4176339" y="1003540"/>
+            <a:ext cx="373659" cy="302416"/>
+          </a:xfrm>
+          <a:prstGeom prst="leftRightArrow">
+            <a:avLst/>
+          </a:prstGeom>
+          <a:solidFill>
+            <a:schemeClr val="accent6">
+              <a:lumMod val="20000"/>
+              <a:lumOff val="80000"/>
+            </a:schemeClr>
+          </a:solidFill>
+          <a:ln>
+            <a:solidFill>
+              <a:schemeClr val="accent6">
+                <a:lumMod val="75000"/>
+              </a:schemeClr>
+            </a:solidFill>
+          </a:ln>
+        </p:spPr>
+        <p:style>
+          <a:lnRef idx="2">
+            <a:schemeClr val="accent1">
+              <a:shade val="50000"/>
+            </a:schemeClr>
+          </a:lnRef>
+          <a:fillRef idx="1">
+            <a:schemeClr val="accent1"/>
+          </a:fillRef>
+          <a:effectRef idx="0">
+            <a:schemeClr val="accent1"/>
+          </a:effectRef>
+          <a:fontRef idx="minor">
+            <a:schemeClr val="lt1"/>
+          </a:fontRef>
+        </p:style>
+        <p:txBody>
+          <a:bodyPr rtlCol="0" anchor="ctr"/>
+          <a:lstStyle/>
+          <a:p>
+            <a:pPr algn="ctr"/>
+            <a:endParaRPr lang="fr-FR" sz="1400"/>
+          </a:p>
+        </p:txBody>
+      </p:sp>
+      <p:sp>
+        <p:nvSpPr>
+          <p:cNvPr id="27" name="Flèche droite 26"/>
+          <p:cNvSpPr/>
+          <p:nvPr/>
+        </p:nvSpPr>
+        <p:spPr>
+          <a:xfrm rot="2598561">
+            <a:off x="1897130" y="1009884"/>
+            <a:ext cx="506425" cy="299697"/>
+          </a:xfrm>
+          <a:prstGeom prst="rightArrow">
+            <a:avLst/>
+          </a:prstGeom>
+          <a:solidFill>
+            <a:schemeClr val="accent6">
+              <a:lumMod val="20000"/>
+              <a:lumOff val="80000"/>
+            </a:schemeClr>
+          </a:solidFill>
+          <a:ln>
+            <a:solidFill>
+              <a:schemeClr val="accent6">
+                <a:lumMod val="75000"/>
+              </a:schemeClr>
+            </a:solidFill>
+          </a:ln>
+        </p:spPr>
+        <p:style>
+          <a:lnRef idx="2">
+            <a:schemeClr val="accent1">
+              <a:shade val="50000"/>
+            </a:schemeClr>
+          </a:lnRef>
+          <a:fillRef idx="1">
+            <a:schemeClr val="accent1"/>
+          </a:fillRef>
+          <a:effectRef idx="0">
+            <a:schemeClr val="accent1"/>
+          </a:effectRef>
+          <a:fontRef idx="minor">
+            <a:schemeClr val="lt1"/>
+          </a:fontRef>
+        </p:style>
+        <p:txBody>
+          <a:bodyPr rtlCol="0" anchor="ctr"/>
+          <a:lstStyle/>
+          <a:p>
+            <a:pPr algn="ctr"/>
+            <a:endParaRPr lang="fr-FR" sz="1400"/>
+          </a:p>
+        </p:txBody>
+      </p:sp>
+      <p:sp>
+        <p:nvSpPr>
+          <p:cNvPr id="28" name="Double flèche horizontale 27"/>
+          <p:cNvSpPr/>
+          <p:nvPr/>
+        </p:nvSpPr>
+        <p:spPr>
+          <a:xfrm rot="8955836">
+            <a:off x="686812" y="2378655"/>
+            <a:ext cx="1044243" cy="299697"/>
+          </a:xfrm>
+          <a:prstGeom prst="leftRightArrow">
+            <a:avLst/>
+          </a:prstGeom>
+          <a:solidFill>
+            <a:schemeClr val="tx2">
+              <a:lumMod val="20000"/>
+              <a:lumOff val="80000"/>
+            </a:schemeClr>
+          </a:solidFill>
+          <a:ln>
+            <a:solidFill>
+              <a:schemeClr val="tx2"/>
+            </a:solidFill>
+          </a:ln>
+        </p:spPr>
+        <p:style>
+          <a:lnRef idx="2">
+            <a:schemeClr val="accent1">
+              <a:shade val="50000"/>
+            </a:schemeClr>
+          </a:lnRef>
+          <a:fillRef idx="1">
+            <a:schemeClr val="accent1"/>
+          </a:fillRef>
+          <a:effectRef idx="0">
+            <a:schemeClr val="accent1"/>
+          </a:effectRef>
+          <a:fontRef idx="minor">
+            <a:schemeClr val="lt1"/>
+          </a:fontRef>
+        </p:style>
+        <p:txBody>
+          <a:bodyPr rtlCol="0" anchor="ctr"/>
+          <a:lstStyle/>
+          <a:p>
+            <a:pPr algn="ctr"/>
+            <a:endParaRPr lang="fr-FR" sz="1400"/>
+          </a:p>
+        </p:txBody>
+      </p:sp>
+      <p:sp>
+        <p:nvSpPr>
+          <p:cNvPr id="29" name="Double flèche horizontale 28"/>
+          <p:cNvSpPr/>
+          <p:nvPr/>
+        </p:nvSpPr>
+        <p:spPr>
+          <a:xfrm rot="5400000">
+            <a:off x="2288189" y="2578142"/>
+            <a:ext cx="690855" cy="299697"/>
+          </a:xfrm>
+          <a:prstGeom prst="leftRightArrow">
+            <a:avLst/>
+          </a:prstGeom>
+          <a:solidFill>
+            <a:schemeClr val="tx2">
+              <a:lumMod val="20000"/>
+              <a:lumOff val="80000"/>
+            </a:schemeClr>
+          </a:solidFill>
+          <a:ln>
+            <a:solidFill>
+              <a:schemeClr val="tx2"/>
+            </a:solidFill>
+          </a:ln>
+        </p:spPr>
+        <p:style>
+          <a:lnRef idx="2">
+            <a:schemeClr val="accent1">
+              <a:shade val="50000"/>
+            </a:schemeClr>
+          </a:lnRef>
+          <a:fillRef idx="1">
+            <a:schemeClr val="accent1"/>
+          </a:fillRef>
+          <a:effectRef idx="0">
+            <a:schemeClr val="accent1"/>
+          </a:effectRef>
+          <a:fontRef idx="minor">
+            <a:schemeClr val="lt1"/>
+          </a:fontRef>
+        </p:style>
+        <p:txBody>
+          <a:bodyPr rtlCol="0" anchor="ctr"/>
+          <a:lstStyle/>
+          <a:p>
+            <a:pPr algn="ctr"/>
+            <a:endParaRPr lang="fr-FR" sz="1400"/>
+          </a:p>
+        </p:txBody>
+      </p:sp>
+      <p:sp>
+        <p:nvSpPr>
+          <p:cNvPr id="30" name="Rectangle à coins arrondis 29"/>
+          <p:cNvSpPr/>
+          <p:nvPr/>
+        </p:nvSpPr>
+        <p:spPr>
+          <a:xfrm>
+            <a:off x="6061020" y="2866852"/>
+            <a:ext cx="1118508" cy="533102"/>
+          </a:xfrm>
+          <a:prstGeom prst="roundRect">
+            <a:avLst/>
+          </a:prstGeom>
+          <a:solidFill>
+            <a:schemeClr val="bg1"/>
+          </a:solidFill>
+          <a:ln>
+            <a:solidFill>
+              <a:schemeClr val="accent3">
+                <a:lumMod val="75000"/>
+              </a:schemeClr>
+            </a:solidFill>
+          </a:ln>
+        </p:spPr>
+        <p:style>
+          <a:lnRef idx="2">
+            <a:schemeClr val="accent1">
+              <a:shade val="50000"/>
+            </a:schemeClr>
+          </a:lnRef>
+          <a:fillRef idx="1">
+            <a:schemeClr val="accent1"/>
+          </a:fillRef>
+          <a:effectRef idx="0">
+            <a:schemeClr val="accent1"/>
+          </a:effectRef>
+          <a:fontRef idx="minor">
+            <a:schemeClr val="lt1"/>
+          </a:fontRef>
+        </p:style>
+        <p:txBody>
+          <a:bodyPr rtlCol="0" anchor="ctr"/>
+          <a:lstStyle/>
+          <a:p>
+            <a:pPr algn="ctr"/>
+            <a:r>
+              <a:rPr lang="en-US" sz="1100" dirty="0" smtClean="0">
+                <a:solidFill>
+                  <a:schemeClr val="tx1"/>
+                </a:solidFill>
+              </a:rPr>
+              <a:t>Safety</a:t>
+            </a:r>
+            <a:endParaRPr lang="en-US" sz="1100" dirty="0">
+              <a:solidFill>
+                <a:schemeClr val="tx1"/>
+              </a:solidFill>
+            </a:endParaRPr>
+          </a:p>
+        </p:txBody>
+      </p:sp>
+      <p:sp>
+        <p:nvSpPr>
+          <p:cNvPr id="31" name="Rectangle à coins arrondis 30"/>
+          <p:cNvSpPr/>
+          <p:nvPr/>
+        </p:nvSpPr>
+        <p:spPr>
+          <a:xfrm>
+            <a:off x="6061020" y="3478922"/>
+            <a:ext cx="1140187" cy="733122"/>
+          </a:xfrm>
+          <a:prstGeom prst="roundRect">
+            <a:avLst/>
+          </a:prstGeom>
+          <a:solidFill>
+            <a:schemeClr val="bg1"/>
+          </a:solidFill>
+          <a:ln>
+            <a:solidFill>
+              <a:schemeClr val="accent3">
+                <a:lumMod val="75000"/>
+              </a:schemeClr>
+            </a:solidFill>
+          </a:ln>
+        </p:spPr>
+        <p:style>
+          <a:lnRef idx="2">
+            <a:schemeClr val="accent1">
+              <a:shade val="50000"/>
+            </a:schemeClr>
+          </a:lnRef>
+          <a:fillRef idx="1">
+            <a:schemeClr val="accent1"/>
+          </a:fillRef>
+          <a:effectRef idx="0">
+            <a:schemeClr val="accent1"/>
+          </a:effectRef>
+          <a:fontRef idx="minor">
+            <a:schemeClr val="lt1"/>
+          </a:fontRef>
+        </p:style>
+        <p:txBody>
+          <a:bodyPr rtlCol="0" anchor="ctr"/>
+          <a:lstStyle/>
+          <a:p>
+            <a:pPr algn="ctr"/>
+            <a:r>
+              <a:rPr lang="en-US" sz="1100" dirty="0" smtClean="0">
+                <a:solidFill>
+                  <a:schemeClr val="tx1"/>
+                </a:solidFill>
+              </a:rPr>
+              <a:t>Validation </a:t>
+            </a:r>
+          </a:p>
+          <a:p>
+            <a:pPr algn="ctr"/>
+            <a:r>
+              <a:rPr lang="en-US" sz="1100" dirty="0" smtClean="0">
+                <a:solidFill>
+                  <a:schemeClr val="tx1"/>
+                </a:solidFill>
+              </a:rPr>
+              <a:t>(EFS, </a:t>
+            </a:r>
+            <a:r>
+              <a:rPr lang="en-US" sz="1100" dirty="0" err="1" smtClean="0">
+                <a:solidFill>
+                  <a:schemeClr val="tx1"/>
+                </a:solidFill>
+              </a:rPr>
+              <a:t>FramaC</a:t>
+            </a:r>
+            <a:r>
+              <a:rPr lang="en-US" sz="1100" dirty="0" smtClean="0">
+                <a:solidFill>
+                  <a:schemeClr val="tx1"/>
+                </a:solidFill>
+              </a:rPr>
+              <a:t>, </a:t>
+            </a:r>
+            <a:r>
+              <a:rPr lang="en-US" sz="1100" dirty="0" err="1" smtClean="0">
+                <a:solidFill>
+                  <a:schemeClr val="tx1"/>
+                </a:solidFill>
+              </a:rPr>
+              <a:t>SystemC</a:t>
+            </a:r>
+            <a:r>
+              <a:rPr lang="en-US" sz="1100" dirty="0" smtClean="0">
+                <a:solidFill>
+                  <a:schemeClr val="tx1"/>
+                </a:solidFill>
+              </a:rPr>
+              <a:t>, RT-Tester…)</a:t>
+            </a:r>
+            <a:endParaRPr lang="en-US" sz="1100" dirty="0">
+              <a:solidFill>
+                <a:schemeClr val="tx1"/>
+              </a:solidFill>
+            </a:endParaRPr>
+          </a:p>
+        </p:txBody>
+      </p:sp>
+      <p:sp>
+        <p:nvSpPr>
+          <p:cNvPr id="32" name="Rectangle à coins arrondis 31"/>
+          <p:cNvSpPr/>
+          <p:nvPr/>
+        </p:nvSpPr>
+        <p:spPr>
+          <a:xfrm>
+            <a:off x="6061020" y="4287511"/>
+            <a:ext cx="1140186" cy="869681"/>
+          </a:xfrm>
+          <a:prstGeom prst="roundRect">
+            <a:avLst/>
+          </a:prstGeom>
+          <a:solidFill>
+            <a:schemeClr val="bg1"/>
+          </a:solidFill>
+          <a:ln>
+            <a:solidFill>
+              <a:schemeClr val="accent3">
+                <a:lumMod val="75000"/>
+              </a:schemeClr>
+            </a:solidFill>
+          </a:ln>
+        </p:spPr>
+        <p:style>
+          <a:lnRef idx="2">
+            <a:schemeClr val="accent1">
+              <a:shade val="50000"/>
+            </a:schemeClr>
+          </a:lnRef>
+          <a:fillRef idx="1">
+            <a:schemeClr val="accent1"/>
+          </a:fillRef>
+          <a:effectRef idx="0">
+            <a:schemeClr val="accent1"/>
+          </a:effectRef>
+          <a:fontRef idx="minor">
+            <a:schemeClr val="lt1"/>
+          </a:fontRef>
+        </p:style>
+        <p:txBody>
+          <a:bodyPr rtlCol="0" anchor="ctr"/>
+          <a:lstStyle/>
+          <a:p>
+            <a:pPr algn="ctr"/>
+            <a:r>
+              <a:rPr lang="en-US" sz="1100" dirty="0" smtClean="0">
+                <a:solidFill>
+                  <a:schemeClr val="tx1"/>
+                </a:solidFill>
+              </a:rPr>
+              <a:t>Verification</a:t>
+            </a:r>
+          </a:p>
+          <a:p>
+            <a:pPr algn="ctr"/>
+            <a:r>
+              <a:rPr lang="en-US" sz="1100" dirty="0" smtClean="0">
+                <a:solidFill>
+                  <a:schemeClr val="tx1"/>
+                </a:solidFill>
+              </a:rPr>
+              <a:t>(</a:t>
+            </a:r>
+            <a:r>
+              <a:rPr lang="en-US" sz="1100" dirty="0" err="1" smtClean="0">
+                <a:solidFill>
+                  <a:schemeClr val="tx1"/>
+                </a:solidFill>
+              </a:rPr>
+              <a:t>FramaC</a:t>
+            </a:r>
+            <a:r>
+              <a:rPr lang="en-US" sz="1100" dirty="0">
+                <a:solidFill>
+                  <a:schemeClr val="tx1"/>
+                </a:solidFill>
+              </a:rPr>
+              <a:t>, </a:t>
+            </a:r>
+            <a:r>
+              <a:rPr lang="en-US" sz="1100" dirty="0" err="1">
+                <a:solidFill>
+                  <a:schemeClr val="tx1"/>
+                </a:solidFill>
+              </a:rPr>
+              <a:t>SystemC</a:t>
+            </a:r>
+            <a:r>
+              <a:rPr lang="en-US" sz="1100" dirty="0">
+                <a:solidFill>
+                  <a:schemeClr val="tx1"/>
+                </a:solidFill>
+              </a:rPr>
+              <a:t>, RT-Tester</a:t>
+            </a:r>
+            <a:r>
+              <a:rPr lang="en-US" sz="1100" dirty="0" smtClean="0">
+                <a:solidFill>
+                  <a:schemeClr val="tx1"/>
+                </a:solidFill>
+              </a:rPr>
+              <a:t>…)</a:t>
+            </a:r>
+            <a:endParaRPr lang="en-US" sz="1100" dirty="0">
+              <a:solidFill>
+                <a:schemeClr val="tx1"/>
+              </a:solidFill>
+            </a:endParaRPr>
+          </a:p>
+        </p:txBody>
+      </p:sp>
+      <p:sp>
+        <p:nvSpPr>
+          <p:cNvPr id="33" name="Rectangle à coins arrondis 32"/>
+          <p:cNvSpPr/>
+          <p:nvPr/>
+        </p:nvSpPr>
+        <p:spPr>
+          <a:xfrm>
+            <a:off x="6061020" y="5229200"/>
+            <a:ext cx="1140186" cy="533102"/>
+          </a:xfrm>
+          <a:prstGeom prst="roundRect">
+            <a:avLst/>
+          </a:prstGeom>
+          <a:solidFill>
+            <a:schemeClr val="bg1"/>
+          </a:solidFill>
+          <a:ln>
+            <a:solidFill>
+              <a:schemeClr val="accent3">
+                <a:lumMod val="75000"/>
+              </a:schemeClr>
+            </a:solidFill>
+          </a:ln>
+        </p:spPr>
+        <p:style>
+          <a:lnRef idx="2">
+            <a:schemeClr val="accent1">
+              <a:shade val="50000"/>
+            </a:schemeClr>
+          </a:lnRef>
+          <a:fillRef idx="1">
+            <a:schemeClr val="accent1"/>
+          </a:fillRef>
+          <a:effectRef idx="0">
+            <a:schemeClr val="accent1"/>
+          </a:effectRef>
+          <a:fontRef idx="minor">
+            <a:schemeClr val="lt1"/>
+          </a:fontRef>
+        </p:style>
+        <p:txBody>
+          <a:bodyPr rtlCol="0" anchor="ctr"/>
+          <a:lstStyle/>
+          <a:p>
+            <a:pPr algn="ctr"/>
+            <a:r>
+              <a:rPr lang="en-US" sz="1100" dirty="0" smtClean="0">
+                <a:solidFill>
+                  <a:schemeClr val="tx1"/>
+                </a:solidFill>
+              </a:rPr>
+              <a:t>Internal</a:t>
+            </a:r>
+            <a:br>
+              <a:rPr lang="en-US" sz="1100" dirty="0" smtClean="0">
+                <a:solidFill>
+                  <a:schemeClr val="tx1"/>
+                </a:solidFill>
+              </a:rPr>
+            </a:br>
+            <a:r>
+              <a:rPr lang="en-US" sz="1100" dirty="0" smtClean="0">
+                <a:solidFill>
+                  <a:schemeClr val="tx1"/>
+                </a:solidFill>
+              </a:rPr>
+              <a:t>Assessment</a:t>
+            </a:r>
+            <a:endParaRPr lang="en-US" sz="1100" dirty="0">
+              <a:solidFill>
+                <a:schemeClr val="tx1"/>
+              </a:solidFill>
+            </a:endParaRPr>
+          </a:p>
+        </p:txBody>
+      </p:sp>
+      <p:sp>
+        <p:nvSpPr>
+          <p:cNvPr id="38" name="Rectangle à coins arrondis 37"/>
+          <p:cNvSpPr/>
+          <p:nvPr/>
+        </p:nvSpPr>
+        <p:spPr>
+          <a:xfrm>
+            <a:off x="7524328" y="3284984"/>
+            <a:ext cx="1209665" cy="2330828"/>
+          </a:xfrm>
+          <a:prstGeom prst="roundRect">
+            <a:avLst/>
+          </a:prstGeom>
+          <a:solidFill>
+            <a:schemeClr val="bg1"/>
+          </a:solidFill>
+          <a:ln>
+            <a:solidFill>
+              <a:schemeClr val="accent4"/>
+            </a:solidFill>
+          </a:ln>
+        </p:spPr>
+        <p:style>
+          <a:lnRef idx="2">
+            <a:schemeClr val="accent1">
+              <a:shade val="50000"/>
+            </a:schemeClr>
+          </a:lnRef>
+          <a:fillRef idx="1">
+            <a:schemeClr val="accent1"/>
+          </a:fillRef>
+          <a:effectRef idx="0">
+            <a:schemeClr val="accent1"/>
+          </a:effectRef>
+          <a:fontRef idx="minor">
+            <a:schemeClr val="lt1"/>
+          </a:fontRef>
+        </p:style>
+        <p:txBody>
+          <a:bodyPr rtlCol="0" anchor="ctr"/>
+          <a:lstStyle/>
+          <a:p>
+            <a:pPr algn="ctr"/>
+            <a:r>
+              <a:rPr lang="en-US" sz="1100" dirty="0" smtClean="0">
+                <a:solidFill>
+                  <a:schemeClr val="tx1"/>
+                </a:solidFill>
+              </a:rPr>
+              <a:t>Demonstrator</a:t>
+            </a:r>
+            <a:endParaRPr lang="en-US" sz="1100" dirty="0">
+              <a:solidFill>
+                <a:schemeClr val="tx1"/>
+              </a:solidFill>
+            </a:endParaRPr>
+          </a:p>
+        </p:txBody>
+      </p:sp>
+      <p:sp>
+        <p:nvSpPr>
+          <p:cNvPr id="61" name="Flèche droite 60"/>
+          <p:cNvSpPr/>
+          <p:nvPr/>
+        </p:nvSpPr>
+        <p:spPr>
+          <a:xfrm rot="2700000">
+            <a:off x="6787374" y="2516841"/>
+            <a:ext cx="1245432" cy="299697"/>
+          </a:xfrm>
+          <a:prstGeom prst="rightArrow">
+            <a:avLst/>
+          </a:prstGeom>
+          <a:solidFill>
+            <a:schemeClr val="accent4">
+              <a:lumMod val="20000"/>
+              <a:lumOff val="80000"/>
+            </a:schemeClr>
+          </a:solidFill>
+          <a:ln>
+            <a:solidFill>
+              <a:schemeClr val="accent4">
+                <a:lumMod val="75000"/>
+              </a:schemeClr>
+            </a:solidFill>
+          </a:ln>
+        </p:spPr>
+        <p:style>
+          <a:lnRef idx="2">
+            <a:schemeClr val="accent1">
+              <a:shade val="50000"/>
+            </a:schemeClr>
+          </a:lnRef>
+          <a:fillRef idx="1">
+            <a:schemeClr val="accent1"/>
+          </a:fillRef>
+          <a:effectRef idx="0">
+            <a:schemeClr val="accent1"/>
+          </a:effectRef>
+          <a:fontRef idx="minor">
+            <a:schemeClr val="lt1"/>
+          </a:fontRef>
+        </p:style>
+        <p:txBody>
+          <a:bodyPr rtlCol="0" anchor="ctr"/>
+          <a:lstStyle/>
+          <a:p>
+            <a:pPr algn="ctr"/>
+            <a:endParaRPr lang="fr-FR" sz="1400"/>
+          </a:p>
+        </p:txBody>
+      </p:sp>
+      <p:sp>
+        <p:nvSpPr>
+          <p:cNvPr id="68" name="Rectangle 67"/>
+          <p:cNvSpPr/>
+          <p:nvPr/>
+        </p:nvSpPr>
+        <p:spPr>
+          <a:xfrm>
+            <a:off x="496552" y="332657"/>
+            <a:ext cx="1366751" cy="823596"/>
+          </a:xfrm>
+          <a:prstGeom prst="rect">
+            <a:avLst/>
+          </a:prstGeom>
+          <a:noFill/>
+          <a:ln>
+            <a:solidFill>
+              <a:schemeClr val="accent6">
+                <a:lumMod val="75000"/>
+              </a:schemeClr>
+            </a:solidFill>
+          </a:ln>
+        </p:spPr>
+        <p:style>
+          <a:lnRef idx="2">
+            <a:schemeClr val="accent1">
+              <a:shade val="50000"/>
+            </a:schemeClr>
+          </a:lnRef>
+          <a:fillRef idx="1">
+            <a:schemeClr val="accent1"/>
+          </a:fillRef>
+          <a:effectRef idx="0">
+            <a:schemeClr val="accent1"/>
+          </a:effectRef>
+          <a:fontRef idx="minor">
+            <a:schemeClr val="lt1"/>
+          </a:fontRef>
+        </p:style>
+        <p:txBody>
+          <a:bodyPr rtlCol="0" anchor="ctr"/>
+          <a:lstStyle/>
+          <a:p>
+            <a:pPr algn="ctr"/>
+            <a:r>
+              <a:rPr lang="en-US" sz="1100" dirty="0">
+                <a:solidFill>
+                  <a:schemeClr val="tx1"/>
+                </a:solidFill>
+              </a:rPr>
+              <a:t>Inputs</a:t>
+            </a:r>
+          </a:p>
+          <a:p>
+            <a:pPr algn="ctr"/>
+            <a:r>
+              <a:rPr lang="en-US" sz="1100" dirty="0" smtClean="0">
+                <a:solidFill>
+                  <a:schemeClr val="tx1"/>
+                </a:solidFill>
+              </a:rPr>
+              <a:t>SRS, Rail Knowledge,</a:t>
+            </a:r>
+          </a:p>
+          <a:p>
+            <a:pPr algn="ctr"/>
+            <a:r>
+              <a:rPr lang="en-US" sz="1100" dirty="0" smtClean="0">
+                <a:solidFill>
+                  <a:schemeClr val="tx1"/>
+                </a:solidFill>
+              </a:rPr>
+              <a:t>EFS content,…</a:t>
+            </a:r>
+            <a:endParaRPr lang="en-US" sz="1100" dirty="0">
+              <a:solidFill>
+                <a:schemeClr val="tx1"/>
+              </a:solidFill>
+            </a:endParaRPr>
+          </a:p>
+        </p:txBody>
+      </p:sp>
+      <p:sp>
+        <p:nvSpPr>
+          <p:cNvPr id="63" name="ZoneTexte 62"/>
+          <p:cNvSpPr txBox="1"/>
+          <p:nvPr/>
+        </p:nvSpPr>
+        <p:spPr>
+          <a:xfrm>
+            <a:off x="3663532" y="6298210"/>
+            <a:ext cx="1425743" cy="523220"/>
+          </a:xfrm>
+          <a:prstGeom prst="rect">
+            <a:avLst/>
+          </a:prstGeom>
+          <a:noFill/>
+        </p:spPr>
+        <p:txBody>
+          <a:bodyPr wrap="square" rtlCol="0">
+            <a:spAutoFit/>
+          </a:bodyPr>
+          <a:lstStyle/>
+          <a:p>
+            <a:pPr algn="ctr"/>
+            <a:r>
+              <a:rPr lang="en-US" sz="1400" dirty="0" smtClean="0"/>
+              <a:t>EFS Modeling for</a:t>
+            </a:r>
+          </a:p>
+          <a:p>
+            <a:pPr algn="ctr"/>
+            <a:r>
+              <a:rPr lang="en-US" sz="1400" dirty="0" smtClean="0"/>
+              <a:t>SCADE V&amp;V</a:t>
+            </a:r>
+          </a:p>
+        </p:txBody>
+      </p:sp>
+      <p:grpSp>
+        <p:nvGrpSpPr>
+          <p:cNvPr id="2" name="Groupe 1"/>
+          <p:cNvGrpSpPr/>
+          <p:nvPr/>
+        </p:nvGrpSpPr>
+        <p:grpSpPr>
+          <a:xfrm>
+            <a:off x="5497029" y="2276874"/>
+            <a:ext cx="515131" cy="3372547"/>
+            <a:chOff x="5497029" y="2276873"/>
+            <a:chExt cx="515131" cy="3566728"/>
+          </a:xfrm>
+        </p:grpSpPr>
+        <p:sp>
+          <p:nvSpPr>
+            <p:cNvPr id="34" name="Flèche angle droit à deux pointes 33"/>
+            <p:cNvSpPr/>
+            <p:nvPr/>
+          </p:nvSpPr>
+          <p:spPr>
+            <a:xfrm rot="5400000">
+              <a:off x="5196741" y="2577163"/>
+              <a:ext cx="1115707" cy="515130"/>
+            </a:xfrm>
+            <a:prstGeom prst="leftUpArrow">
+              <a:avLst>
+                <a:gd name="adj1" fmla="val 25000"/>
+                <a:gd name="adj2" fmla="val 25000"/>
+                <a:gd name="adj3" fmla="val 29142"/>
+              </a:avLst>
+            </a:prstGeom>
+            <a:solidFill>
+              <a:schemeClr val="accent3">
+                <a:lumMod val="20000"/>
+                <a:lumOff val="80000"/>
+              </a:schemeClr>
+            </a:solidFill>
+            <a:ln>
+              <a:solidFill>
+                <a:schemeClr val="accent3">
+                  <a:lumMod val="75000"/>
+                </a:schemeClr>
+              </a:solidFill>
+            </a:ln>
+          </p:spPr>
+          <p:style>
+            <a:lnRef idx="2">
+              <a:schemeClr val="accent1">
+                <a:shade val="50000"/>
+              </a:schemeClr>
+            </a:lnRef>
+            <a:fillRef idx="1">
+              <a:schemeClr val="accent1"/>
+            </a:fillRef>
+            <a:effectRef idx="0">
+              <a:schemeClr val="accent1"/>
+            </a:effectRef>
+            <a:fontRef idx="minor">
+              <a:schemeClr val="lt1"/>
+            </a:fontRef>
+          </p:style>
+          <p:txBody>
+            <a:bodyPr rtlCol="0" anchor="ctr"/>
+            <a:lstStyle/>
+            <a:p>
+              <a:pPr algn="ctr"/>
+              <a:endParaRPr lang="fr-FR" sz="1400"/>
+            </a:p>
+          </p:txBody>
+        </p:sp>
+        <p:sp>
+          <p:nvSpPr>
+            <p:cNvPr id="65" name="Flèche angle droit à deux pointes 64"/>
+            <p:cNvSpPr/>
+            <p:nvPr/>
+          </p:nvSpPr>
+          <p:spPr>
+            <a:xfrm rot="5400000">
+              <a:off x="4808410" y="2965493"/>
+              <a:ext cx="1892369" cy="515130"/>
+            </a:xfrm>
+            <a:prstGeom prst="leftUpArrow">
+              <a:avLst>
+                <a:gd name="adj1" fmla="val 25000"/>
+                <a:gd name="adj2" fmla="val 25000"/>
+                <a:gd name="adj3" fmla="val 29142"/>
+              </a:avLst>
+            </a:prstGeom>
+            <a:solidFill>
+              <a:schemeClr val="accent3">
+                <a:lumMod val="20000"/>
+                <a:lumOff val="80000"/>
+              </a:schemeClr>
+            </a:solidFill>
+            <a:ln>
+              <a:solidFill>
+                <a:schemeClr val="accent3">
+                  <a:lumMod val="75000"/>
+                </a:schemeClr>
+              </a:solidFill>
+            </a:ln>
+          </p:spPr>
+          <p:style>
+            <a:lnRef idx="2">
+              <a:schemeClr val="accent1">
+                <a:shade val="50000"/>
+              </a:schemeClr>
+            </a:lnRef>
+            <a:fillRef idx="1">
+              <a:schemeClr val="accent1"/>
+            </a:fillRef>
+            <a:effectRef idx="0">
+              <a:schemeClr val="accent1"/>
+            </a:effectRef>
+            <a:fontRef idx="minor">
+              <a:schemeClr val="lt1"/>
+            </a:fontRef>
+          </p:style>
+          <p:txBody>
+            <a:bodyPr rtlCol="0" anchor="ctr"/>
+            <a:lstStyle/>
+            <a:p>
+              <a:pPr algn="ctr"/>
+              <a:endParaRPr lang="fr-FR" sz="1400"/>
+            </a:p>
+          </p:txBody>
+        </p:sp>
+        <p:sp>
+          <p:nvSpPr>
+            <p:cNvPr id="66" name="Flèche angle droit à deux pointes 65"/>
+            <p:cNvSpPr/>
+            <p:nvPr/>
+          </p:nvSpPr>
+          <p:spPr>
+            <a:xfrm rot="5400000">
+              <a:off x="4312064" y="3461839"/>
+              <a:ext cx="2885062" cy="515130"/>
+            </a:xfrm>
+            <a:prstGeom prst="leftUpArrow">
+              <a:avLst>
+                <a:gd name="adj1" fmla="val 25000"/>
+                <a:gd name="adj2" fmla="val 25000"/>
+                <a:gd name="adj3" fmla="val 29142"/>
+              </a:avLst>
+            </a:prstGeom>
+            <a:solidFill>
+              <a:schemeClr val="accent3">
+                <a:lumMod val="20000"/>
+                <a:lumOff val="80000"/>
+              </a:schemeClr>
+            </a:solidFill>
+            <a:ln>
+              <a:solidFill>
+                <a:schemeClr val="accent3">
+                  <a:lumMod val="75000"/>
+                </a:schemeClr>
+              </a:solidFill>
+            </a:ln>
+          </p:spPr>
+          <p:style>
+            <a:lnRef idx="2">
+              <a:schemeClr val="accent1">
+                <a:shade val="50000"/>
+              </a:schemeClr>
+            </a:lnRef>
+            <a:fillRef idx="1">
+              <a:schemeClr val="accent1"/>
+            </a:fillRef>
+            <a:effectRef idx="0">
+              <a:schemeClr val="accent1"/>
+            </a:effectRef>
+            <a:fontRef idx="minor">
+              <a:schemeClr val="lt1"/>
+            </a:fontRef>
+          </p:style>
+          <p:txBody>
+            <a:bodyPr rtlCol="0" anchor="ctr"/>
+            <a:lstStyle/>
+            <a:p>
+              <a:pPr algn="ctr"/>
+              <a:endParaRPr lang="fr-FR" sz="1400"/>
+            </a:p>
+          </p:txBody>
+        </p:sp>
+        <p:sp>
+          <p:nvSpPr>
+            <p:cNvPr id="67" name="Flèche angle droit à deux pointes 66"/>
+            <p:cNvSpPr/>
+            <p:nvPr/>
+          </p:nvSpPr>
+          <p:spPr>
+            <a:xfrm rot="5400000">
+              <a:off x="3971230" y="3802672"/>
+              <a:ext cx="3566728" cy="515130"/>
+            </a:xfrm>
+            <a:prstGeom prst="leftUpArrow">
+              <a:avLst>
+                <a:gd name="adj1" fmla="val 25000"/>
+                <a:gd name="adj2" fmla="val 25000"/>
+                <a:gd name="adj3" fmla="val 29142"/>
+              </a:avLst>
+            </a:prstGeom>
+            <a:solidFill>
+              <a:schemeClr val="accent3">
+                <a:lumMod val="20000"/>
+                <a:lumOff val="80000"/>
+              </a:schemeClr>
+            </a:solidFill>
+            <a:ln>
+              <a:solidFill>
+                <a:schemeClr val="accent3">
+                  <a:lumMod val="75000"/>
+                </a:schemeClr>
+              </a:solidFill>
+            </a:ln>
+          </p:spPr>
+          <p:style>
+            <a:lnRef idx="2">
+              <a:schemeClr val="accent1">
+                <a:shade val="50000"/>
+              </a:schemeClr>
+            </a:lnRef>
+            <a:fillRef idx="1">
+              <a:schemeClr val="accent1"/>
+            </a:fillRef>
+            <a:effectRef idx="0">
+              <a:schemeClr val="accent1"/>
+            </a:effectRef>
+            <a:fontRef idx="minor">
+              <a:schemeClr val="lt1"/>
+            </a:fontRef>
+          </p:style>
+          <p:txBody>
+            <a:bodyPr rtlCol="0" anchor="ctr"/>
+            <a:lstStyle/>
+            <a:p>
+              <a:pPr algn="ctr"/>
+              <a:endParaRPr lang="fr-FR" sz="1400"/>
+            </a:p>
+          </p:txBody>
+        </p:sp>
+      </p:grpSp>
+      <p:sp>
+        <p:nvSpPr>
+          <p:cNvPr id="74" name="Double flèche horizontale 73"/>
+          <p:cNvSpPr/>
+          <p:nvPr/>
+        </p:nvSpPr>
+        <p:spPr>
+          <a:xfrm rot="5400000">
+            <a:off x="4150369" y="2579778"/>
+            <a:ext cx="687580" cy="299697"/>
+          </a:xfrm>
+          <a:prstGeom prst="leftRightArrow">
+            <a:avLst/>
+          </a:prstGeom>
+          <a:solidFill>
+            <a:schemeClr val="tx2">
+              <a:lumMod val="20000"/>
+              <a:lumOff val="80000"/>
+            </a:schemeClr>
+          </a:solidFill>
+          <a:ln>
+            <a:solidFill>
+              <a:schemeClr val="tx2"/>
+            </a:solidFill>
+          </a:ln>
+        </p:spPr>
+        <p:style>
+          <a:lnRef idx="2">
+            <a:schemeClr val="accent1">
+              <a:shade val="50000"/>
+            </a:schemeClr>
+          </a:lnRef>
+          <a:fillRef idx="1">
+            <a:schemeClr val="accent1"/>
+          </a:fillRef>
+          <a:effectRef idx="0">
+            <a:schemeClr val="accent1"/>
+          </a:effectRef>
+          <a:fontRef idx="minor">
+            <a:schemeClr val="lt1"/>
+          </a:fontRef>
+        </p:style>
+        <p:txBody>
+          <a:bodyPr rtlCol="0" anchor="ctr"/>
+          <a:lstStyle/>
+          <a:p>
+            <a:pPr algn="ctr"/>
+            <a:endParaRPr lang="fr-FR" sz="1400"/>
+          </a:p>
+        </p:txBody>
+      </p:sp>
+      <p:sp>
+        <p:nvSpPr>
+          <p:cNvPr id="84" name="Rectangle à coins arrondis 83"/>
+          <p:cNvSpPr/>
+          <p:nvPr/>
+        </p:nvSpPr>
+        <p:spPr>
+          <a:xfrm>
+            <a:off x="6228184" y="3672840"/>
+            <a:ext cx="302418" cy="196257"/>
+          </a:xfrm>
+          <a:prstGeom prst="roundRect">
+            <a:avLst/>
+          </a:prstGeom>
+          <a:noFill/>
+          <a:ln>
+            <a:solidFill>
+              <a:schemeClr val="accent3">
+                <a:lumMod val="75000"/>
+              </a:schemeClr>
+            </a:solidFill>
+          </a:ln>
+        </p:spPr>
+        <p:style>
+          <a:lnRef idx="2">
+            <a:schemeClr val="accent1">
+              <a:shade val="50000"/>
+            </a:schemeClr>
+          </a:lnRef>
+          <a:fillRef idx="1">
+            <a:schemeClr val="accent1"/>
+          </a:fillRef>
+          <a:effectRef idx="0">
+            <a:schemeClr val="accent1"/>
+          </a:effectRef>
+          <a:fontRef idx="minor">
+            <a:schemeClr val="lt1"/>
+          </a:fontRef>
+        </p:style>
+        <p:txBody>
+          <a:bodyPr rtlCol="0" anchor="ctr"/>
+          <a:lstStyle/>
+          <a:p>
+            <a:pPr algn="ctr"/>
+            <a:endParaRPr lang="en-US" sz="1100" dirty="0">
+              <a:solidFill>
+                <a:schemeClr val="tx1"/>
+              </a:solidFill>
+            </a:endParaRPr>
+          </a:p>
+        </p:txBody>
+      </p:sp>
+      <p:cxnSp>
+        <p:nvCxnSpPr>
+          <p:cNvPr id="4" name="Connecteur droit 3"/>
+          <p:cNvCxnSpPr/>
+          <p:nvPr/>
+        </p:nvCxnSpPr>
+        <p:spPr>
+          <a:xfrm>
+            <a:off x="5143500" y="3261360"/>
+            <a:ext cx="1097280" cy="411480"/>
+          </a:xfrm>
+          <a:prstGeom prst="line">
+            <a:avLst/>
+          </a:prstGeom>
+          <a:ln w="19050">
+            <a:solidFill>
+              <a:schemeClr val="accent3">
+                <a:lumMod val="75000"/>
+              </a:schemeClr>
+            </a:solidFill>
+            <a:prstDash val="sysDash"/>
+          </a:ln>
+        </p:spPr>
+        <p:style>
+          <a:lnRef idx="1">
+            <a:schemeClr val="accent1"/>
+          </a:lnRef>
+          <a:fillRef idx="0">
+            <a:schemeClr val="accent1"/>
+          </a:fillRef>
+          <a:effectRef idx="0">
+            <a:schemeClr val="accent1"/>
+          </a:effectRef>
+          <a:fontRef idx="minor">
+            <a:schemeClr val="tx1"/>
+          </a:fontRef>
+        </p:style>
+      </p:cxnSp>
+      <p:cxnSp>
+        <p:nvCxnSpPr>
+          <p:cNvPr id="86" name="Connecteur droit 85"/>
+          <p:cNvCxnSpPr/>
+          <p:nvPr/>
+        </p:nvCxnSpPr>
+        <p:spPr>
+          <a:xfrm flipV="1">
+            <a:off x="5320215" y="3855720"/>
+            <a:ext cx="920565" cy="2255520"/>
+          </a:xfrm>
+          <a:prstGeom prst="line">
+            <a:avLst/>
+          </a:prstGeom>
+          <a:ln w="19050">
+            <a:solidFill>
+              <a:schemeClr val="accent3">
+                <a:lumMod val="75000"/>
+              </a:schemeClr>
+            </a:solidFill>
+            <a:prstDash val="sysDash"/>
+          </a:ln>
+        </p:spPr>
+        <p:style>
+          <a:lnRef idx="1">
+            <a:schemeClr val="accent1"/>
+          </a:lnRef>
+          <a:fillRef idx="0">
+            <a:schemeClr val="accent1"/>
+          </a:fillRef>
+          <a:effectRef idx="0">
+            <a:schemeClr val="accent1"/>
+          </a:effectRef>
+          <a:fontRef idx="minor">
+            <a:schemeClr val="tx1"/>
+          </a:fontRef>
+        </p:style>
+      </p:cxnSp>
+      <p:sp>
+        <p:nvSpPr>
+          <p:cNvPr id="91" name="Flèche à angle droit 90"/>
+          <p:cNvSpPr/>
+          <p:nvPr/>
+        </p:nvSpPr>
+        <p:spPr>
+          <a:xfrm>
+            <a:off x="1115616" y="2276872"/>
+            <a:ext cx="4638979" cy="3831664"/>
+          </a:xfrm>
+          <a:prstGeom prst="bentUpArrow">
+            <a:avLst>
+              <a:gd name="adj1" fmla="val 3757"/>
+              <a:gd name="adj2" fmla="val 3402"/>
+              <a:gd name="adj3" fmla="val 4157"/>
+            </a:avLst>
+          </a:prstGeom>
+          <a:solidFill>
+            <a:schemeClr val="accent3">
+              <a:lumMod val="20000"/>
+              <a:lumOff val="80000"/>
+            </a:schemeClr>
+          </a:solidFill>
+          <a:ln>
+            <a:solidFill>
+              <a:schemeClr val="accent3">
+                <a:lumMod val="75000"/>
+              </a:schemeClr>
+            </a:solidFill>
+          </a:ln>
+        </p:spPr>
+        <p:style>
+          <a:lnRef idx="2">
+            <a:schemeClr val="accent1">
+              <a:shade val="50000"/>
+            </a:schemeClr>
+          </a:lnRef>
+          <a:fillRef idx="1">
+            <a:schemeClr val="accent1"/>
+          </a:fillRef>
+          <a:effectRef idx="0">
+            <a:schemeClr val="accent1"/>
+          </a:effectRef>
+          <a:fontRef idx="minor">
+            <a:schemeClr val="lt1"/>
+          </a:fontRef>
+        </p:style>
+        <p:txBody>
+          <a:bodyPr rtlCol="0" anchor="ctr"/>
+          <a:lstStyle/>
+          <a:p>
+            <a:pPr algn="ctr"/>
+            <a:endParaRPr lang="fr-FR" sz="1400" dirty="0"/>
+          </a:p>
+        </p:txBody>
+      </p:sp>
+      <p:sp>
+        <p:nvSpPr>
+          <p:cNvPr id="85" name="Rectangle à coins arrondis 84"/>
+          <p:cNvSpPr/>
+          <p:nvPr/>
+        </p:nvSpPr>
+        <p:spPr>
+          <a:xfrm>
+            <a:off x="3594368" y="3246443"/>
+            <a:ext cx="1725847" cy="3123877"/>
+          </a:xfrm>
+          <a:prstGeom prst="roundRect">
+            <a:avLst/>
+          </a:prstGeom>
+          <a:noFill/>
+          <a:ln>
+            <a:solidFill>
+              <a:schemeClr val="accent3">
+                <a:lumMod val="75000"/>
+              </a:schemeClr>
+            </a:solidFill>
+          </a:ln>
+        </p:spPr>
+        <p:style>
+          <a:lnRef idx="2">
+            <a:schemeClr val="accent1">
+              <a:shade val="50000"/>
+            </a:schemeClr>
+          </a:lnRef>
+          <a:fillRef idx="1">
+            <a:schemeClr val="accent1"/>
+          </a:fillRef>
+          <a:effectRef idx="0">
+            <a:schemeClr val="accent1"/>
+          </a:effectRef>
+          <a:fontRef idx="minor">
+            <a:schemeClr val="lt1"/>
+          </a:fontRef>
+        </p:style>
+        <p:txBody>
+          <a:bodyPr rtlCol="0" anchor="ctr"/>
+          <a:lstStyle/>
+          <a:p>
+            <a:pPr algn="ctr"/>
+            <a:endParaRPr lang="en-US" sz="1100" dirty="0">
+              <a:solidFill>
+                <a:schemeClr val="tx1"/>
+              </a:solidFill>
+            </a:endParaRPr>
+          </a:p>
+        </p:txBody>
+      </p:sp>
+      <p:grpSp>
+        <p:nvGrpSpPr>
+          <p:cNvPr id="50" name="Groupe 49"/>
+          <p:cNvGrpSpPr/>
+          <p:nvPr/>
+        </p:nvGrpSpPr>
+        <p:grpSpPr>
+          <a:xfrm>
+            <a:off x="61870" y="3324885"/>
+            <a:ext cx="1512082" cy="2975610"/>
+            <a:chOff x="251520" y="2910741"/>
+            <a:chExt cx="1800200" cy="3542595"/>
+          </a:xfrm>
+        </p:grpSpPr>
+        <p:sp>
+          <p:nvSpPr>
+            <p:cNvPr id="8" name="Cylindre 7"/>
+            <p:cNvSpPr/>
+            <p:nvPr/>
+          </p:nvSpPr>
+          <p:spPr>
+            <a:xfrm>
+              <a:off x="682007" y="3889328"/>
+              <a:ext cx="939226" cy="632122"/>
+            </a:xfrm>
+            <a:prstGeom prst="can">
+              <a:avLst>
+                <a:gd name="adj" fmla="val 17342"/>
+              </a:avLst>
+            </a:prstGeom>
+            <a:solidFill>
+              <a:schemeClr val="bg1"/>
+            </a:solidFill>
+          </p:spPr>
+          <p:style>
+            <a:lnRef idx="2">
+              <a:schemeClr val="accent1">
+                <a:shade val="50000"/>
+              </a:schemeClr>
+            </a:lnRef>
+            <a:fillRef idx="1">
+              <a:schemeClr val="accent1"/>
+            </a:fillRef>
+            <a:effectRef idx="0">
+              <a:schemeClr val="accent1"/>
+            </a:effectRef>
+            <a:fontRef idx="minor">
+              <a:schemeClr val="lt1"/>
+            </a:fontRef>
+          </p:style>
+          <p:txBody>
+            <a:bodyPr rtlCol="0" anchor="ctr"/>
+            <a:lstStyle/>
+            <a:p>
+              <a:pPr algn="ctr"/>
+              <a:r>
+                <a:rPr lang="fr-FR" sz="1100" dirty="0" smtClean="0">
+                  <a:solidFill>
+                    <a:schemeClr val="tx1"/>
+                  </a:solidFill>
+                </a:rPr>
+                <a:t>OSS Code</a:t>
+              </a:r>
+            </a:p>
+            <a:p>
+              <a:pPr algn="ctr"/>
+              <a:r>
+                <a:rPr lang="fr-FR" sz="1100" dirty="0" smtClean="0">
+                  <a:solidFill>
+                    <a:schemeClr val="tx1"/>
+                  </a:solidFill>
+                </a:rPr>
+                <a:t>Model</a:t>
+              </a:r>
+            </a:p>
+          </p:txBody>
+        </p:sp>
+        <p:sp>
+          <p:nvSpPr>
+            <p:cNvPr id="9" name="Ellipse 8"/>
+            <p:cNvSpPr/>
+            <p:nvPr/>
+          </p:nvSpPr>
+          <p:spPr>
+            <a:xfrm>
+              <a:off x="251520" y="2910741"/>
+              <a:ext cx="1800200" cy="689870"/>
+            </a:xfrm>
+            <a:prstGeom prst="ellipse">
+              <a:avLst/>
+            </a:prstGeom>
+            <a:solidFill>
+              <a:schemeClr val="bg1"/>
+            </a:solidFill>
+            <a:ln>
+              <a:solidFill>
+                <a:schemeClr val="tx2"/>
+              </a:solidFill>
+            </a:ln>
+          </p:spPr>
+          <p:style>
+            <a:lnRef idx="2">
+              <a:schemeClr val="accent1">
+                <a:shade val="50000"/>
+              </a:schemeClr>
+            </a:lnRef>
+            <a:fillRef idx="1">
+              <a:schemeClr val="accent1"/>
+            </a:fillRef>
+            <a:effectRef idx="0">
+              <a:schemeClr val="accent1"/>
+            </a:effectRef>
+            <a:fontRef idx="minor">
+              <a:schemeClr val="lt1"/>
+            </a:fontRef>
+          </p:style>
+          <p:txBody>
+            <a:bodyPr rtlCol="0" anchor="ctr"/>
+            <a:lstStyle/>
+            <a:p>
+              <a:pPr algn="ctr"/>
+              <a:r>
+                <a:rPr lang="en-US" sz="1100" dirty="0">
+                  <a:solidFill>
+                    <a:schemeClr val="tx1"/>
+                  </a:solidFill>
+                </a:rPr>
+                <a:t>Design </a:t>
+              </a:r>
+              <a:r>
+                <a:rPr lang="en-US" sz="1100" dirty="0" smtClean="0">
+                  <a:solidFill>
+                    <a:schemeClr val="tx1"/>
+                  </a:solidFill>
+                </a:rPr>
+                <a:t>of OSS Code Spec. (B,EFS)</a:t>
+              </a:r>
+              <a:endParaRPr lang="en-US" sz="1100" dirty="0">
+                <a:solidFill>
+                  <a:schemeClr val="tx1"/>
+                </a:solidFill>
+              </a:endParaRPr>
+            </a:p>
+          </p:txBody>
+        </p:sp>
+        <p:sp>
+          <p:nvSpPr>
+            <p:cNvPr id="48" name="Flèche droite 47"/>
+            <p:cNvSpPr/>
+            <p:nvPr/>
+          </p:nvSpPr>
+          <p:spPr>
+            <a:xfrm rot="5400000">
+              <a:off x="491546" y="5065087"/>
+              <a:ext cx="1320149" cy="356803"/>
+            </a:xfrm>
+            <a:prstGeom prst="rightArrow">
+              <a:avLst/>
+            </a:prstGeom>
+            <a:solidFill>
+              <a:schemeClr val="tx2">
+                <a:lumMod val="20000"/>
+                <a:lumOff val="80000"/>
+              </a:schemeClr>
+            </a:solidFill>
+            <a:ln>
+              <a:solidFill>
+                <a:schemeClr val="tx2"/>
+              </a:solidFill>
+            </a:ln>
+          </p:spPr>
+          <p:style>
+            <a:lnRef idx="2">
+              <a:schemeClr val="accent1">
+                <a:shade val="50000"/>
+              </a:schemeClr>
+            </a:lnRef>
+            <a:fillRef idx="1">
+              <a:schemeClr val="accent1"/>
+            </a:fillRef>
+            <a:effectRef idx="0">
+              <a:schemeClr val="accent1"/>
+            </a:effectRef>
+            <a:fontRef idx="minor">
+              <a:schemeClr val="lt1"/>
+            </a:fontRef>
+          </p:style>
+          <p:txBody>
+            <a:bodyPr rtlCol="0" anchor="ctr"/>
+            <a:lstStyle/>
+            <a:p>
+              <a:pPr algn="ctr"/>
+              <a:endParaRPr lang="fr-FR" sz="1400"/>
+            </a:p>
+          </p:txBody>
+        </p:sp>
+        <p:grpSp>
+          <p:nvGrpSpPr>
+            <p:cNvPr id="43" name="Groupe 42"/>
+            <p:cNvGrpSpPr/>
+            <p:nvPr/>
+          </p:nvGrpSpPr>
+          <p:grpSpPr>
+            <a:xfrm>
+              <a:off x="754016" y="4837762"/>
+              <a:ext cx="795209" cy="795209"/>
+              <a:chOff x="789027" y="5072792"/>
+              <a:chExt cx="696178" cy="696178"/>
+            </a:xfrm>
+          </p:grpSpPr>
+          <p:sp>
+            <p:nvSpPr>
+              <p:cNvPr id="39" name="Ellipse 38"/>
+              <p:cNvSpPr/>
+              <p:nvPr/>
+            </p:nvSpPr>
+            <p:spPr>
+              <a:xfrm>
+                <a:off x="789027" y="5072792"/>
+                <a:ext cx="696178" cy="696178"/>
+              </a:xfrm>
+              <a:prstGeom prst="ellipse">
+                <a:avLst/>
+              </a:prstGeom>
+              <a:solidFill>
+                <a:schemeClr val="bg1"/>
+              </a:solidFill>
+            </p:spPr>
+            <p:style>
+              <a:lnRef idx="2">
+                <a:schemeClr val="accent1">
+                  <a:shade val="50000"/>
+                </a:schemeClr>
+              </a:lnRef>
+              <a:fillRef idx="1">
+                <a:schemeClr val="accent1"/>
+              </a:fillRef>
+              <a:effectRef idx="0">
+                <a:schemeClr val="accent1"/>
+              </a:effectRef>
+              <a:fontRef idx="minor">
+                <a:schemeClr val="lt1"/>
+              </a:fontRef>
+            </p:style>
+            <p:txBody>
+              <a:bodyPr rtlCol="0" anchor="ctr"/>
+              <a:lstStyle/>
+              <a:p>
+                <a:pPr algn="ctr"/>
+                <a:endParaRPr lang="en-US" sz="1100" dirty="0">
+                  <a:solidFill>
+                    <a:schemeClr val="tx1"/>
+                  </a:solidFill>
+                </a:endParaRPr>
+              </a:p>
+            </p:txBody>
+          </p:sp>
+          <p:sp>
+            <p:nvSpPr>
+              <p:cNvPr id="41" name="Rectangle 40"/>
+              <p:cNvSpPr/>
+              <p:nvPr/>
+            </p:nvSpPr>
+            <p:spPr>
+              <a:xfrm>
+                <a:off x="789027" y="5098246"/>
+                <a:ext cx="696178" cy="525423"/>
+              </a:xfrm>
+              <a:prstGeom prst="rect">
+                <a:avLst/>
+              </a:prstGeom>
+            </p:spPr>
+            <p:txBody>
+              <a:bodyPr wrap="square">
+                <a:spAutoFit/>
+              </a:bodyPr>
+              <a:lstStyle/>
+              <a:p>
+                <a:pPr algn="ctr"/>
+                <a:r>
+                  <a:rPr lang="en-US" sz="1100" dirty="0" smtClean="0"/>
+                  <a:t>OSS</a:t>
+                </a:r>
+              </a:p>
+              <a:p>
+                <a:pPr algn="ctr"/>
+                <a:r>
+                  <a:rPr lang="en-US" sz="1100" dirty="0" smtClean="0"/>
+                  <a:t>Code</a:t>
+                </a:r>
+              </a:p>
+              <a:p>
+                <a:pPr algn="ctr"/>
+                <a:r>
+                  <a:rPr lang="en-US" sz="1100" dirty="0" smtClean="0"/>
+                  <a:t>Gen.</a:t>
+                </a:r>
+                <a:endParaRPr lang="en-US" sz="1100" dirty="0"/>
+              </a:p>
+            </p:txBody>
+          </p:sp>
+        </p:grpSp>
+        <p:sp>
+          <p:nvSpPr>
+            <p:cNvPr id="46" name="Rectangle 45"/>
+            <p:cNvSpPr/>
+            <p:nvPr/>
+          </p:nvSpPr>
+          <p:spPr>
+            <a:xfrm>
+              <a:off x="682008" y="5949282"/>
+              <a:ext cx="939225" cy="504054"/>
+            </a:xfrm>
+            <a:prstGeom prst="rect">
+              <a:avLst/>
+            </a:prstGeom>
+            <a:solidFill>
+              <a:schemeClr val="bg1"/>
+            </a:solidFill>
+          </p:spPr>
+          <p:style>
+            <a:lnRef idx="2">
+              <a:schemeClr val="accent1">
+                <a:shade val="50000"/>
+              </a:schemeClr>
+            </a:lnRef>
+            <a:fillRef idx="1">
+              <a:schemeClr val="accent1"/>
+            </a:fillRef>
+            <a:effectRef idx="0">
+              <a:schemeClr val="accent1"/>
+            </a:effectRef>
+            <a:fontRef idx="minor">
+              <a:schemeClr val="lt1"/>
+            </a:fontRef>
+          </p:style>
+          <p:txBody>
+            <a:bodyPr rtlCol="0" anchor="ctr"/>
+            <a:lstStyle/>
+            <a:p>
+              <a:pPr algn="ctr"/>
+              <a:r>
+                <a:rPr lang="fr-FR" sz="1100" dirty="0" smtClean="0">
+                  <a:solidFill>
+                    <a:schemeClr val="tx1"/>
+                  </a:solidFill>
+                </a:rPr>
+                <a:t>Code SIL4</a:t>
+              </a:r>
+              <a:endParaRPr lang="fr-FR" sz="1100" dirty="0">
+                <a:solidFill>
+                  <a:schemeClr val="tx1"/>
+                </a:solidFill>
+              </a:endParaRPr>
+            </a:p>
+            <a:p>
+              <a:pPr algn="ctr"/>
+              <a:r>
+                <a:rPr lang="fr-FR" sz="1100" dirty="0">
+                  <a:solidFill>
+                    <a:schemeClr val="tx1"/>
+                  </a:solidFill>
+                </a:rPr>
+                <a:t>C,ADA,…</a:t>
+              </a:r>
+            </a:p>
+          </p:txBody>
+        </p:sp>
+        <p:sp>
+          <p:nvSpPr>
+            <p:cNvPr id="47" name="Flèche droite 46"/>
+            <p:cNvSpPr/>
+            <p:nvPr/>
+          </p:nvSpPr>
+          <p:spPr>
+            <a:xfrm rot="5400000">
+              <a:off x="987395" y="3606381"/>
+              <a:ext cx="328450" cy="356803"/>
+            </a:xfrm>
+            <a:prstGeom prst="rightArrow">
+              <a:avLst/>
+            </a:prstGeom>
+            <a:solidFill>
+              <a:schemeClr val="tx2">
+                <a:lumMod val="20000"/>
+                <a:lumOff val="80000"/>
+              </a:schemeClr>
+            </a:solidFill>
+            <a:ln>
+              <a:solidFill>
+                <a:schemeClr val="tx2"/>
+              </a:solidFill>
+            </a:ln>
+          </p:spPr>
+          <p:style>
+            <a:lnRef idx="2">
+              <a:schemeClr val="accent1">
+                <a:shade val="50000"/>
+              </a:schemeClr>
+            </a:lnRef>
+            <a:fillRef idx="1">
+              <a:schemeClr val="accent1"/>
+            </a:fillRef>
+            <a:effectRef idx="0">
+              <a:schemeClr val="accent1"/>
+            </a:effectRef>
+            <a:fontRef idx="minor">
+              <a:schemeClr val="lt1"/>
+            </a:fontRef>
+          </p:style>
+          <p:txBody>
+            <a:bodyPr rtlCol="0" anchor="ctr"/>
+            <a:lstStyle/>
+            <a:p>
+              <a:pPr algn="ctr"/>
+              <a:endParaRPr lang="fr-FR" sz="1400"/>
+            </a:p>
+          </p:txBody>
+        </p:sp>
+      </p:grpSp>
+      <p:grpSp>
+        <p:nvGrpSpPr>
+          <p:cNvPr id="51" name="Groupe 50"/>
+          <p:cNvGrpSpPr/>
+          <p:nvPr/>
+        </p:nvGrpSpPr>
+        <p:grpSpPr>
+          <a:xfrm>
+            <a:off x="1907704" y="3331285"/>
+            <a:ext cx="1484022" cy="2970233"/>
+            <a:chOff x="268223" y="2917142"/>
+            <a:chExt cx="1766794" cy="3536194"/>
+          </a:xfrm>
+        </p:grpSpPr>
+        <p:sp>
+          <p:nvSpPr>
+            <p:cNvPr id="52" name="Cylindre 51"/>
+            <p:cNvSpPr/>
+            <p:nvPr/>
+          </p:nvSpPr>
+          <p:spPr>
+            <a:xfrm>
+              <a:off x="611560" y="3889328"/>
+              <a:ext cx="1080120" cy="632122"/>
+            </a:xfrm>
+            <a:prstGeom prst="can">
+              <a:avLst>
+                <a:gd name="adj" fmla="val 17342"/>
+              </a:avLst>
+            </a:prstGeom>
+            <a:solidFill>
+              <a:schemeClr val="bg1"/>
+            </a:solidFill>
+          </p:spPr>
+          <p:style>
+            <a:lnRef idx="2">
+              <a:schemeClr val="accent1">
+                <a:shade val="50000"/>
+              </a:schemeClr>
+            </a:lnRef>
+            <a:fillRef idx="1">
+              <a:schemeClr val="accent1"/>
+            </a:fillRef>
+            <a:effectRef idx="0">
+              <a:schemeClr val="accent1"/>
+            </a:effectRef>
+            <a:fontRef idx="minor">
+              <a:schemeClr val="lt1"/>
+            </a:fontRef>
+          </p:style>
+          <p:txBody>
+            <a:bodyPr rtlCol="0" anchor="ctr"/>
+            <a:lstStyle/>
+            <a:p>
+              <a:pPr algn="ctr"/>
+              <a:r>
+                <a:rPr lang="fr-FR" sz="1100" dirty="0" err="1" smtClean="0">
+                  <a:solidFill>
+                    <a:schemeClr val="tx1"/>
+                  </a:solidFill>
+                </a:rPr>
+                <a:t>Scade</a:t>
+              </a:r>
+              <a:r>
+                <a:rPr lang="fr-FR" sz="1100" dirty="0" smtClean="0">
+                  <a:solidFill>
+                    <a:schemeClr val="tx1"/>
+                  </a:solidFill>
+                </a:rPr>
+                <a:t> Code</a:t>
+              </a:r>
+            </a:p>
+            <a:p>
+              <a:pPr algn="ctr"/>
+              <a:r>
+                <a:rPr lang="fr-FR" sz="1100" dirty="0" smtClean="0">
+                  <a:solidFill>
+                    <a:schemeClr val="tx1"/>
+                  </a:solidFill>
+                </a:rPr>
+                <a:t>Model</a:t>
+              </a:r>
+            </a:p>
+          </p:txBody>
+        </p:sp>
+        <p:sp>
+          <p:nvSpPr>
+            <p:cNvPr id="53" name="Ellipse 52"/>
+            <p:cNvSpPr/>
+            <p:nvPr/>
+          </p:nvSpPr>
+          <p:spPr>
+            <a:xfrm>
+              <a:off x="268223" y="2917142"/>
+              <a:ext cx="1766794" cy="677068"/>
+            </a:xfrm>
+            <a:prstGeom prst="ellipse">
+              <a:avLst/>
+            </a:prstGeom>
+            <a:solidFill>
+              <a:schemeClr val="bg1"/>
+            </a:solidFill>
+            <a:ln>
+              <a:solidFill>
+                <a:schemeClr val="tx2"/>
+              </a:solidFill>
+            </a:ln>
+          </p:spPr>
+          <p:style>
+            <a:lnRef idx="2">
+              <a:schemeClr val="accent1">
+                <a:shade val="50000"/>
+              </a:schemeClr>
+            </a:lnRef>
+            <a:fillRef idx="1">
+              <a:schemeClr val="accent1"/>
+            </a:fillRef>
+            <a:effectRef idx="0">
+              <a:schemeClr val="accent1"/>
+            </a:effectRef>
+            <a:fontRef idx="minor">
+              <a:schemeClr val="lt1"/>
+            </a:fontRef>
+          </p:style>
+          <p:txBody>
+            <a:bodyPr rtlCol="0" anchor="ctr"/>
+            <a:lstStyle/>
+            <a:p>
+              <a:pPr algn="ctr"/>
+              <a:r>
+                <a:rPr lang="en-US" sz="1100" dirty="0">
+                  <a:solidFill>
+                    <a:schemeClr val="tx1"/>
+                  </a:solidFill>
+                </a:rPr>
+                <a:t>Design </a:t>
+              </a:r>
+              <a:r>
+                <a:rPr lang="en-US" sz="1100" dirty="0" smtClean="0">
+                  <a:solidFill>
+                    <a:schemeClr val="tx1"/>
+                  </a:solidFill>
+                </a:rPr>
+                <a:t>of </a:t>
+              </a:r>
+              <a:r>
+                <a:rPr lang="en-US" sz="1100" dirty="0" err="1" smtClean="0">
+                  <a:solidFill>
+                    <a:schemeClr val="tx1"/>
+                  </a:solidFill>
+                </a:rPr>
+                <a:t>Scade</a:t>
+              </a:r>
+              <a:r>
+                <a:rPr lang="en-US" sz="1100" dirty="0" smtClean="0">
+                  <a:solidFill>
+                    <a:schemeClr val="tx1"/>
+                  </a:solidFill>
+                </a:rPr>
+                <a:t> Code Spec.</a:t>
+              </a:r>
+              <a:endParaRPr lang="en-US" sz="1100" dirty="0">
+                <a:solidFill>
+                  <a:schemeClr val="tx1"/>
+                </a:solidFill>
+              </a:endParaRPr>
+            </a:p>
+          </p:txBody>
+        </p:sp>
+        <p:sp>
+          <p:nvSpPr>
+            <p:cNvPr id="54" name="Flèche droite 53"/>
+            <p:cNvSpPr/>
+            <p:nvPr/>
+          </p:nvSpPr>
+          <p:spPr>
+            <a:xfrm rot="5400000">
+              <a:off x="491546" y="5065087"/>
+              <a:ext cx="1320149" cy="356803"/>
+            </a:xfrm>
+            <a:prstGeom prst="rightArrow">
+              <a:avLst/>
+            </a:prstGeom>
+            <a:solidFill>
+              <a:schemeClr val="tx2">
+                <a:lumMod val="20000"/>
+                <a:lumOff val="80000"/>
+              </a:schemeClr>
+            </a:solidFill>
+            <a:ln>
+              <a:solidFill>
+                <a:schemeClr val="tx2"/>
+              </a:solidFill>
+            </a:ln>
+          </p:spPr>
+          <p:style>
+            <a:lnRef idx="2">
+              <a:schemeClr val="accent1">
+                <a:shade val="50000"/>
+              </a:schemeClr>
+            </a:lnRef>
+            <a:fillRef idx="1">
+              <a:schemeClr val="accent1"/>
+            </a:fillRef>
+            <a:effectRef idx="0">
+              <a:schemeClr val="accent1"/>
+            </a:effectRef>
+            <a:fontRef idx="minor">
+              <a:schemeClr val="lt1"/>
+            </a:fontRef>
+          </p:style>
+          <p:txBody>
+            <a:bodyPr rtlCol="0" anchor="ctr"/>
+            <a:lstStyle/>
+            <a:p>
+              <a:pPr algn="ctr"/>
+              <a:endParaRPr lang="fr-FR" sz="1400"/>
+            </a:p>
+          </p:txBody>
+        </p:sp>
+        <p:grpSp>
+          <p:nvGrpSpPr>
+            <p:cNvPr id="55" name="Groupe 54"/>
+            <p:cNvGrpSpPr/>
+            <p:nvPr/>
+          </p:nvGrpSpPr>
+          <p:grpSpPr>
+            <a:xfrm>
+              <a:off x="754016" y="4837762"/>
+              <a:ext cx="795209" cy="795209"/>
+              <a:chOff x="789027" y="5072792"/>
+              <a:chExt cx="696178" cy="696178"/>
+            </a:xfrm>
+          </p:grpSpPr>
+          <p:sp>
+            <p:nvSpPr>
+              <p:cNvPr id="58" name="Ellipse 57"/>
+              <p:cNvSpPr/>
+              <p:nvPr/>
+            </p:nvSpPr>
+            <p:spPr>
+              <a:xfrm>
+                <a:off x="789027" y="5072792"/>
+                <a:ext cx="696178" cy="696178"/>
+              </a:xfrm>
+              <a:prstGeom prst="ellipse">
+                <a:avLst/>
+              </a:prstGeom>
+              <a:solidFill>
+                <a:schemeClr val="bg1"/>
+              </a:solidFill>
+            </p:spPr>
+            <p:style>
+              <a:lnRef idx="2">
+                <a:schemeClr val="accent1">
+                  <a:shade val="50000"/>
+                </a:schemeClr>
+              </a:lnRef>
+              <a:fillRef idx="1">
+                <a:schemeClr val="accent1"/>
+              </a:fillRef>
+              <a:effectRef idx="0">
+                <a:schemeClr val="accent1"/>
+              </a:effectRef>
+              <a:fontRef idx="minor">
+                <a:schemeClr val="lt1"/>
+              </a:fontRef>
+            </p:style>
+            <p:txBody>
+              <a:bodyPr rtlCol="0" anchor="ctr"/>
+              <a:lstStyle/>
+              <a:p>
+                <a:pPr algn="ctr"/>
+                <a:endParaRPr lang="en-US" sz="1100" dirty="0">
+                  <a:solidFill>
+                    <a:schemeClr val="tx1"/>
+                  </a:solidFill>
+                </a:endParaRPr>
+              </a:p>
+            </p:txBody>
+          </p:sp>
+          <p:sp>
+            <p:nvSpPr>
+              <p:cNvPr id="59" name="Rectangle 58"/>
+              <p:cNvSpPr/>
+              <p:nvPr/>
+            </p:nvSpPr>
+            <p:spPr>
+              <a:xfrm>
+                <a:off x="789027" y="5098246"/>
+                <a:ext cx="696178" cy="525423"/>
+              </a:xfrm>
+              <a:prstGeom prst="rect">
+                <a:avLst/>
+              </a:prstGeom>
+            </p:spPr>
+            <p:txBody>
+              <a:bodyPr wrap="square">
+                <a:spAutoFit/>
+              </a:bodyPr>
+              <a:lstStyle/>
+              <a:p>
+                <a:pPr algn="ctr"/>
+                <a:r>
+                  <a:rPr lang="en-US" sz="1100" dirty="0" err="1" smtClean="0"/>
+                  <a:t>Scade</a:t>
+                </a:r>
+                <a:endParaRPr lang="en-US" sz="1100" dirty="0" smtClean="0"/>
+              </a:p>
+              <a:p>
+                <a:pPr algn="ctr"/>
+                <a:r>
+                  <a:rPr lang="en-US" sz="1100" dirty="0" smtClean="0"/>
+                  <a:t>Code</a:t>
+                </a:r>
+              </a:p>
+              <a:p>
+                <a:pPr algn="ctr"/>
+                <a:r>
+                  <a:rPr lang="en-US" sz="1100" dirty="0" smtClean="0"/>
+                  <a:t>Gen.</a:t>
+                </a:r>
+                <a:endParaRPr lang="en-US" sz="1100" dirty="0"/>
+              </a:p>
+            </p:txBody>
+          </p:sp>
+        </p:grpSp>
+        <p:sp>
+          <p:nvSpPr>
+            <p:cNvPr id="56" name="Rectangle 55"/>
+            <p:cNvSpPr/>
+            <p:nvPr/>
+          </p:nvSpPr>
+          <p:spPr>
+            <a:xfrm>
+              <a:off x="682008" y="5949282"/>
+              <a:ext cx="939225" cy="504054"/>
+            </a:xfrm>
+            <a:prstGeom prst="rect">
+              <a:avLst/>
+            </a:prstGeom>
+            <a:solidFill>
+              <a:schemeClr val="bg1"/>
+            </a:solidFill>
+          </p:spPr>
+          <p:style>
+            <a:lnRef idx="2">
+              <a:schemeClr val="accent1">
+                <a:shade val="50000"/>
+              </a:schemeClr>
+            </a:lnRef>
+            <a:fillRef idx="1">
+              <a:schemeClr val="accent1"/>
+            </a:fillRef>
+            <a:effectRef idx="0">
+              <a:schemeClr val="accent1"/>
+            </a:effectRef>
+            <a:fontRef idx="minor">
+              <a:schemeClr val="lt1"/>
+            </a:fontRef>
+          </p:style>
+          <p:txBody>
+            <a:bodyPr rtlCol="0" anchor="ctr"/>
+            <a:lstStyle/>
+            <a:p>
+              <a:pPr algn="ctr"/>
+              <a:r>
+                <a:rPr lang="fr-FR" sz="1100" dirty="0" smtClean="0">
+                  <a:solidFill>
+                    <a:schemeClr val="tx1"/>
+                  </a:solidFill>
+                </a:rPr>
+                <a:t>Code SIL4</a:t>
+              </a:r>
+              <a:endParaRPr lang="fr-FR" sz="1100" dirty="0">
+                <a:solidFill>
+                  <a:schemeClr val="tx1"/>
+                </a:solidFill>
+              </a:endParaRPr>
+            </a:p>
+            <a:p>
+              <a:pPr algn="ctr"/>
+              <a:r>
+                <a:rPr lang="fr-FR" sz="1100" dirty="0">
+                  <a:solidFill>
+                    <a:schemeClr val="tx1"/>
+                  </a:solidFill>
+                </a:rPr>
+                <a:t>C,ADA,…</a:t>
+              </a:r>
+            </a:p>
+          </p:txBody>
+        </p:sp>
+        <p:sp>
+          <p:nvSpPr>
+            <p:cNvPr id="57" name="Flèche droite 56"/>
+            <p:cNvSpPr/>
+            <p:nvPr/>
+          </p:nvSpPr>
+          <p:spPr>
+            <a:xfrm rot="5400000">
+              <a:off x="987395" y="3606381"/>
+              <a:ext cx="328450" cy="356803"/>
+            </a:xfrm>
+            <a:prstGeom prst="rightArrow">
+              <a:avLst/>
+            </a:prstGeom>
+            <a:solidFill>
+              <a:schemeClr val="tx2">
+                <a:lumMod val="20000"/>
+                <a:lumOff val="80000"/>
+              </a:schemeClr>
+            </a:solidFill>
+            <a:ln>
+              <a:solidFill>
+                <a:schemeClr val="tx2"/>
+              </a:solidFill>
+            </a:ln>
+          </p:spPr>
+          <p:style>
+            <a:lnRef idx="2">
+              <a:schemeClr val="accent1">
+                <a:shade val="50000"/>
+              </a:schemeClr>
+            </a:lnRef>
+            <a:fillRef idx="1">
+              <a:schemeClr val="accent1"/>
+            </a:fillRef>
+            <a:effectRef idx="0">
+              <a:schemeClr val="accent1"/>
+            </a:effectRef>
+            <a:fontRef idx="minor">
+              <a:schemeClr val="lt1"/>
+            </a:fontRef>
+          </p:style>
+          <p:txBody>
+            <a:bodyPr rtlCol="0" anchor="ctr"/>
+            <a:lstStyle/>
+            <a:p>
+              <a:pPr algn="ctr"/>
+              <a:endParaRPr lang="fr-FR" sz="1400"/>
+            </a:p>
+          </p:txBody>
+        </p:sp>
+      </p:grpSp>
+      <p:grpSp>
+        <p:nvGrpSpPr>
+          <p:cNvPr id="75" name="Groupe 74"/>
+          <p:cNvGrpSpPr/>
+          <p:nvPr/>
+        </p:nvGrpSpPr>
+        <p:grpSpPr>
+          <a:xfrm>
+            <a:off x="3736050" y="3339087"/>
+            <a:ext cx="1484022" cy="2970233"/>
+            <a:chOff x="268223" y="2917142"/>
+            <a:chExt cx="1766794" cy="3536194"/>
+          </a:xfrm>
+        </p:grpSpPr>
+        <p:sp>
+          <p:nvSpPr>
+            <p:cNvPr id="76" name="Cylindre 75"/>
+            <p:cNvSpPr/>
+            <p:nvPr/>
+          </p:nvSpPr>
+          <p:spPr>
+            <a:xfrm>
+              <a:off x="611561" y="3889329"/>
+              <a:ext cx="1080120" cy="684796"/>
+            </a:xfrm>
+            <a:prstGeom prst="can">
+              <a:avLst>
+                <a:gd name="adj" fmla="val 17342"/>
+              </a:avLst>
+            </a:prstGeom>
+            <a:solidFill>
+              <a:schemeClr val="bg1"/>
+            </a:solidFill>
+          </p:spPr>
+          <p:style>
+            <a:lnRef idx="2">
+              <a:schemeClr val="accent1">
+                <a:shade val="50000"/>
+              </a:schemeClr>
+            </a:lnRef>
+            <a:fillRef idx="1">
+              <a:schemeClr val="accent1"/>
+            </a:fillRef>
+            <a:effectRef idx="0">
+              <a:schemeClr val="accent1"/>
+            </a:effectRef>
+            <a:fontRef idx="minor">
+              <a:schemeClr val="lt1"/>
+            </a:fontRef>
+          </p:style>
+          <p:txBody>
+            <a:bodyPr rtlCol="0" anchor="ctr"/>
+            <a:lstStyle/>
+            <a:p>
+              <a:pPr algn="ctr"/>
+              <a:r>
+                <a:rPr lang="fr-FR" sz="1100" dirty="0" smtClean="0">
+                  <a:solidFill>
+                    <a:schemeClr val="tx1"/>
+                  </a:solidFill>
+                </a:rPr>
+                <a:t>EFS Code</a:t>
+              </a:r>
+              <a:endParaRPr lang="fr-FR" sz="1100" dirty="0" smtClean="0">
+                <a:solidFill>
+                  <a:schemeClr val="tx1"/>
+                </a:solidFill>
+              </a:endParaRPr>
+            </a:p>
+            <a:p>
+              <a:pPr algn="ctr"/>
+              <a:r>
+                <a:rPr lang="fr-FR" sz="1100" dirty="0" smtClean="0">
+                  <a:solidFill>
+                    <a:schemeClr val="tx1"/>
+                  </a:solidFill>
+                </a:rPr>
+                <a:t>Semi-</a:t>
+              </a:r>
+              <a:r>
+                <a:rPr lang="fr-FR" sz="1100" dirty="0" err="1">
+                  <a:solidFill>
+                    <a:schemeClr val="tx1"/>
+                  </a:solidFill>
+                </a:rPr>
+                <a:t>f</a:t>
+              </a:r>
+              <a:r>
+                <a:rPr lang="fr-FR" sz="1100" dirty="0" err="1" smtClean="0">
+                  <a:solidFill>
+                    <a:schemeClr val="tx1"/>
+                  </a:solidFill>
+                </a:rPr>
+                <a:t>ormal</a:t>
+              </a:r>
+              <a:r>
+                <a:rPr lang="fr-FR" sz="1100" dirty="0" smtClean="0">
+                  <a:solidFill>
+                    <a:schemeClr val="tx1"/>
+                  </a:solidFill>
+                </a:rPr>
+                <a:t> Model</a:t>
+              </a:r>
+              <a:endParaRPr lang="fr-FR" sz="1100" dirty="0" smtClean="0">
+                <a:solidFill>
+                  <a:schemeClr val="tx1"/>
+                </a:solidFill>
+              </a:endParaRPr>
+            </a:p>
+          </p:txBody>
+        </p:sp>
+        <p:sp>
+          <p:nvSpPr>
+            <p:cNvPr id="77" name="Ellipse 76"/>
+            <p:cNvSpPr/>
+            <p:nvPr/>
+          </p:nvSpPr>
+          <p:spPr>
+            <a:xfrm>
+              <a:off x="268223" y="2917142"/>
+              <a:ext cx="1766794" cy="677068"/>
+            </a:xfrm>
+            <a:prstGeom prst="ellipse">
+              <a:avLst/>
+            </a:prstGeom>
+            <a:solidFill>
+              <a:schemeClr val="bg1"/>
+            </a:solidFill>
+            <a:ln>
+              <a:solidFill>
+                <a:schemeClr val="tx2"/>
+              </a:solidFill>
+            </a:ln>
+          </p:spPr>
+          <p:style>
+            <a:lnRef idx="2">
+              <a:schemeClr val="accent1">
+                <a:shade val="50000"/>
+              </a:schemeClr>
+            </a:lnRef>
+            <a:fillRef idx="1">
+              <a:schemeClr val="accent1"/>
+            </a:fillRef>
+            <a:effectRef idx="0">
+              <a:schemeClr val="accent1"/>
+            </a:effectRef>
+            <a:fontRef idx="minor">
+              <a:schemeClr val="lt1"/>
+            </a:fontRef>
+          </p:style>
+          <p:txBody>
+            <a:bodyPr rtlCol="0" anchor="ctr"/>
+            <a:lstStyle/>
+            <a:p>
+              <a:pPr algn="ctr"/>
+              <a:r>
+                <a:rPr lang="en-US" sz="1100" dirty="0">
+                  <a:solidFill>
+                    <a:schemeClr val="tx1"/>
+                  </a:solidFill>
+                </a:rPr>
+                <a:t>Design </a:t>
+              </a:r>
+              <a:r>
+                <a:rPr lang="en-US" sz="1100" dirty="0" smtClean="0">
+                  <a:solidFill>
+                    <a:schemeClr val="tx1"/>
+                  </a:solidFill>
+                </a:rPr>
+                <a:t>of </a:t>
+              </a:r>
+              <a:r>
+                <a:rPr lang="en-US" sz="1100" dirty="0" smtClean="0">
+                  <a:solidFill>
+                    <a:schemeClr val="tx1"/>
+                  </a:solidFill>
+                </a:rPr>
+                <a:t>EFS Code </a:t>
+              </a:r>
+              <a:r>
+                <a:rPr lang="en-US" sz="1100" dirty="0" smtClean="0">
+                  <a:solidFill>
+                    <a:schemeClr val="tx1"/>
+                  </a:solidFill>
+                </a:rPr>
+                <a:t>Spec.</a:t>
+              </a:r>
+              <a:endParaRPr lang="en-US" sz="1100" dirty="0">
+                <a:solidFill>
+                  <a:schemeClr val="tx1"/>
+                </a:solidFill>
+              </a:endParaRPr>
+            </a:p>
+          </p:txBody>
+        </p:sp>
+        <p:sp>
+          <p:nvSpPr>
+            <p:cNvPr id="78" name="Flèche droite 77"/>
+            <p:cNvSpPr/>
+            <p:nvPr/>
+          </p:nvSpPr>
+          <p:spPr>
+            <a:xfrm rot="5400000">
+              <a:off x="527605" y="5101146"/>
+              <a:ext cx="1248032" cy="356803"/>
+            </a:xfrm>
+            <a:prstGeom prst="rightArrow">
+              <a:avLst/>
+            </a:prstGeom>
+            <a:solidFill>
+              <a:schemeClr val="tx2">
+                <a:lumMod val="20000"/>
+                <a:lumOff val="80000"/>
+              </a:schemeClr>
+            </a:solidFill>
+            <a:ln>
+              <a:solidFill>
+                <a:schemeClr val="tx2"/>
+              </a:solidFill>
+            </a:ln>
+          </p:spPr>
+          <p:style>
+            <a:lnRef idx="2">
+              <a:schemeClr val="accent1">
+                <a:shade val="50000"/>
+              </a:schemeClr>
+            </a:lnRef>
+            <a:fillRef idx="1">
+              <a:schemeClr val="accent1"/>
+            </a:fillRef>
+            <a:effectRef idx="0">
+              <a:schemeClr val="accent1"/>
+            </a:effectRef>
+            <a:fontRef idx="minor">
+              <a:schemeClr val="lt1"/>
+            </a:fontRef>
+          </p:style>
+          <p:txBody>
+            <a:bodyPr rtlCol="0" anchor="ctr"/>
+            <a:lstStyle/>
+            <a:p>
+              <a:pPr algn="ctr"/>
+              <a:endParaRPr lang="fr-FR" sz="1400"/>
+            </a:p>
+          </p:txBody>
+        </p:sp>
+        <p:grpSp>
+          <p:nvGrpSpPr>
+            <p:cNvPr id="79" name="Groupe 78"/>
+            <p:cNvGrpSpPr/>
+            <p:nvPr/>
+          </p:nvGrpSpPr>
+          <p:grpSpPr>
+            <a:xfrm>
+              <a:off x="754016" y="4837762"/>
+              <a:ext cx="795209" cy="795209"/>
+              <a:chOff x="789027" y="5072792"/>
+              <a:chExt cx="696178" cy="696178"/>
+            </a:xfrm>
+          </p:grpSpPr>
+          <p:sp>
+            <p:nvSpPr>
+              <p:cNvPr id="82" name="Ellipse 81"/>
+              <p:cNvSpPr/>
+              <p:nvPr/>
+            </p:nvSpPr>
+            <p:spPr>
+              <a:xfrm>
+                <a:off x="789027" y="5072792"/>
+                <a:ext cx="696178" cy="696178"/>
+              </a:xfrm>
+              <a:prstGeom prst="ellipse">
+                <a:avLst/>
+              </a:prstGeom>
+              <a:solidFill>
+                <a:schemeClr val="bg1"/>
+              </a:solidFill>
+            </p:spPr>
+            <p:style>
+              <a:lnRef idx="2">
+                <a:schemeClr val="accent1">
+                  <a:shade val="50000"/>
+                </a:schemeClr>
+              </a:lnRef>
+              <a:fillRef idx="1">
+                <a:schemeClr val="accent1"/>
+              </a:fillRef>
+              <a:effectRef idx="0">
+                <a:schemeClr val="accent1"/>
+              </a:effectRef>
+              <a:fontRef idx="minor">
+                <a:schemeClr val="lt1"/>
+              </a:fontRef>
+            </p:style>
+            <p:txBody>
+              <a:bodyPr rtlCol="0" anchor="ctr"/>
+              <a:lstStyle/>
+              <a:p>
+                <a:pPr algn="ctr"/>
+                <a:endParaRPr lang="en-US" sz="1100" dirty="0">
+                  <a:solidFill>
+                    <a:schemeClr val="tx1"/>
+                  </a:solidFill>
+                </a:endParaRPr>
+              </a:p>
+            </p:txBody>
+          </p:sp>
+          <p:sp>
+            <p:nvSpPr>
+              <p:cNvPr id="83" name="Rectangle 82"/>
+              <p:cNvSpPr/>
+              <p:nvPr/>
+            </p:nvSpPr>
+            <p:spPr>
+              <a:xfrm>
+                <a:off x="789027" y="5098246"/>
+                <a:ext cx="696178" cy="525423"/>
+              </a:xfrm>
+              <a:prstGeom prst="rect">
+                <a:avLst/>
+              </a:prstGeom>
+            </p:spPr>
+            <p:txBody>
+              <a:bodyPr wrap="square">
+                <a:spAutoFit/>
+              </a:bodyPr>
+              <a:lstStyle/>
+              <a:p>
+                <a:pPr algn="ctr"/>
+                <a:r>
+                  <a:rPr lang="en-US" sz="1100" dirty="0" err="1" smtClean="0"/>
+                  <a:t>Scade</a:t>
+                </a:r>
+                <a:endParaRPr lang="en-US" sz="1100" dirty="0" smtClean="0"/>
+              </a:p>
+              <a:p>
+                <a:pPr algn="ctr"/>
+                <a:r>
+                  <a:rPr lang="en-US" sz="1100" dirty="0" smtClean="0"/>
+                  <a:t>Code</a:t>
+                </a:r>
+              </a:p>
+              <a:p>
+                <a:pPr algn="ctr"/>
+                <a:r>
+                  <a:rPr lang="en-US" sz="1100" dirty="0" smtClean="0"/>
+                  <a:t>Gen.</a:t>
+                </a:r>
+                <a:endParaRPr lang="en-US" sz="1100" dirty="0"/>
+              </a:p>
+            </p:txBody>
+          </p:sp>
+        </p:grpSp>
+        <p:sp>
+          <p:nvSpPr>
+            <p:cNvPr id="80" name="Rectangle 79"/>
+            <p:cNvSpPr/>
+            <p:nvPr/>
+          </p:nvSpPr>
+          <p:spPr>
+            <a:xfrm>
+              <a:off x="682008" y="5949282"/>
+              <a:ext cx="939225" cy="504054"/>
+            </a:xfrm>
+            <a:prstGeom prst="rect">
+              <a:avLst/>
+            </a:prstGeom>
+            <a:solidFill>
+              <a:schemeClr val="bg1"/>
+            </a:solidFill>
+          </p:spPr>
+          <p:style>
+            <a:lnRef idx="2">
+              <a:schemeClr val="accent1">
+                <a:shade val="50000"/>
+              </a:schemeClr>
+            </a:lnRef>
+            <a:fillRef idx="1">
+              <a:schemeClr val="accent1"/>
+            </a:fillRef>
+            <a:effectRef idx="0">
+              <a:schemeClr val="accent1"/>
+            </a:effectRef>
+            <a:fontRef idx="minor">
+              <a:schemeClr val="lt1"/>
+            </a:fontRef>
+          </p:style>
+          <p:txBody>
+            <a:bodyPr rtlCol="0" anchor="ctr"/>
+            <a:lstStyle/>
+            <a:p>
+              <a:pPr algn="ctr"/>
+              <a:r>
+                <a:rPr lang="fr-FR" sz="1100" dirty="0" smtClean="0">
+                  <a:solidFill>
+                    <a:schemeClr val="tx1"/>
+                  </a:solidFill>
+                </a:rPr>
+                <a:t>Code </a:t>
+              </a:r>
+              <a:r>
+                <a:rPr lang="fr-FR" sz="1100" dirty="0" smtClean="0">
+                  <a:solidFill>
+                    <a:schemeClr val="tx1"/>
+                  </a:solidFill>
+                </a:rPr>
+                <a:t>no SIL4 C</a:t>
+              </a:r>
+              <a:endParaRPr lang="fr-FR" sz="1100" dirty="0">
+                <a:solidFill>
+                  <a:schemeClr val="tx1"/>
+                </a:solidFill>
+              </a:endParaRPr>
+            </a:p>
+          </p:txBody>
+        </p:sp>
+        <p:sp>
+          <p:nvSpPr>
+            <p:cNvPr id="81" name="Flèche droite 80"/>
+            <p:cNvSpPr/>
+            <p:nvPr/>
+          </p:nvSpPr>
+          <p:spPr>
+            <a:xfrm rot="5400000">
+              <a:off x="987395" y="3606381"/>
+              <a:ext cx="328450" cy="356803"/>
+            </a:xfrm>
+            <a:prstGeom prst="rightArrow">
+              <a:avLst/>
+            </a:prstGeom>
+            <a:solidFill>
+              <a:schemeClr val="tx2">
+                <a:lumMod val="20000"/>
+                <a:lumOff val="80000"/>
+              </a:schemeClr>
+            </a:solidFill>
+            <a:ln>
+              <a:solidFill>
+                <a:schemeClr val="tx2"/>
+              </a:solidFill>
+            </a:ln>
+          </p:spPr>
+          <p:style>
+            <a:lnRef idx="2">
+              <a:schemeClr val="accent1">
+                <a:shade val="50000"/>
+              </a:schemeClr>
+            </a:lnRef>
+            <a:fillRef idx="1">
+              <a:schemeClr val="accent1"/>
+            </a:fillRef>
+            <a:effectRef idx="0">
+              <a:schemeClr val="accent1"/>
+            </a:effectRef>
+            <a:fontRef idx="minor">
+              <a:schemeClr val="lt1"/>
+            </a:fontRef>
+          </p:style>
+          <p:txBody>
+            <a:bodyPr rtlCol="0" anchor="ctr"/>
+            <a:lstStyle/>
+            <a:p>
+              <a:pPr algn="ctr"/>
+              <a:endParaRPr lang="fr-FR" sz="1400"/>
+            </a:p>
+          </p:txBody>
+        </p:sp>
+      </p:grpSp>
+      <p:grpSp>
+        <p:nvGrpSpPr>
+          <p:cNvPr id="20" name="Groupe 19"/>
+          <p:cNvGrpSpPr/>
+          <p:nvPr/>
+        </p:nvGrpSpPr>
+        <p:grpSpPr>
+          <a:xfrm>
+            <a:off x="1619672" y="2852936"/>
+            <a:ext cx="5688632" cy="3994382"/>
+            <a:chOff x="121077" y="3418904"/>
+            <a:chExt cx="6772576" cy="3429000"/>
+          </a:xfrm>
+        </p:grpSpPr>
+        <p:cxnSp>
+          <p:nvCxnSpPr>
+            <p:cNvPr id="13" name="Connecteur droit 12"/>
+            <p:cNvCxnSpPr/>
+            <p:nvPr/>
+          </p:nvCxnSpPr>
+          <p:spPr>
+            <a:xfrm>
+              <a:off x="2378603" y="3418904"/>
+              <a:ext cx="0" cy="3429000"/>
+            </a:xfrm>
+            <a:prstGeom prst="line">
+              <a:avLst/>
+            </a:prstGeom>
+            <a:ln w="28575">
+              <a:solidFill>
+                <a:schemeClr val="tx1"/>
+              </a:solidFill>
+            </a:ln>
+          </p:spPr>
+          <p:style>
+            <a:lnRef idx="1">
+              <a:schemeClr val="accent1"/>
+            </a:lnRef>
+            <a:fillRef idx="0">
+              <a:schemeClr val="accent1"/>
+            </a:fillRef>
+            <a:effectRef idx="0">
+              <a:schemeClr val="accent1"/>
+            </a:effectRef>
+            <a:fontRef idx="minor">
+              <a:schemeClr val="tx1"/>
+            </a:fontRef>
+          </p:style>
+        </p:cxnSp>
+        <p:cxnSp>
+          <p:nvCxnSpPr>
+            <p:cNvPr id="15" name="Connecteur droit 14"/>
+            <p:cNvCxnSpPr/>
+            <p:nvPr/>
+          </p:nvCxnSpPr>
+          <p:spPr>
+            <a:xfrm>
+              <a:off x="4636128" y="3418904"/>
+              <a:ext cx="0" cy="3429000"/>
+            </a:xfrm>
+            <a:prstGeom prst="line">
+              <a:avLst/>
+            </a:prstGeom>
+            <a:ln w="28575">
+              <a:solidFill>
+                <a:schemeClr val="tx1"/>
+              </a:solidFill>
+            </a:ln>
+          </p:spPr>
+          <p:style>
+            <a:lnRef idx="1">
+              <a:schemeClr val="accent1"/>
+            </a:lnRef>
+            <a:fillRef idx="0">
+              <a:schemeClr val="accent1"/>
+            </a:fillRef>
+            <a:effectRef idx="0">
+              <a:schemeClr val="accent1"/>
+            </a:effectRef>
+            <a:fontRef idx="minor">
+              <a:schemeClr val="tx1"/>
+            </a:fontRef>
+          </p:style>
+        </p:cxnSp>
+        <p:cxnSp>
+          <p:nvCxnSpPr>
+            <p:cNvPr id="16" name="Connecteur droit 15"/>
+            <p:cNvCxnSpPr/>
+            <p:nvPr/>
+          </p:nvCxnSpPr>
+          <p:spPr>
+            <a:xfrm>
+              <a:off x="6893653" y="3418904"/>
+              <a:ext cx="0" cy="3429000"/>
+            </a:xfrm>
+            <a:prstGeom prst="line">
+              <a:avLst/>
+            </a:prstGeom>
+            <a:ln w="28575">
+              <a:solidFill>
+                <a:schemeClr val="tx1"/>
+              </a:solidFill>
+            </a:ln>
+          </p:spPr>
+          <p:style>
+            <a:lnRef idx="1">
+              <a:schemeClr val="accent1"/>
+            </a:lnRef>
+            <a:fillRef idx="0">
+              <a:schemeClr val="accent1"/>
+            </a:fillRef>
+            <a:effectRef idx="0">
+              <a:schemeClr val="accent1"/>
+            </a:effectRef>
+            <a:fontRef idx="minor">
+              <a:schemeClr val="tx1"/>
+            </a:fontRef>
+          </p:style>
+        </p:cxnSp>
+        <p:cxnSp>
+          <p:nvCxnSpPr>
+            <p:cNvPr id="60" name="Connecteur droit 59"/>
+            <p:cNvCxnSpPr/>
+            <p:nvPr/>
+          </p:nvCxnSpPr>
+          <p:spPr>
+            <a:xfrm>
+              <a:off x="121077" y="3418904"/>
+              <a:ext cx="0" cy="3429000"/>
+            </a:xfrm>
+            <a:prstGeom prst="line">
+              <a:avLst/>
+            </a:prstGeom>
+            <a:ln w="28575">
+              <a:solidFill>
+                <a:schemeClr val="tx1"/>
+              </a:solidFill>
+            </a:ln>
+          </p:spPr>
+          <p:style>
+            <a:lnRef idx="1">
+              <a:schemeClr val="accent1"/>
+            </a:lnRef>
+            <a:fillRef idx="0">
+              <a:schemeClr val="accent1"/>
+            </a:fillRef>
+            <a:effectRef idx="0">
+              <a:schemeClr val="accent1"/>
+            </a:effectRef>
+            <a:fontRef idx="minor">
+              <a:schemeClr val="tx1"/>
+            </a:fontRef>
+          </p:style>
+        </p:cxnSp>
+      </p:grpSp>
+      <p:sp>
+        <p:nvSpPr>
+          <p:cNvPr id="69" name="Chevron 68"/>
+          <p:cNvSpPr/>
+          <p:nvPr/>
+        </p:nvSpPr>
+        <p:spPr>
+          <a:xfrm rot="10800000">
+            <a:off x="1491328" y="3429000"/>
+            <a:ext cx="416376" cy="409984"/>
+          </a:xfrm>
+          <a:prstGeom prst="chevron">
+            <a:avLst/>
+          </a:prstGeom>
+          <a:solidFill>
+            <a:schemeClr val="bg1"/>
+          </a:solidFill>
+          <a:ln>
+            <a:solidFill>
+              <a:schemeClr val="tx2">
+                <a:lumMod val="40000"/>
+                <a:lumOff val="60000"/>
+              </a:schemeClr>
+            </a:solidFill>
+          </a:ln>
+        </p:spPr>
+        <p:style>
+          <a:lnRef idx="2">
+            <a:schemeClr val="accent1">
+              <a:shade val="50000"/>
+            </a:schemeClr>
+          </a:lnRef>
+          <a:fillRef idx="1">
+            <a:schemeClr val="accent1"/>
+          </a:fillRef>
+          <a:effectRef idx="0">
+            <a:schemeClr val="accent1"/>
+          </a:effectRef>
+          <a:fontRef idx="minor">
+            <a:schemeClr val="lt1"/>
+          </a:fontRef>
+        </p:style>
+        <p:txBody>
+          <a:bodyPr rtlCol="0" anchor="ctr"/>
+          <a:lstStyle/>
+          <a:p>
+            <a:pPr algn="ctr"/>
+            <a:endParaRPr lang="fr-FR" sz="1400">
+              <a:solidFill>
+                <a:schemeClr val="tx1"/>
+              </a:solidFill>
+            </a:endParaRPr>
+          </a:p>
+        </p:txBody>
+      </p:sp>
+      <p:sp>
+        <p:nvSpPr>
+          <p:cNvPr id="71" name="Chevron 70"/>
+          <p:cNvSpPr/>
+          <p:nvPr/>
+        </p:nvSpPr>
+        <p:spPr>
+          <a:xfrm rot="10800000">
+            <a:off x="1419320" y="4243152"/>
+            <a:ext cx="416376" cy="409984"/>
+          </a:xfrm>
+          <a:prstGeom prst="chevron">
+            <a:avLst/>
+          </a:prstGeom>
+          <a:solidFill>
+            <a:schemeClr val="bg1"/>
+          </a:solidFill>
+          <a:ln>
+            <a:solidFill>
+              <a:schemeClr val="tx2">
+                <a:lumMod val="40000"/>
+                <a:lumOff val="60000"/>
+              </a:schemeClr>
+            </a:solidFill>
+          </a:ln>
+        </p:spPr>
+        <p:style>
+          <a:lnRef idx="2">
+            <a:schemeClr val="accent1">
+              <a:shade val="50000"/>
+            </a:schemeClr>
+          </a:lnRef>
+          <a:fillRef idx="1">
+            <a:schemeClr val="accent1"/>
+          </a:fillRef>
+          <a:effectRef idx="0">
+            <a:schemeClr val="accent1"/>
+          </a:effectRef>
+          <a:fontRef idx="minor">
+            <a:schemeClr val="lt1"/>
+          </a:fontRef>
+        </p:style>
+        <p:txBody>
+          <a:bodyPr rtlCol="0" anchor="ctr"/>
+          <a:lstStyle/>
+          <a:p>
+            <a:pPr algn="ctr"/>
+            <a:endParaRPr lang="fr-FR" sz="1400">
+              <a:solidFill>
+                <a:schemeClr val="tx1"/>
+              </a:solidFill>
+            </a:endParaRPr>
+          </a:p>
+        </p:txBody>
+      </p:sp>
+      <p:grpSp>
+        <p:nvGrpSpPr>
+          <p:cNvPr id="73" name="Groupe 72"/>
+          <p:cNvGrpSpPr/>
+          <p:nvPr/>
+        </p:nvGrpSpPr>
+        <p:grpSpPr>
+          <a:xfrm>
+            <a:off x="1187624" y="5107248"/>
+            <a:ext cx="1007893" cy="409984"/>
+            <a:chOff x="1763689" y="4013843"/>
+            <a:chExt cx="1084638" cy="488104"/>
+          </a:xfrm>
+        </p:grpSpPr>
+        <p:sp>
+          <p:nvSpPr>
+            <p:cNvPr id="70" name="Chevron 69"/>
+            <p:cNvSpPr/>
+            <p:nvPr/>
+          </p:nvSpPr>
+          <p:spPr>
+            <a:xfrm rot="10800000">
+              <a:off x="1763689" y="4013843"/>
+              <a:ext cx="1084638" cy="488104"/>
+            </a:xfrm>
+            <a:prstGeom prst="chevron">
+              <a:avLst>
+                <a:gd name="adj" fmla="val 35950"/>
+              </a:avLst>
+            </a:prstGeom>
+            <a:solidFill>
+              <a:schemeClr val="bg1"/>
+            </a:solidFill>
+            <a:ln>
+              <a:solidFill>
+                <a:schemeClr val="tx2">
+                  <a:lumMod val="40000"/>
+                  <a:lumOff val="60000"/>
+                </a:schemeClr>
+              </a:solidFill>
+            </a:ln>
+          </p:spPr>
+          <p:style>
+            <a:lnRef idx="2">
+              <a:schemeClr val="accent1">
+                <a:shade val="50000"/>
+              </a:schemeClr>
+            </a:lnRef>
+            <a:fillRef idx="1">
+              <a:schemeClr val="accent1"/>
+            </a:fillRef>
+            <a:effectRef idx="0">
+              <a:schemeClr val="accent1"/>
+            </a:effectRef>
+            <a:fontRef idx="minor">
+              <a:schemeClr val="lt1"/>
+            </a:fontRef>
+          </p:style>
+          <p:txBody>
+            <a:bodyPr vert="horz" rtlCol="0" anchor="ctr"/>
+            <a:lstStyle/>
+            <a:p>
+              <a:pPr algn="ctr"/>
+              <a:endParaRPr lang="en-US" sz="1100" dirty="0">
+                <a:solidFill>
+                  <a:schemeClr val="tx1"/>
+                </a:solidFill>
+              </a:endParaRPr>
+            </a:p>
+          </p:txBody>
+        </p:sp>
+        <p:sp>
+          <p:nvSpPr>
+            <p:cNvPr id="72" name="ZoneTexte 71"/>
+            <p:cNvSpPr txBox="1"/>
+            <p:nvPr/>
+          </p:nvSpPr>
+          <p:spPr>
+            <a:xfrm>
+              <a:off x="1837465" y="4027063"/>
+              <a:ext cx="895753" cy="430887"/>
+            </a:xfrm>
+            <a:prstGeom prst="rect">
+              <a:avLst/>
+            </a:prstGeom>
+            <a:noFill/>
+          </p:spPr>
+          <p:txBody>
+            <a:bodyPr wrap="none" rtlCol="0">
+              <a:spAutoFit/>
+            </a:bodyPr>
+            <a:lstStyle/>
+            <a:p>
+              <a:pPr algn="ctr"/>
+              <a:r>
+                <a:rPr lang="en-US" sz="1050" dirty="0" smtClean="0"/>
+                <a:t>OSS migration</a:t>
+              </a:r>
+            </a:p>
+            <a:p>
+              <a:pPr algn="ctr"/>
+              <a:r>
+                <a:rPr lang="en-US" sz="1050" dirty="0" smtClean="0"/>
+                <a:t>(long term)</a:t>
+              </a:r>
+              <a:endParaRPr lang="en-US" sz="1050" dirty="0"/>
+            </a:p>
+          </p:txBody>
+        </p:sp>
+      </p:grpSp>
+      <p:sp>
+        <p:nvSpPr>
+          <p:cNvPr id="88" name="Hexagone 87"/>
+          <p:cNvSpPr/>
+          <p:nvPr/>
+        </p:nvSpPr>
+        <p:spPr>
+          <a:xfrm>
+            <a:off x="3203848" y="5949280"/>
+            <a:ext cx="712871" cy="248163"/>
+          </a:xfrm>
+          <a:prstGeom prst="hexagon">
+            <a:avLst/>
+          </a:prstGeom>
+          <a:solidFill>
+            <a:schemeClr val="bg1"/>
+          </a:solidFill>
+          <a:ln>
+            <a:solidFill>
+              <a:schemeClr val="accent3">
+                <a:lumMod val="75000"/>
+              </a:schemeClr>
+            </a:solidFill>
+          </a:ln>
+        </p:spPr>
+        <p:style>
+          <a:lnRef idx="2">
+            <a:schemeClr val="accent1">
+              <a:shade val="50000"/>
+            </a:schemeClr>
+          </a:lnRef>
+          <a:fillRef idx="1">
+            <a:schemeClr val="accent1"/>
+          </a:fillRef>
+          <a:effectRef idx="0">
+            <a:schemeClr val="accent1"/>
+          </a:effectRef>
+          <a:fontRef idx="minor">
+            <a:schemeClr val="lt1"/>
+          </a:fontRef>
+        </p:style>
+        <p:txBody>
+          <a:bodyPr rtlCol="0" anchor="ctr"/>
+          <a:lstStyle/>
+          <a:p>
+            <a:pPr algn="ctr"/>
+            <a:r>
+              <a:rPr lang="fr-FR" sz="1100" dirty="0" smtClean="0">
+                <a:solidFill>
+                  <a:schemeClr val="tx1"/>
+                </a:solidFill>
+              </a:rPr>
+              <a:t>V&amp;V</a:t>
+            </a:r>
+            <a:endParaRPr lang="fr-FR" sz="1100" dirty="0">
+              <a:solidFill>
+                <a:schemeClr val="tx1"/>
+              </a:solidFill>
+            </a:endParaRPr>
+          </a:p>
+        </p:txBody>
+      </p:sp>
+      <p:sp>
+        <p:nvSpPr>
+          <p:cNvPr id="89" name="Hexagone 88"/>
+          <p:cNvSpPr/>
+          <p:nvPr/>
+        </p:nvSpPr>
+        <p:spPr>
+          <a:xfrm>
+            <a:off x="3196247" y="5125053"/>
+            <a:ext cx="712871" cy="248163"/>
+          </a:xfrm>
+          <a:prstGeom prst="hexagon">
+            <a:avLst/>
+          </a:prstGeom>
+          <a:solidFill>
+            <a:schemeClr val="bg1"/>
+          </a:solidFill>
+          <a:ln>
+            <a:solidFill>
+              <a:schemeClr val="accent3">
+                <a:lumMod val="75000"/>
+              </a:schemeClr>
+            </a:solidFill>
+          </a:ln>
+        </p:spPr>
+        <p:style>
+          <a:lnRef idx="2">
+            <a:schemeClr val="accent1">
+              <a:shade val="50000"/>
+            </a:schemeClr>
+          </a:lnRef>
+          <a:fillRef idx="1">
+            <a:schemeClr val="accent1"/>
+          </a:fillRef>
+          <a:effectRef idx="0">
+            <a:schemeClr val="accent1"/>
+          </a:effectRef>
+          <a:fontRef idx="minor">
+            <a:schemeClr val="lt1"/>
+          </a:fontRef>
+        </p:style>
+        <p:txBody>
+          <a:bodyPr rtlCol="0" anchor="ctr"/>
+          <a:lstStyle/>
+          <a:p>
+            <a:pPr algn="ctr"/>
+            <a:r>
+              <a:rPr lang="fr-FR" sz="1100" dirty="0" smtClean="0">
+                <a:solidFill>
+                  <a:schemeClr val="tx1"/>
+                </a:solidFill>
+              </a:rPr>
+              <a:t>V&amp;V</a:t>
+            </a:r>
+            <a:endParaRPr lang="fr-FR" sz="1100" dirty="0">
+              <a:solidFill>
+                <a:schemeClr val="tx1"/>
+              </a:solidFill>
+            </a:endParaRPr>
+          </a:p>
+        </p:txBody>
+      </p:sp>
+      <p:sp>
+        <p:nvSpPr>
+          <p:cNvPr id="90" name="Hexagone 89"/>
+          <p:cNvSpPr/>
+          <p:nvPr/>
+        </p:nvSpPr>
+        <p:spPr>
+          <a:xfrm>
+            <a:off x="3188646" y="4293096"/>
+            <a:ext cx="712871" cy="248163"/>
+          </a:xfrm>
+          <a:prstGeom prst="hexagon">
+            <a:avLst/>
+          </a:prstGeom>
+          <a:solidFill>
+            <a:schemeClr val="bg1"/>
+          </a:solidFill>
+          <a:ln>
+            <a:solidFill>
+              <a:schemeClr val="accent3">
+                <a:lumMod val="75000"/>
+              </a:schemeClr>
+            </a:solidFill>
+          </a:ln>
+        </p:spPr>
+        <p:style>
+          <a:lnRef idx="2">
+            <a:schemeClr val="accent1">
+              <a:shade val="50000"/>
+            </a:schemeClr>
+          </a:lnRef>
+          <a:fillRef idx="1">
+            <a:schemeClr val="accent1"/>
+          </a:fillRef>
+          <a:effectRef idx="0">
+            <a:schemeClr val="accent1"/>
+          </a:effectRef>
+          <a:fontRef idx="minor">
+            <a:schemeClr val="lt1"/>
+          </a:fontRef>
+        </p:style>
+        <p:txBody>
+          <a:bodyPr rtlCol="0" anchor="ctr"/>
+          <a:lstStyle/>
+          <a:p>
+            <a:pPr algn="ctr"/>
+            <a:r>
+              <a:rPr lang="fr-FR" sz="1100" dirty="0" smtClean="0">
+                <a:solidFill>
+                  <a:schemeClr val="tx1"/>
+                </a:solidFill>
+              </a:rPr>
+              <a:t>V&amp;V</a:t>
+            </a:r>
+            <a:endParaRPr lang="fr-FR" sz="1100" dirty="0">
+              <a:solidFill>
+                <a:schemeClr val="tx1"/>
+              </a:solidFill>
+            </a:endParaRPr>
+          </a:p>
+        </p:txBody>
+      </p:sp>
+    </p:spTree>
+    <p:extLst>
+      <p:ext uri="{BB962C8B-B14F-4D97-AF65-F5344CB8AC3E}">
+        <p14:creationId xmlns:p14="http://schemas.microsoft.com/office/powerpoint/2010/main" val="919041864"/>
+      </p:ext>
+    </p:extLst>
+  </p:cSld>
+  <p:clrMapOvr>
+    <a:masterClrMapping/>
+  </p:clrMapOvr>
+  <p:timing>
+    <p:tnLst>
+      <p:par>
+        <p:cTn id="1" dur="indefinite" restart="never" nodeType="tmRoot"/>
+      </p:par>
+    </p:tnLst>
+  </p:timing>
+</p:sld>
+</file>
+
 <file path=ppt/theme/theme1.xml><?xml version="1.0" encoding="utf-8"?>
 <a:theme xmlns:a="http://schemas.openxmlformats.org/drawingml/2006/main" name="Thème Office">
   <a:themeElements>

</xml_diff>

<commit_message>
Update D7.1 toolchain schema proposal
Remarks from @stanpinte and @JanWelvaarts added.
</commit_message>
<xml_diff>
--- a/PositionPapers/CEA/2013_08_28_D7.1_Toolchain_schema_proposal/2013_08_28_Toolchain_proposal.pptx
+++ b/PositionPapers/CEA/2013_08_28_D7.1_Toolchain_schema_proposal/2013_08_28_Toolchain_proposal.pptx
@@ -7,6 +7,7 @@
   <p:sldIdLst>
     <p:sldId id="259" r:id="rId2"/>
     <p:sldId id="260" r:id="rId3"/>
+    <p:sldId id="261" r:id="rId4"/>
   </p:sldIdLst>
   <p:sldSz cx="9144000" cy="6858000" type="screen4x3"/>
   <p:notesSz cx="6858000" cy="9144000"/>
@@ -289,7 +290,7 @@
           <a:p>
             <a:fld id="{AA309A6D-C09C-4548-B29A-6CF363A7E532}" type="datetimeFigureOut">
               <a:rPr lang="fr-FR" smtClean="0"/>
-              <a:t>02/09/2013</a:t>
+              <a:t>11/09/2013</a:t>
             </a:fld>
             <a:endParaRPr lang="fr-BE"/>
           </a:p>
@@ -454,7 +455,7 @@
           <a:p>
             <a:fld id="{AA309A6D-C09C-4548-B29A-6CF363A7E532}" type="datetimeFigureOut">
               <a:rPr lang="fr-FR" smtClean="0"/>
-              <a:t>02/09/2013</a:t>
+              <a:t>11/09/2013</a:t>
             </a:fld>
             <a:endParaRPr lang="fr-BE"/>
           </a:p>
@@ -629,7 +630,7 @@
           <a:p>
             <a:fld id="{AA309A6D-C09C-4548-B29A-6CF363A7E532}" type="datetimeFigureOut">
               <a:rPr lang="fr-FR" smtClean="0"/>
-              <a:t>02/09/2013</a:t>
+              <a:t>11/09/2013</a:t>
             </a:fld>
             <a:endParaRPr lang="fr-BE"/>
           </a:p>
@@ -794,7 +795,7 @@
           <a:p>
             <a:fld id="{AA309A6D-C09C-4548-B29A-6CF363A7E532}" type="datetimeFigureOut">
               <a:rPr lang="fr-FR" smtClean="0"/>
-              <a:t>02/09/2013</a:t>
+              <a:t>11/09/2013</a:t>
             </a:fld>
             <a:endParaRPr lang="fr-BE"/>
           </a:p>
@@ -1035,7 +1036,7 @@
           <a:p>
             <a:fld id="{AA309A6D-C09C-4548-B29A-6CF363A7E532}" type="datetimeFigureOut">
               <a:rPr lang="fr-FR" smtClean="0"/>
-              <a:t>02/09/2013</a:t>
+              <a:t>11/09/2013</a:t>
             </a:fld>
             <a:endParaRPr lang="fr-BE"/>
           </a:p>
@@ -1318,7 +1319,7 @@
           <a:p>
             <a:fld id="{AA309A6D-C09C-4548-B29A-6CF363A7E532}" type="datetimeFigureOut">
               <a:rPr lang="fr-FR" smtClean="0"/>
-              <a:t>02/09/2013</a:t>
+              <a:t>11/09/2013</a:t>
             </a:fld>
             <a:endParaRPr lang="fr-BE"/>
           </a:p>
@@ -1735,7 +1736,7 @@
           <a:p>
             <a:fld id="{AA309A6D-C09C-4548-B29A-6CF363A7E532}" type="datetimeFigureOut">
               <a:rPr lang="fr-FR" smtClean="0"/>
-              <a:t>02/09/2013</a:t>
+              <a:t>11/09/2013</a:t>
             </a:fld>
             <a:endParaRPr lang="fr-BE"/>
           </a:p>
@@ -1848,7 +1849,7 @@
           <a:p>
             <a:fld id="{AA309A6D-C09C-4548-B29A-6CF363A7E532}" type="datetimeFigureOut">
               <a:rPr lang="fr-FR" smtClean="0"/>
-              <a:t>02/09/2013</a:t>
+              <a:t>11/09/2013</a:t>
             </a:fld>
             <a:endParaRPr lang="fr-BE"/>
           </a:p>
@@ -1938,7 +1939,7 @@
           <a:p>
             <a:fld id="{AA309A6D-C09C-4548-B29A-6CF363A7E532}" type="datetimeFigureOut">
               <a:rPr lang="fr-FR" smtClean="0"/>
-              <a:t>02/09/2013</a:t>
+              <a:t>11/09/2013</a:t>
             </a:fld>
             <a:endParaRPr lang="fr-BE"/>
           </a:p>
@@ -2210,7 +2211,7 @@
           <a:p>
             <a:fld id="{AA309A6D-C09C-4548-B29A-6CF363A7E532}" type="datetimeFigureOut">
               <a:rPr lang="fr-FR" smtClean="0"/>
-              <a:t>02/09/2013</a:t>
+              <a:t>11/09/2013</a:t>
             </a:fld>
             <a:endParaRPr lang="fr-BE"/>
           </a:p>
@@ -2458,7 +2459,7 @@
           <a:p>
             <a:fld id="{AA309A6D-C09C-4548-B29A-6CF363A7E532}" type="datetimeFigureOut">
               <a:rPr lang="fr-FR" smtClean="0"/>
-              <a:t>02/09/2013</a:t>
+              <a:t>11/09/2013</a:t>
             </a:fld>
             <a:endParaRPr lang="fr-BE"/>
           </a:p>
@@ -2666,7 +2667,7 @@
           <a:p>
             <a:fld id="{AA309A6D-C09C-4548-B29A-6CF363A7E532}" type="datetimeFigureOut">
               <a:rPr lang="fr-FR" smtClean="0"/>
-              <a:t>02/09/2013</a:t>
+              <a:t>11/09/2013</a:t>
             </a:fld>
             <a:endParaRPr lang="fr-BE"/>
           </a:p>
@@ -5916,22 +5917,14 @@
             <a:pPr algn="ctr"/>
             <a:r>
               <a:rPr lang="en-US" sz="1400" dirty="0" smtClean="0"/>
-              <a:t>WP7 </a:t>
-            </a:r>
+              <a:t>WP7 OSS tools </a:t>
+            </a:r>
+          </a:p>
+          <a:p>
+            <a:pPr algn="ctr"/>
             <a:r>
               <a:rPr lang="en-US" sz="1400" dirty="0" smtClean="0"/>
-              <a:t>OSS tools </a:t>
-            </a:r>
-          </a:p>
-          <a:p>
-            <a:pPr algn="ctr"/>
-            <a:r>
-              <a:rPr lang="en-US" sz="1400" dirty="0" smtClean="0"/>
-              <a:t>chain </a:t>
-            </a:r>
-            <a:r>
-              <a:rPr lang="en-US" sz="1400" dirty="0" smtClean="0"/>
-              <a:t>Development</a:t>
+              <a:t>chain Development</a:t>
             </a:r>
             <a:endParaRPr lang="en-US" sz="1400" dirty="0"/>
           </a:p>
@@ -5962,11 +5955,7 @@
             <a:pPr algn="ctr"/>
             <a:r>
               <a:rPr lang="en-US" sz="1400" dirty="0" smtClean="0"/>
-              <a:t>WP3 </a:t>
-            </a:r>
-            <a:r>
-              <a:rPr lang="en-US" sz="1400" dirty="0" smtClean="0"/>
-              <a:t>SCADE</a:t>
+              <a:t>WP3 SCADE</a:t>
             </a:r>
             <a:r>
               <a:rPr lang="en-US" sz="1400" dirty="0"/>
@@ -8350,11 +8339,6 @@
                 </a:rPr>
                 <a:t>EFS Code</a:t>
               </a:r>
-              <a:endParaRPr lang="fr-FR" sz="1100" dirty="0" smtClean="0">
-                <a:solidFill>
-                  <a:schemeClr val="tx1"/>
-                </a:solidFill>
-              </a:endParaRPr>
             </a:p>
             <a:p>
               <a:pPr algn="ctr"/>
@@ -8390,11 +8374,6 @@
                 </a:rPr>
                 <a:t> Model</a:t>
               </a:r>
-              <a:endParaRPr lang="fr-FR" sz="1100" dirty="0" smtClean="0">
-                <a:solidFill>
-                  <a:schemeClr val="tx1"/>
-                </a:solidFill>
-              </a:endParaRPr>
             </a:p>
           </p:txBody>
         </p:sp>
@@ -8456,23 +8435,7 @@
                     <a:schemeClr val="tx1"/>
                   </a:solidFill>
                 </a:rPr>
-                <a:t>of </a:t>
-              </a:r>
-              <a:r>
-                <a:rPr lang="en-US" sz="1100" dirty="0" smtClean="0">
-                  <a:solidFill>
-                    <a:schemeClr val="tx1"/>
-                  </a:solidFill>
-                </a:rPr>
-                <a:t>EFS Code </a:t>
-              </a:r>
-              <a:r>
-                <a:rPr lang="en-US" sz="1100" dirty="0" smtClean="0">
-                  <a:solidFill>
-                    <a:schemeClr val="tx1"/>
-                  </a:solidFill>
-                </a:rPr>
-                <a:t>Spec.</a:t>
+                <a:t>of EFS Code Spec.</a:t>
               </a:r>
               <a:endParaRPr lang="en-US" sz="1100" dirty="0">
                 <a:solidFill>
@@ -8685,15 +8648,7 @@
                     <a:schemeClr val="tx1"/>
                   </a:solidFill>
                 </a:rPr>
-                <a:t>Code </a:t>
-              </a:r>
-              <a:r>
-                <a:rPr lang="fr-FR" sz="1100" dirty="0" smtClean="0">
-                  <a:solidFill>
-                    <a:schemeClr val="tx1"/>
-                  </a:solidFill>
-                </a:rPr>
-                <a:t>no SIL4 C</a:t>
+                <a:t>Code no SIL4 C</a:t>
               </a:r>
               <a:endParaRPr lang="fr-FR" sz="1100" dirty="0">
                 <a:solidFill>
@@ -9320,6 +9275,3620 @@
     <p:extLst>
       <p:ext uri="{BB962C8B-B14F-4D97-AF65-F5344CB8AC3E}">
         <p14:creationId xmlns:p14="http://schemas.microsoft.com/office/powerpoint/2010/main" val="919041864"/>
+      </p:ext>
+    </p:extLst>
+  </p:cSld>
+  <p:clrMapOvr>
+    <a:masterClrMapping/>
+  </p:clrMapOvr>
+  <p:timing>
+    <p:tnLst>
+      <p:par>
+        <p:cTn id="1" dur="indefinite" restart="never" nodeType="tmRoot"/>
+      </p:par>
+    </p:tnLst>
+  </p:timing>
+</p:sld>
+</file>
+
+<file path=ppt/slides/slide3.xml><?xml version="1.0" encoding="utf-8"?>
+<p:sld xmlns:a="http://schemas.openxmlformats.org/drawingml/2006/main" xmlns:r="http://schemas.openxmlformats.org/officeDocument/2006/relationships" xmlns:p="http://schemas.openxmlformats.org/presentationml/2006/main">
+  <p:cSld>
+    <p:spTree>
+      <p:nvGrpSpPr>
+        <p:cNvPr id="1" name=""/>
+        <p:cNvGrpSpPr/>
+        <p:nvPr/>
+      </p:nvGrpSpPr>
+      <p:grpSpPr>
+        <a:xfrm>
+          <a:off x="0" y="0"/>
+          <a:ext cx="0" cy="0"/>
+          <a:chOff x="0" y="0"/>
+          <a:chExt cx="0" cy="0"/>
+        </a:xfrm>
+      </p:grpSpPr>
+      <p:sp>
+        <p:nvSpPr>
+          <p:cNvPr id="92" name="Flèche à angle droit 91"/>
+          <p:cNvSpPr/>
+          <p:nvPr/>
+        </p:nvSpPr>
+        <p:spPr>
+          <a:xfrm>
+            <a:off x="1115616" y="2276874"/>
+            <a:ext cx="4638979" cy="2247485"/>
+          </a:xfrm>
+          <a:prstGeom prst="bentUpArrow">
+            <a:avLst>
+              <a:gd name="adj1" fmla="val 6469"/>
+              <a:gd name="adj2" fmla="val 5775"/>
+              <a:gd name="adj3" fmla="val 6530"/>
+            </a:avLst>
+          </a:prstGeom>
+          <a:solidFill>
+            <a:schemeClr val="accent3">
+              <a:lumMod val="20000"/>
+              <a:lumOff val="80000"/>
+            </a:schemeClr>
+          </a:solidFill>
+          <a:ln>
+            <a:solidFill>
+              <a:schemeClr val="accent3">
+                <a:lumMod val="75000"/>
+              </a:schemeClr>
+            </a:solidFill>
+          </a:ln>
+        </p:spPr>
+        <p:style>
+          <a:lnRef idx="2">
+            <a:schemeClr val="accent1">
+              <a:shade val="50000"/>
+            </a:schemeClr>
+          </a:lnRef>
+          <a:fillRef idx="1">
+            <a:schemeClr val="accent1"/>
+          </a:fillRef>
+          <a:effectRef idx="0">
+            <a:schemeClr val="accent1"/>
+          </a:effectRef>
+          <a:fontRef idx="minor">
+            <a:schemeClr val="lt1"/>
+          </a:fontRef>
+        </p:style>
+        <p:txBody>
+          <a:bodyPr rtlCol="0" anchor="ctr"/>
+          <a:lstStyle/>
+          <a:p>
+            <a:pPr algn="ctr"/>
+            <a:endParaRPr lang="fr-FR" sz="1400" dirty="0"/>
+          </a:p>
+        </p:txBody>
+      </p:sp>
+      <p:sp>
+        <p:nvSpPr>
+          <p:cNvPr id="64" name="Flèche à angle droit 63"/>
+          <p:cNvSpPr/>
+          <p:nvPr/>
+        </p:nvSpPr>
+        <p:spPr>
+          <a:xfrm>
+            <a:off x="1115616" y="5631938"/>
+            <a:ext cx="7092788" cy="605374"/>
+          </a:xfrm>
+          <a:prstGeom prst="bentUpArrow">
+            <a:avLst>
+              <a:gd name="adj1" fmla="val 15836"/>
+              <a:gd name="adj2" fmla="val 16345"/>
+              <a:gd name="adj3" fmla="val 19909"/>
+            </a:avLst>
+          </a:prstGeom>
+          <a:solidFill>
+            <a:schemeClr val="accent4">
+              <a:lumMod val="20000"/>
+              <a:lumOff val="80000"/>
+            </a:schemeClr>
+          </a:solidFill>
+          <a:ln>
+            <a:solidFill>
+              <a:schemeClr val="accent4">
+                <a:lumMod val="75000"/>
+              </a:schemeClr>
+            </a:solidFill>
+          </a:ln>
+        </p:spPr>
+        <p:style>
+          <a:lnRef idx="2">
+            <a:schemeClr val="accent1">
+              <a:shade val="50000"/>
+            </a:schemeClr>
+          </a:lnRef>
+          <a:fillRef idx="1">
+            <a:schemeClr val="accent1"/>
+          </a:fillRef>
+          <a:effectRef idx="0">
+            <a:schemeClr val="accent1"/>
+          </a:effectRef>
+          <a:fontRef idx="minor">
+            <a:schemeClr val="lt1"/>
+          </a:fontRef>
+        </p:style>
+        <p:txBody>
+          <a:bodyPr rtlCol="0" anchor="ctr"/>
+          <a:lstStyle/>
+          <a:p>
+            <a:pPr algn="ctr"/>
+            <a:endParaRPr lang="fr-FR" sz="1400"/>
+          </a:p>
+        </p:txBody>
+      </p:sp>
+      <p:sp>
+        <p:nvSpPr>
+          <p:cNvPr id="5" name="Cylindre 4"/>
+          <p:cNvSpPr/>
+          <p:nvPr/>
+        </p:nvSpPr>
+        <p:spPr>
+          <a:xfrm>
+            <a:off x="1772182" y="1378645"/>
+            <a:ext cx="5104074" cy="898227"/>
+          </a:xfrm>
+          <a:prstGeom prst="can">
+            <a:avLst>
+              <a:gd name="adj" fmla="val 17342"/>
+            </a:avLst>
+          </a:prstGeom>
+          <a:solidFill>
+            <a:schemeClr val="bg1"/>
+          </a:solidFill>
+          <a:ln>
+            <a:solidFill>
+              <a:schemeClr val="accent6">
+                <a:lumMod val="75000"/>
+              </a:schemeClr>
+            </a:solidFill>
+          </a:ln>
+        </p:spPr>
+        <p:style>
+          <a:lnRef idx="2">
+            <a:schemeClr val="accent1">
+              <a:shade val="50000"/>
+            </a:schemeClr>
+          </a:lnRef>
+          <a:fillRef idx="1">
+            <a:schemeClr val="accent1"/>
+          </a:fillRef>
+          <a:effectRef idx="0">
+            <a:schemeClr val="accent1"/>
+          </a:effectRef>
+          <a:fontRef idx="minor">
+            <a:schemeClr val="lt1"/>
+          </a:fontRef>
+        </p:style>
+        <p:txBody>
+          <a:bodyPr rtlCol="0" anchor="ctr"/>
+          <a:lstStyle/>
+          <a:p>
+            <a:pPr algn="ctr"/>
+            <a:r>
+              <a:rPr lang="en-US" sz="1100" dirty="0" smtClean="0">
+                <a:solidFill>
+                  <a:schemeClr val="tx1"/>
+                </a:solidFill>
+              </a:rPr>
+              <a:t>SysML Semi-formal Model</a:t>
+            </a:r>
+          </a:p>
+          <a:p>
+            <a:pPr algn="ctr"/>
+            <a:r>
+              <a:rPr lang="en-US" sz="1100" dirty="0" smtClean="0">
+                <a:solidFill>
+                  <a:schemeClr val="tx1"/>
+                </a:solidFill>
+              </a:rPr>
+              <a:t>(Papyrus)</a:t>
+            </a:r>
+          </a:p>
+          <a:p>
+            <a:pPr algn="ctr"/>
+            <a:r>
+              <a:rPr lang="en-US" sz="1100" dirty="0" smtClean="0">
+                <a:solidFill>
+                  <a:schemeClr val="tx1"/>
+                </a:solidFill>
+              </a:rPr>
+              <a:t>Architecture (functional and organic), SSRS (OBU and Wayside at high-level)</a:t>
+            </a:r>
+          </a:p>
+        </p:txBody>
+      </p:sp>
+      <p:sp>
+        <p:nvSpPr>
+          <p:cNvPr id="6" name="Ellipse 5"/>
+          <p:cNvSpPr/>
+          <p:nvPr/>
+        </p:nvSpPr>
+        <p:spPr>
+          <a:xfrm>
+            <a:off x="3529639" y="332656"/>
+            <a:ext cx="1693531" cy="544349"/>
+          </a:xfrm>
+          <a:prstGeom prst="ellipse">
+            <a:avLst/>
+          </a:prstGeom>
+          <a:solidFill>
+            <a:schemeClr val="bg1"/>
+          </a:solidFill>
+          <a:ln>
+            <a:solidFill>
+              <a:schemeClr val="accent6">
+                <a:lumMod val="75000"/>
+              </a:schemeClr>
+            </a:solidFill>
+          </a:ln>
+        </p:spPr>
+        <p:style>
+          <a:lnRef idx="2">
+            <a:schemeClr val="accent1">
+              <a:shade val="50000"/>
+            </a:schemeClr>
+          </a:lnRef>
+          <a:fillRef idx="1">
+            <a:schemeClr val="accent1"/>
+          </a:fillRef>
+          <a:effectRef idx="0">
+            <a:schemeClr val="accent1"/>
+          </a:effectRef>
+          <a:fontRef idx="minor">
+            <a:schemeClr val="lt1"/>
+          </a:fontRef>
+        </p:style>
+        <p:txBody>
+          <a:bodyPr rtlCol="0" anchor="ctr"/>
+          <a:lstStyle/>
+          <a:p>
+            <a:pPr algn="ctr"/>
+            <a:r>
+              <a:rPr lang="en-US" sz="1100" dirty="0" smtClean="0">
+                <a:solidFill>
+                  <a:schemeClr val="tx1"/>
+                </a:solidFill>
+              </a:rPr>
+              <a:t>System Analysis on prose</a:t>
+            </a:r>
+            <a:endParaRPr lang="en-US" sz="1100" dirty="0">
+              <a:solidFill>
+                <a:schemeClr val="tx1"/>
+              </a:solidFill>
+            </a:endParaRPr>
+          </a:p>
+        </p:txBody>
+      </p:sp>
+      <p:sp>
+        <p:nvSpPr>
+          <p:cNvPr id="21" name="ZoneTexte 20"/>
+          <p:cNvSpPr txBox="1"/>
+          <p:nvPr/>
+        </p:nvSpPr>
+        <p:spPr>
+          <a:xfrm>
+            <a:off x="-36512" y="6298210"/>
+            <a:ext cx="1756554" cy="523220"/>
+          </a:xfrm>
+          <a:prstGeom prst="rect">
+            <a:avLst/>
+          </a:prstGeom>
+          <a:noFill/>
+        </p:spPr>
+        <p:txBody>
+          <a:bodyPr wrap="square" rtlCol="0">
+            <a:spAutoFit/>
+          </a:bodyPr>
+          <a:lstStyle/>
+          <a:p>
+            <a:pPr algn="ctr"/>
+            <a:r>
+              <a:rPr lang="en-US" sz="1400" dirty="0" smtClean="0"/>
+              <a:t>WP7 OSS tools </a:t>
+            </a:r>
+          </a:p>
+          <a:p>
+            <a:pPr algn="ctr"/>
+            <a:r>
+              <a:rPr lang="en-US" sz="1400" dirty="0" smtClean="0"/>
+              <a:t>chain Development</a:t>
+            </a:r>
+            <a:endParaRPr lang="en-US" sz="1400" dirty="0"/>
+          </a:p>
+        </p:txBody>
+      </p:sp>
+      <p:sp>
+        <p:nvSpPr>
+          <p:cNvPr id="22" name="ZoneTexte 21"/>
+          <p:cNvSpPr txBox="1"/>
+          <p:nvPr/>
+        </p:nvSpPr>
+        <p:spPr>
+          <a:xfrm>
+            <a:off x="1755225" y="6298210"/>
+            <a:ext cx="1425743" cy="523220"/>
+          </a:xfrm>
+          <a:prstGeom prst="rect">
+            <a:avLst/>
+          </a:prstGeom>
+          <a:noFill/>
+        </p:spPr>
+        <p:txBody>
+          <a:bodyPr wrap="square" rtlCol="0">
+            <a:spAutoFit/>
+          </a:bodyPr>
+          <a:lstStyle/>
+          <a:p>
+            <a:pPr algn="ctr"/>
+            <a:r>
+              <a:rPr lang="en-US" sz="1400" dirty="0" smtClean="0"/>
+              <a:t>WP3 SCADE</a:t>
+            </a:r>
+            <a:r>
+              <a:rPr lang="en-US" sz="1400" dirty="0"/>
+              <a:t> </a:t>
+            </a:r>
+            <a:r>
+              <a:rPr lang="en-US" sz="1400" dirty="0" smtClean="0"/>
+              <a:t>based Modeling</a:t>
+            </a:r>
+          </a:p>
+        </p:txBody>
+      </p:sp>
+      <p:sp>
+        <p:nvSpPr>
+          <p:cNvPr id="23" name="ZoneTexte 22"/>
+          <p:cNvSpPr txBox="1"/>
+          <p:nvPr/>
+        </p:nvSpPr>
+        <p:spPr>
+          <a:xfrm>
+            <a:off x="5940152" y="6405932"/>
+            <a:ext cx="1043194" cy="307777"/>
+          </a:xfrm>
+          <a:prstGeom prst="rect">
+            <a:avLst/>
+          </a:prstGeom>
+          <a:noFill/>
+        </p:spPr>
+        <p:txBody>
+          <a:bodyPr wrap="square" rtlCol="0">
+            <a:spAutoFit/>
+          </a:bodyPr>
+          <a:lstStyle/>
+          <a:p>
+            <a:pPr algn="ctr"/>
+            <a:r>
+              <a:rPr lang="en-US" sz="1400" dirty="0" smtClean="0"/>
+              <a:t>WP4 (V&amp;V)</a:t>
+            </a:r>
+            <a:endParaRPr lang="en-US" sz="1400" dirty="0"/>
+          </a:p>
+        </p:txBody>
+      </p:sp>
+      <p:sp>
+        <p:nvSpPr>
+          <p:cNvPr id="24" name="ZoneTexte 23"/>
+          <p:cNvSpPr txBox="1"/>
+          <p:nvPr/>
+        </p:nvSpPr>
+        <p:spPr>
+          <a:xfrm>
+            <a:off x="7452321" y="6405932"/>
+            <a:ext cx="1512167" cy="307777"/>
+          </a:xfrm>
+          <a:prstGeom prst="rect">
+            <a:avLst/>
+          </a:prstGeom>
+          <a:noFill/>
+        </p:spPr>
+        <p:txBody>
+          <a:bodyPr wrap="square" rtlCol="0">
+            <a:spAutoFit/>
+          </a:bodyPr>
+          <a:lstStyle/>
+          <a:p>
+            <a:pPr algn="ctr"/>
+            <a:r>
+              <a:rPr lang="en-US" sz="1400" dirty="0" smtClean="0"/>
+              <a:t>WP5 (Simulation)</a:t>
+            </a:r>
+            <a:endParaRPr lang="en-US" sz="1400" dirty="0"/>
+          </a:p>
+        </p:txBody>
+      </p:sp>
+      <p:sp>
+        <p:nvSpPr>
+          <p:cNvPr id="25" name="Double flèche horizontale 24"/>
+          <p:cNvSpPr/>
+          <p:nvPr/>
+        </p:nvSpPr>
+        <p:spPr>
+          <a:xfrm>
+            <a:off x="2088553" y="476673"/>
+            <a:ext cx="1303173" cy="302416"/>
+          </a:xfrm>
+          <a:prstGeom prst="leftRightArrow">
+            <a:avLst/>
+          </a:prstGeom>
+          <a:solidFill>
+            <a:schemeClr val="accent6">
+              <a:lumMod val="20000"/>
+              <a:lumOff val="80000"/>
+            </a:schemeClr>
+          </a:solidFill>
+          <a:ln>
+            <a:solidFill>
+              <a:schemeClr val="accent6">
+                <a:lumMod val="75000"/>
+              </a:schemeClr>
+            </a:solidFill>
+          </a:ln>
+        </p:spPr>
+        <p:style>
+          <a:lnRef idx="2">
+            <a:schemeClr val="accent1">
+              <a:shade val="50000"/>
+            </a:schemeClr>
+          </a:lnRef>
+          <a:fillRef idx="1">
+            <a:schemeClr val="accent1"/>
+          </a:fillRef>
+          <a:effectRef idx="0">
+            <a:schemeClr val="accent1"/>
+          </a:effectRef>
+          <a:fontRef idx="minor">
+            <a:schemeClr val="lt1"/>
+          </a:fontRef>
+        </p:style>
+        <p:txBody>
+          <a:bodyPr rtlCol="0" anchor="ctr"/>
+          <a:lstStyle/>
+          <a:p>
+            <a:pPr algn="ctr"/>
+            <a:endParaRPr lang="fr-FR" sz="1400"/>
+          </a:p>
+        </p:txBody>
+      </p:sp>
+      <p:sp>
+        <p:nvSpPr>
+          <p:cNvPr id="26" name="Double flèche horizontale 25"/>
+          <p:cNvSpPr/>
+          <p:nvPr/>
+        </p:nvSpPr>
+        <p:spPr>
+          <a:xfrm rot="5400000">
+            <a:off x="4176339" y="1003540"/>
+            <a:ext cx="373659" cy="302416"/>
+          </a:xfrm>
+          <a:prstGeom prst="leftRightArrow">
+            <a:avLst/>
+          </a:prstGeom>
+          <a:solidFill>
+            <a:schemeClr val="accent6">
+              <a:lumMod val="20000"/>
+              <a:lumOff val="80000"/>
+            </a:schemeClr>
+          </a:solidFill>
+          <a:ln>
+            <a:solidFill>
+              <a:schemeClr val="accent6">
+                <a:lumMod val="75000"/>
+              </a:schemeClr>
+            </a:solidFill>
+          </a:ln>
+        </p:spPr>
+        <p:style>
+          <a:lnRef idx="2">
+            <a:schemeClr val="accent1">
+              <a:shade val="50000"/>
+            </a:schemeClr>
+          </a:lnRef>
+          <a:fillRef idx="1">
+            <a:schemeClr val="accent1"/>
+          </a:fillRef>
+          <a:effectRef idx="0">
+            <a:schemeClr val="accent1"/>
+          </a:effectRef>
+          <a:fontRef idx="minor">
+            <a:schemeClr val="lt1"/>
+          </a:fontRef>
+        </p:style>
+        <p:txBody>
+          <a:bodyPr rtlCol="0" anchor="ctr"/>
+          <a:lstStyle/>
+          <a:p>
+            <a:pPr algn="ctr"/>
+            <a:endParaRPr lang="fr-FR" sz="1400"/>
+          </a:p>
+        </p:txBody>
+      </p:sp>
+      <p:sp>
+        <p:nvSpPr>
+          <p:cNvPr id="28" name="Double flèche horizontale 27"/>
+          <p:cNvSpPr/>
+          <p:nvPr/>
+        </p:nvSpPr>
+        <p:spPr>
+          <a:xfrm rot="8955836">
+            <a:off x="686812" y="2378655"/>
+            <a:ext cx="1044243" cy="299697"/>
+          </a:xfrm>
+          <a:prstGeom prst="leftRightArrow">
+            <a:avLst/>
+          </a:prstGeom>
+          <a:solidFill>
+            <a:schemeClr val="tx2">
+              <a:lumMod val="20000"/>
+              <a:lumOff val="80000"/>
+            </a:schemeClr>
+          </a:solidFill>
+          <a:ln>
+            <a:solidFill>
+              <a:schemeClr val="tx2"/>
+            </a:solidFill>
+          </a:ln>
+        </p:spPr>
+        <p:style>
+          <a:lnRef idx="2">
+            <a:schemeClr val="accent1">
+              <a:shade val="50000"/>
+            </a:schemeClr>
+          </a:lnRef>
+          <a:fillRef idx="1">
+            <a:schemeClr val="accent1"/>
+          </a:fillRef>
+          <a:effectRef idx="0">
+            <a:schemeClr val="accent1"/>
+          </a:effectRef>
+          <a:fontRef idx="minor">
+            <a:schemeClr val="lt1"/>
+          </a:fontRef>
+        </p:style>
+        <p:txBody>
+          <a:bodyPr rtlCol="0" anchor="ctr"/>
+          <a:lstStyle/>
+          <a:p>
+            <a:pPr algn="ctr"/>
+            <a:endParaRPr lang="fr-FR" sz="1400"/>
+          </a:p>
+        </p:txBody>
+      </p:sp>
+      <p:sp>
+        <p:nvSpPr>
+          <p:cNvPr id="29" name="Double flèche horizontale 28"/>
+          <p:cNvSpPr/>
+          <p:nvPr/>
+        </p:nvSpPr>
+        <p:spPr>
+          <a:xfrm rot="5400000">
+            <a:off x="2288189" y="2578142"/>
+            <a:ext cx="690855" cy="299697"/>
+          </a:xfrm>
+          <a:prstGeom prst="leftRightArrow">
+            <a:avLst/>
+          </a:prstGeom>
+          <a:solidFill>
+            <a:schemeClr val="tx2">
+              <a:lumMod val="20000"/>
+              <a:lumOff val="80000"/>
+            </a:schemeClr>
+          </a:solidFill>
+          <a:ln>
+            <a:solidFill>
+              <a:schemeClr val="tx2"/>
+            </a:solidFill>
+          </a:ln>
+        </p:spPr>
+        <p:style>
+          <a:lnRef idx="2">
+            <a:schemeClr val="accent1">
+              <a:shade val="50000"/>
+            </a:schemeClr>
+          </a:lnRef>
+          <a:fillRef idx="1">
+            <a:schemeClr val="accent1"/>
+          </a:fillRef>
+          <a:effectRef idx="0">
+            <a:schemeClr val="accent1"/>
+          </a:effectRef>
+          <a:fontRef idx="minor">
+            <a:schemeClr val="lt1"/>
+          </a:fontRef>
+        </p:style>
+        <p:txBody>
+          <a:bodyPr rtlCol="0" anchor="ctr"/>
+          <a:lstStyle/>
+          <a:p>
+            <a:pPr algn="ctr"/>
+            <a:endParaRPr lang="fr-FR" sz="1400"/>
+          </a:p>
+        </p:txBody>
+      </p:sp>
+      <p:sp>
+        <p:nvSpPr>
+          <p:cNvPr id="30" name="Rectangle à coins arrondis 29"/>
+          <p:cNvSpPr/>
+          <p:nvPr/>
+        </p:nvSpPr>
+        <p:spPr>
+          <a:xfrm>
+            <a:off x="6061020" y="2866852"/>
+            <a:ext cx="1118508" cy="533102"/>
+          </a:xfrm>
+          <a:prstGeom prst="roundRect">
+            <a:avLst/>
+          </a:prstGeom>
+          <a:solidFill>
+            <a:schemeClr val="bg1"/>
+          </a:solidFill>
+          <a:ln>
+            <a:solidFill>
+              <a:schemeClr val="accent3">
+                <a:lumMod val="75000"/>
+              </a:schemeClr>
+            </a:solidFill>
+          </a:ln>
+        </p:spPr>
+        <p:style>
+          <a:lnRef idx="2">
+            <a:schemeClr val="accent1">
+              <a:shade val="50000"/>
+            </a:schemeClr>
+          </a:lnRef>
+          <a:fillRef idx="1">
+            <a:schemeClr val="accent1"/>
+          </a:fillRef>
+          <a:effectRef idx="0">
+            <a:schemeClr val="accent1"/>
+          </a:effectRef>
+          <a:fontRef idx="minor">
+            <a:schemeClr val="lt1"/>
+          </a:fontRef>
+        </p:style>
+        <p:txBody>
+          <a:bodyPr rtlCol="0" anchor="ctr"/>
+          <a:lstStyle/>
+          <a:p>
+            <a:pPr algn="ctr"/>
+            <a:r>
+              <a:rPr lang="en-US" sz="1100" dirty="0" smtClean="0">
+                <a:solidFill>
+                  <a:schemeClr val="tx1"/>
+                </a:solidFill>
+              </a:rPr>
+              <a:t>Safety</a:t>
+            </a:r>
+            <a:endParaRPr lang="en-US" sz="1100" dirty="0">
+              <a:solidFill>
+                <a:schemeClr val="tx1"/>
+              </a:solidFill>
+            </a:endParaRPr>
+          </a:p>
+        </p:txBody>
+      </p:sp>
+      <p:sp>
+        <p:nvSpPr>
+          <p:cNvPr id="31" name="Rectangle à coins arrondis 30"/>
+          <p:cNvSpPr/>
+          <p:nvPr/>
+        </p:nvSpPr>
+        <p:spPr>
+          <a:xfrm>
+            <a:off x="6061020" y="3478922"/>
+            <a:ext cx="1140187" cy="733122"/>
+          </a:xfrm>
+          <a:prstGeom prst="roundRect">
+            <a:avLst/>
+          </a:prstGeom>
+          <a:solidFill>
+            <a:schemeClr val="bg1"/>
+          </a:solidFill>
+          <a:ln>
+            <a:solidFill>
+              <a:schemeClr val="accent3">
+                <a:lumMod val="75000"/>
+              </a:schemeClr>
+            </a:solidFill>
+          </a:ln>
+        </p:spPr>
+        <p:style>
+          <a:lnRef idx="2">
+            <a:schemeClr val="accent1">
+              <a:shade val="50000"/>
+            </a:schemeClr>
+          </a:lnRef>
+          <a:fillRef idx="1">
+            <a:schemeClr val="accent1"/>
+          </a:fillRef>
+          <a:effectRef idx="0">
+            <a:schemeClr val="accent1"/>
+          </a:effectRef>
+          <a:fontRef idx="minor">
+            <a:schemeClr val="lt1"/>
+          </a:fontRef>
+        </p:style>
+        <p:txBody>
+          <a:bodyPr rtlCol="0" anchor="ctr"/>
+          <a:lstStyle/>
+          <a:p>
+            <a:pPr algn="ctr"/>
+            <a:r>
+              <a:rPr lang="en-US" sz="1100" dirty="0" smtClean="0">
+                <a:solidFill>
+                  <a:schemeClr val="tx1"/>
+                </a:solidFill>
+              </a:rPr>
+              <a:t>Validation </a:t>
+            </a:r>
+          </a:p>
+          <a:p>
+            <a:pPr algn="ctr"/>
+            <a:r>
+              <a:rPr lang="en-US" sz="1100" dirty="0" smtClean="0">
+                <a:solidFill>
+                  <a:schemeClr val="tx1"/>
+                </a:solidFill>
+              </a:rPr>
+              <a:t>(EFS, </a:t>
+            </a:r>
+            <a:r>
+              <a:rPr lang="en-US" sz="1100" dirty="0" err="1" smtClean="0">
+                <a:solidFill>
+                  <a:schemeClr val="tx1"/>
+                </a:solidFill>
+              </a:rPr>
+              <a:t>FramaC</a:t>
+            </a:r>
+            <a:r>
+              <a:rPr lang="en-US" sz="1100" dirty="0" smtClean="0">
+                <a:solidFill>
+                  <a:schemeClr val="tx1"/>
+                </a:solidFill>
+              </a:rPr>
+              <a:t>, </a:t>
+            </a:r>
+            <a:r>
+              <a:rPr lang="en-US" sz="1100" dirty="0" err="1" smtClean="0">
+                <a:solidFill>
+                  <a:schemeClr val="tx1"/>
+                </a:solidFill>
+              </a:rPr>
+              <a:t>SystemC</a:t>
+            </a:r>
+            <a:r>
+              <a:rPr lang="en-US" sz="1100" dirty="0" smtClean="0">
+                <a:solidFill>
+                  <a:schemeClr val="tx1"/>
+                </a:solidFill>
+              </a:rPr>
+              <a:t>, RT-Tester…)</a:t>
+            </a:r>
+            <a:endParaRPr lang="en-US" sz="1100" dirty="0">
+              <a:solidFill>
+                <a:schemeClr val="tx1"/>
+              </a:solidFill>
+            </a:endParaRPr>
+          </a:p>
+        </p:txBody>
+      </p:sp>
+      <p:sp>
+        <p:nvSpPr>
+          <p:cNvPr id="32" name="Rectangle à coins arrondis 31"/>
+          <p:cNvSpPr/>
+          <p:nvPr/>
+        </p:nvSpPr>
+        <p:spPr>
+          <a:xfrm>
+            <a:off x="6061020" y="4287511"/>
+            <a:ext cx="1140186" cy="869681"/>
+          </a:xfrm>
+          <a:prstGeom prst="roundRect">
+            <a:avLst/>
+          </a:prstGeom>
+          <a:solidFill>
+            <a:schemeClr val="bg1"/>
+          </a:solidFill>
+          <a:ln>
+            <a:solidFill>
+              <a:schemeClr val="accent3">
+                <a:lumMod val="75000"/>
+              </a:schemeClr>
+            </a:solidFill>
+          </a:ln>
+        </p:spPr>
+        <p:style>
+          <a:lnRef idx="2">
+            <a:schemeClr val="accent1">
+              <a:shade val="50000"/>
+            </a:schemeClr>
+          </a:lnRef>
+          <a:fillRef idx="1">
+            <a:schemeClr val="accent1"/>
+          </a:fillRef>
+          <a:effectRef idx="0">
+            <a:schemeClr val="accent1"/>
+          </a:effectRef>
+          <a:fontRef idx="minor">
+            <a:schemeClr val="lt1"/>
+          </a:fontRef>
+        </p:style>
+        <p:txBody>
+          <a:bodyPr rtlCol="0" anchor="ctr"/>
+          <a:lstStyle/>
+          <a:p>
+            <a:pPr algn="ctr"/>
+            <a:r>
+              <a:rPr lang="en-US" sz="1100" dirty="0" smtClean="0">
+                <a:solidFill>
+                  <a:schemeClr val="tx1"/>
+                </a:solidFill>
+              </a:rPr>
+              <a:t>Verification</a:t>
+            </a:r>
+          </a:p>
+          <a:p>
+            <a:pPr algn="ctr"/>
+            <a:r>
+              <a:rPr lang="en-US" sz="1100" dirty="0" smtClean="0">
+                <a:solidFill>
+                  <a:schemeClr val="tx1"/>
+                </a:solidFill>
+              </a:rPr>
+              <a:t>(</a:t>
+            </a:r>
+            <a:r>
+              <a:rPr lang="en-US" sz="1100" dirty="0" err="1" smtClean="0">
+                <a:solidFill>
+                  <a:schemeClr val="tx1"/>
+                </a:solidFill>
+              </a:rPr>
+              <a:t>FramaC</a:t>
+            </a:r>
+            <a:r>
+              <a:rPr lang="en-US" sz="1100" dirty="0">
+                <a:solidFill>
+                  <a:schemeClr val="tx1"/>
+                </a:solidFill>
+              </a:rPr>
+              <a:t>, </a:t>
+            </a:r>
+            <a:r>
+              <a:rPr lang="en-US" sz="1100" dirty="0" err="1">
+                <a:solidFill>
+                  <a:schemeClr val="tx1"/>
+                </a:solidFill>
+              </a:rPr>
+              <a:t>SystemC</a:t>
+            </a:r>
+            <a:r>
+              <a:rPr lang="en-US" sz="1100" dirty="0">
+                <a:solidFill>
+                  <a:schemeClr val="tx1"/>
+                </a:solidFill>
+              </a:rPr>
+              <a:t>, RT-Tester</a:t>
+            </a:r>
+            <a:r>
+              <a:rPr lang="en-US" sz="1100" dirty="0" smtClean="0">
+                <a:solidFill>
+                  <a:schemeClr val="tx1"/>
+                </a:solidFill>
+              </a:rPr>
+              <a:t>…)</a:t>
+            </a:r>
+            <a:endParaRPr lang="en-US" sz="1100" dirty="0">
+              <a:solidFill>
+                <a:schemeClr val="tx1"/>
+              </a:solidFill>
+            </a:endParaRPr>
+          </a:p>
+        </p:txBody>
+      </p:sp>
+      <p:sp>
+        <p:nvSpPr>
+          <p:cNvPr id="33" name="Rectangle à coins arrondis 32"/>
+          <p:cNvSpPr/>
+          <p:nvPr/>
+        </p:nvSpPr>
+        <p:spPr>
+          <a:xfrm>
+            <a:off x="6061020" y="5229200"/>
+            <a:ext cx="1140186" cy="533102"/>
+          </a:xfrm>
+          <a:prstGeom prst="roundRect">
+            <a:avLst/>
+          </a:prstGeom>
+          <a:solidFill>
+            <a:schemeClr val="bg1"/>
+          </a:solidFill>
+          <a:ln>
+            <a:solidFill>
+              <a:schemeClr val="accent3">
+                <a:lumMod val="75000"/>
+              </a:schemeClr>
+            </a:solidFill>
+          </a:ln>
+        </p:spPr>
+        <p:style>
+          <a:lnRef idx="2">
+            <a:schemeClr val="accent1">
+              <a:shade val="50000"/>
+            </a:schemeClr>
+          </a:lnRef>
+          <a:fillRef idx="1">
+            <a:schemeClr val="accent1"/>
+          </a:fillRef>
+          <a:effectRef idx="0">
+            <a:schemeClr val="accent1"/>
+          </a:effectRef>
+          <a:fontRef idx="minor">
+            <a:schemeClr val="lt1"/>
+          </a:fontRef>
+        </p:style>
+        <p:txBody>
+          <a:bodyPr rtlCol="0" anchor="ctr"/>
+          <a:lstStyle/>
+          <a:p>
+            <a:pPr algn="ctr"/>
+            <a:r>
+              <a:rPr lang="en-US" sz="1100" dirty="0" smtClean="0">
+                <a:solidFill>
+                  <a:schemeClr val="tx1"/>
+                </a:solidFill>
+              </a:rPr>
+              <a:t>Internal</a:t>
+            </a:r>
+            <a:br>
+              <a:rPr lang="en-US" sz="1100" dirty="0" smtClean="0">
+                <a:solidFill>
+                  <a:schemeClr val="tx1"/>
+                </a:solidFill>
+              </a:rPr>
+            </a:br>
+            <a:r>
+              <a:rPr lang="en-US" sz="1100" dirty="0" smtClean="0">
+                <a:solidFill>
+                  <a:schemeClr val="tx1"/>
+                </a:solidFill>
+              </a:rPr>
+              <a:t>Assessment</a:t>
+            </a:r>
+            <a:endParaRPr lang="en-US" sz="1100" dirty="0">
+              <a:solidFill>
+                <a:schemeClr val="tx1"/>
+              </a:solidFill>
+            </a:endParaRPr>
+          </a:p>
+        </p:txBody>
+      </p:sp>
+      <p:sp>
+        <p:nvSpPr>
+          <p:cNvPr id="38" name="Rectangle à coins arrondis 37"/>
+          <p:cNvSpPr/>
+          <p:nvPr/>
+        </p:nvSpPr>
+        <p:spPr>
+          <a:xfrm>
+            <a:off x="7524328" y="3284984"/>
+            <a:ext cx="1209665" cy="2330828"/>
+          </a:xfrm>
+          <a:prstGeom prst="roundRect">
+            <a:avLst/>
+          </a:prstGeom>
+          <a:solidFill>
+            <a:schemeClr val="bg1"/>
+          </a:solidFill>
+          <a:ln>
+            <a:solidFill>
+              <a:schemeClr val="accent4"/>
+            </a:solidFill>
+          </a:ln>
+        </p:spPr>
+        <p:style>
+          <a:lnRef idx="2">
+            <a:schemeClr val="accent1">
+              <a:shade val="50000"/>
+            </a:schemeClr>
+          </a:lnRef>
+          <a:fillRef idx="1">
+            <a:schemeClr val="accent1"/>
+          </a:fillRef>
+          <a:effectRef idx="0">
+            <a:schemeClr val="accent1"/>
+          </a:effectRef>
+          <a:fontRef idx="minor">
+            <a:schemeClr val="lt1"/>
+          </a:fontRef>
+        </p:style>
+        <p:txBody>
+          <a:bodyPr rtlCol="0" anchor="ctr"/>
+          <a:lstStyle/>
+          <a:p>
+            <a:pPr algn="ctr"/>
+            <a:r>
+              <a:rPr lang="en-US" sz="1100" dirty="0" smtClean="0">
+                <a:solidFill>
+                  <a:schemeClr val="tx1"/>
+                </a:solidFill>
+              </a:rPr>
+              <a:t>Demonstrator</a:t>
+            </a:r>
+            <a:endParaRPr lang="en-US" sz="1100" dirty="0">
+              <a:solidFill>
+                <a:schemeClr val="tx1"/>
+              </a:solidFill>
+            </a:endParaRPr>
+          </a:p>
+        </p:txBody>
+      </p:sp>
+      <p:sp>
+        <p:nvSpPr>
+          <p:cNvPr id="61" name="Flèche droite 60"/>
+          <p:cNvSpPr/>
+          <p:nvPr/>
+        </p:nvSpPr>
+        <p:spPr>
+          <a:xfrm rot="2700000">
+            <a:off x="6787374" y="2516841"/>
+            <a:ext cx="1245432" cy="299697"/>
+          </a:xfrm>
+          <a:prstGeom prst="rightArrow">
+            <a:avLst/>
+          </a:prstGeom>
+          <a:solidFill>
+            <a:schemeClr val="accent4">
+              <a:lumMod val="20000"/>
+              <a:lumOff val="80000"/>
+            </a:schemeClr>
+          </a:solidFill>
+          <a:ln>
+            <a:solidFill>
+              <a:schemeClr val="accent4">
+                <a:lumMod val="75000"/>
+              </a:schemeClr>
+            </a:solidFill>
+          </a:ln>
+        </p:spPr>
+        <p:style>
+          <a:lnRef idx="2">
+            <a:schemeClr val="accent1">
+              <a:shade val="50000"/>
+            </a:schemeClr>
+          </a:lnRef>
+          <a:fillRef idx="1">
+            <a:schemeClr val="accent1"/>
+          </a:fillRef>
+          <a:effectRef idx="0">
+            <a:schemeClr val="accent1"/>
+          </a:effectRef>
+          <a:fontRef idx="minor">
+            <a:schemeClr val="lt1"/>
+          </a:fontRef>
+        </p:style>
+        <p:txBody>
+          <a:bodyPr rtlCol="0" anchor="ctr"/>
+          <a:lstStyle/>
+          <a:p>
+            <a:pPr algn="ctr"/>
+            <a:endParaRPr lang="fr-FR" sz="1400"/>
+          </a:p>
+        </p:txBody>
+      </p:sp>
+      <p:sp>
+        <p:nvSpPr>
+          <p:cNvPr id="68" name="Rectangle 67"/>
+          <p:cNvSpPr/>
+          <p:nvPr/>
+        </p:nvSpPr>
+        <p:spPr>
+          <a:xfrm>
+            <a:off x="496552" y="332657"/>
+            <a:ext cx="1366751" cy="823596"/>
+          </a:xfrm>
+          <a:prstGeom prst="rect">
+            <a:avLst/>
+          </a:prstGeom>
+          <a:noFill/>
+          <a:ln>
+            <a:solidFill>
+              <a:schemeClr val="accent6">
+                <a:lumMod val="75000"/>
+              </a:schemeClr>
+            </a:solidFill>
+          </a:ln>
+        </p:spPr>
+        <p:style>
+          <a:lnRef idx="2">
+            <a:schemeClr val="accent1">
+              <a:shade val="50000"/>
+            </a:schemeClr>
+          </a:lnRef>
+          <a:fillRef idx="1">
+            <a:schemeClr val="accent1"/>
+          </a:fillRef>
+          <a:effectRef idx="0">
+            <a:schemeClr val="accent1"/>
+          </a:effectRef>
+          <a:fontRef idx="minor">
+            <a:schemeClr val="lt1"/>
+          </a:fontRef>
+        </p:style>
+        <p:txBody>
+          <a:bodyPr rtlCol="0" anchor="ctr"/>
+          <a:lstStyle/>
+          <a:p>
+            <a:pPr algn="ctr"/>
+            <a:r>
+              <a:rPr lang="en-US" sz="1100" dirty="0">
+                <a:solidFill>
+                  <a:schemeClr val="tx1"/>
+                </a:solidFill>
+              </a:rPr>
+              <a:t>Inputs</a:t>
+            </a:r>
+          </a:p>
+          <a:p>
+            <a:pPr algn="ctr"/>
+            <a:r>
+              <a:rPr lang="en-US" sz="1100" dirty="0" smtClean="0">
+                <a:solidFill>
+                  <a:schemeClr val="tx1"/>
+                </a:solidFill>
+              </a:rPr>
+              <a:t>SRS, Rail Knowledge,</a:t>
+            </a:r>
+          </a:p>
+          <a:p>
+            <a:pPr algn="ctr"/>
+            <a:r>
+              <a:rPr lang="en-US" sz="1100" dirty="0" smtClean="0">
+                <a:solidFill>
+                  <a:schemeClr val="tx1"/>
+                </a:solidFill>
+              </a:rPr>
+              <a:t>EFS content,…</a:t>
+            </a:r>
+            <a:endParaRPr lang="en-US" sz="1100" dirty="0">
+              <a:solidFill>
+                <a:schemeClr val="tx1"/>
+              </a:solidFill>
+            </a:endParaRPr>
+          </a:p>
+        </p:txBody>
+      </p:sp>
+      <p:sp>
+        <p:nvSpPr>
+          <p:cNvPr id="63" name="ZoneTexte 62"/>
+          <p:cNvSpPr txBox="1"/>
+          <p:nvPr/>
+        </p:nvSpPr>
+        <p:spPr>
+          <a:xfrm>
+            <a:off x="3636318" y="6305830"/>
+            <a:ext cx="1693532" cy="523220"/>
+          </a:xfrm>
+          <a:prstGeom prst="rect">
+            <a:avLst/>
+          </a:prstGeom>
+          <a:noFill/>
+        </p:spPr>
+        <p:txBody>
+          <a:bodyPr wrap="square" rtlCol="0">
+            <a:spAutoFit/>
+          </a:bodyPr>
+          <a:lstStyle/>
+          <a:p>
+            <a:pPr algn="ctr"/>
+            <a:r>
+              <a:rPr lang="en-US" sz="1400" dirty="0" smtClean="0"/>
+              <a:t>WP3 EFS based modeling</a:t>
+            </a:r>
+            <a:endParaRPr lang="en-US" sz="1400" dirty="0" smtClean="0"/>
+          </a:p>
+        </p:txBody>
+      </p:sp>
+      <p:grpSp>
+        <p:nvGrpSpPr>
+          <p:cNvPr id="2" name="Groupe 1"/>
+          <p:cNvGrpSpPr/>
+          <p:nvPr/>
+        </p:nvGrpSpPr>
+        <p:grpSpPr>
+          <a:xfrm>
+            <a:off x="5497029" y="2276874"/>
+            <a:ext cx="515131" cy="3372547"/>
+            <a:chOff x="5497029" y="2276873"/>
+            <a:chExt cx="515131" cy="3566728"/>
+          </a:xfrm>
+        </p:grpSpPr>
+        <p:sp>
+          <p:nvSpPr>
+            <p:cNvPr id="34" name="Flèche angle droit à deux pointes 33"/>
+            <p:cNvSpPr/>
+            <p:nvPr/>
+          </p:nvSpPr>
+          <p:spPr>
+            <a:xfrm rot="5400000">
+              <a:off x="5196741" y="2577163"/>
+              <a:ext cx="1115707" cy="515130"/>
+            </a:xfrm>
+            <a:prstGeom prst="leftUpArrow">
+              <a:avLst>
+                <a:gd name="adj1" fmla="val 25000"/>
+                <a:gd name="adj2" fmla="val 25000"/>
+                <a:gd name="adj3" fmla="val 29142"/>
+              </a:avLst>
+            </a:prstGeom>
+            <a:solidFill>
+              <a:schemeClr val="accent3">
+                <a:lumMod val="20000"/>
+                <a:lumOff val="80000"/>
+              </a:schemeClr>
+            </a:solidFill>
+            <a:ln>
+              <a:solidFill>
+                <a:schemeClr val="accent3">
+                  <a:lumMod val="75000"/>
+                </a:schemeClr>
+              </a:solidFill>
+            </a:ln>
+          </p:spPr>
+          <p:style>
+            <a:lnRef idx="2">
+              <a:schemeClr val="accent1">
+                <a:shade val="50000"/>
+              </a:schemeClr>
+            </a:lnRef>
+            <a:fillRef idx="1">
+              <a:schemeClr val="accent1"/>
+            </a:fillRef>
+            <a:effectRef idx="0">
+              <a:schemeClr val="accent1"/>
+            </a:effectRef>
+            <a:fontRef idx="minor">
+              <a:schemeClr val="lt1"/>
+            </a:fontRef>
+          </p:style>
+          <p:txBody>
+            <a:bodyPr rtlCol="0" anchor="ctr"/>
+            <a:lstStyle/>
+            <a:p>
+              <a:pPr algn="ctr"/>
+              <a:endParaRPr lang="fr-FR" sz="1400"/>
+            </a:p>
+          </p:txBody>
+        </p:sp>
+        <p:sp>
+          <p:nvSpPr>
+            <p:cNvPr id="65" name="Flèche angle droit à deux pointes 64"/>
+            <p:cNvSpPr/>
+            <p:nvPr/>
+          </p:nvSpPr>
+          <p:spPr>
+            <a:xfrm rot="5400000">
+              <a:off x="4808410" y="2965493"/>
+              <a:ext cx="1892369" cy="515130"/>
+            </a:xfrm>
+            <a:prstGeom prst="leftUpArrow">
+              <a:avLst>
+                <a:gd name="adj1" fmla="val 25000"/>
+                <a:gd name="adj2" fmla="val 25000"/>
+                <a:gd name="adj3" fmla="val 29142"/>
+              </a:avLst>
+            </a:prstGeom>
+            <a:solidFill>
+              <a:schemeClr val="accent3">
+                <a:lumMod val="20000"/>
+                <a:lumOff val="80000"/>
+              </a:schemeClr>
+            </a:solidFill>
+            <a:ln>
+              <a:solidFill>
+                <a:schemeClr val="accent3">
+                  <a:lumMod val="75000"/>
+                </a:schemeClr>
+              </a:solidFill>
+            </a:ln>
+          </p:spPr>
+          <p:style>
+            <a:lnRef idx="2">
+              <a:schemeClr val="accent1">
+                <a:shade val="50000"/>
+              </a:schemeClr>
+            </a:lnRef>
+            <a:fillRef idx="1">
+              <a:schemeClr val="accent1"/>
+            </a:fillRef>
+            <a:effectRef idx="0">
+              <a:schemeClr val="accent1"/>
+            </a:effectRef>
+            <a:fontRef idx="minor">
+              <a:schemeClr val="lt1"/>
+            </a:fontRef>
+          </p:style>
+          <p:txBody>
+            <a:bodyPr rtlCol="0" anchor="ctr"/>
+            <a:lstStyle/>
+            <a:p>
+              <a:pPr algn="ctr"/>
+              <a:endParaRPr lang="fr-FR" sz="1400"/>
+            </a:p>
+          </p:txBody>
+        </p:sp>
+        <p:sp>
+          <p:nvSpPr>
+            <p:cNvPr id="66" name="Flèche angle droit à deux pointes 65"/>
+            <p:cNvSpPr/>
+            <p:nvPr/>
+          </p:nvSpPr>
+          <p:spPr>
+            <a:xfrm rot="5400000">
+              <a:off x="4312064" y="3461839"/>
+              <a:ext cx="2885062" cy="515130"/>
+            </a:xfrm>
+            <a:prstGeom prst="leftUpArrow">
+              <a:avLst>
+                <a:gd name="adj1" fmla="val 25000"/>
+                <a:gd name="adj2" fmla="val 25000"/>
+                <a:gd name="adj3" fmla="val 29142"/>
+              </a:avLst>
+            </a:prstGeom>
+            <a:solidFill>
+              <a:schemeClr val="accent3">
+                <a:lumMod val="20000"/>
+                <a:lumOff val="80000"/>
+              </a:schemeClr>
+            </a:solidFill>
+            <a:ln>
+              <a:solidFill>
+                <a:schemeClr val="accent3">
+                  <a:lumMod val="75000"/>
+                </a:schemeClr>
+              </a:solidFill>
+            </a:ln>
+          </p:spPr>
+          <p:style>
+            <a:lnRef idx="2">
+              <a:schemeClr val="accent1">
+                <a:shade val="50000"/>
+              </a:schemeClr>
+            </a:lnRef>
+            <a:fillRef idx="1">
+              <a:schemeClr val="accent1"/>
+            </a:fillRef>
+            <a:effectRef idx="0">
+              <a:schemeClr val="accent1"/>
+            </a:effectRef>
+            <a:fontRef idx="minor">
+              <a:schemeClr val="lt1"/>
+            </a:fontRef>
+          </p:style>
+          <p:txBody>
+            <a:bodyPr rtlCol="0" anchor="ctr"/>
+            <a:lstStyle/>
+            <a:p>
+              <a:pPr algn="ctr"/>
+              <a:endParaRPr lang="fr-FR" sz="1400"/>
+            </a:p>
+          </p:txBody>
+        </p:sp>
+        <p:sp>
+          <p:nvSpPr>
+            <p:cNvPr id="67" name="Flèche angle droit à deux pointes 66"/>
+            <p:cNvSpPr/>
+            <p:nvPr/>
+          </p:nvSpPr>
+          <p:spPr>
+            <a:xfrm rot="5400000">
+              <a:off x="3971230" y="3802672"/>
+              <a:ext cx="3566728" cy="515130"/>
+            </a:xfrm>
+            <a:prstGeom prst="leftUpArrow">
+              <a:avLst>
+                <a:gd name="adj1" fmla="val 25000"/>
+                <a:gd name="adj2" fmla="val 25000"/>
+                <a:gd name="adj3" fmla="val 29142"/>
+              </a:avLst>
+            </a:prstGeom>
+            <a:solidFill>
+              <a:schemeClr val="accent3">
+                <a:lumMod val="20000"/>
+                <a:lumOff val="80000"/>
+              </a:schemeClr>
+            </a:solidFill>
+            <a:ln>
+              <a:solidFill>
+                <a:schemeClr val="accent3">
+                  <a:lumMod val="75000"/>
+                </a:schemeClr>
+              </a:solidFill>
+            </a:ln>
+          </p:spPr>
+          <p:style>
+            <a:lnRef idx="2">
+              <a:schemeClr val="accent1">
+                <a:shade val="50000"/>
+              </a:schemeClr>
+            </a:lnRef>
+            <a:fillRef idx="1">
+              <a:schemeClr val="accent1"/>
+            </a:fillRef>
+            <a:effectRef idx="0">
+              <a:schemeClr val="accent1"/>
+            </a:effectRef>
+            <a:fontRef idx="minor">
+              <a:schemeClr val="lt1"/>
+            </a:fontRef>
+          </p:style>
+          <p:txBody>
+            <a:bodyPr rtlCol="0" anchor="ctr"/>
+            <a:lstStyle/>
+            <a:p>
+              <a:pPr algn="ctr"/>
+              <a:endParaRPr lang="fr-FR" sz="1400"/>
+            </a:p>
+          </p:txBody>
+        </p:sp>
+      </p:grpSp>
+      <p:sp>
+        <p:nvSpPr>
+          <p:cNvPr id="74" name="Double flèche horizontale 73"/>
+          <p:cNvSpPr/>
+          <p:nvPr/>
+        </p:nvSpPr>
+        <p:spPr>
+          <a:xfrm rot="5400000">
+            <a:off x="4150369" y="2579778"/>
+            <a:ext cx="687580" cy="299697"/>
+          </a:xfrm>
+          <a:prstGeom prst="leftRightArrow">
+            <a:avLst/>
+          </a:prstGeom>
+          <a:solidFill>
+            <a:schemeClr val="tx2">
+              <a:lumMod val="20000"/>
+              <a:lumOff val="80000"/>
+            </a:schemeClr>
+          </a:solidFill>
+          <a:ln>
+            <a:solidFill>
+              <a:schemeClr val="tx2"/>
+            </a:solidFill>
+          </a:ln>
+        </p:spPr>
+        <p:style>
+          <a:lnRef idx="2">
+            <a:schemeClr val="accent1">
+              <a:shade val="50000"/>
+            </a:schemeClr>
+          </a:lnRef>
+          <a:fillRef idx="1">
+            <a:schemeClr val="accent1"/>
+          </a:fillRef>
+          <a:effectRef idx="0">
+            <a:schemeClr val="accent1"/>
+          </a:effectRef>
+          <a:fontRef idx="minor">
+            <a:schemeClr val="lt1"/>
+          </a:fontRef>
+        </p:style>
+        <p:txBody>
+          <a:bodyPr rtlCol="0" anchor="ctr"/>
+          <a:lstStyle/>
+          <a:p>
+            <a:pPr algn="ctr"/>
+            <a:endParaRPr lang="fr-FR" sz="1400"/>
+          </a:p>
+        </p:txBody>
+      </p:sp>
+      <p:sp>
+        <p:nvSpPr>
+          <p:cNvPr id="84" name="Rectangle à coins arrondis 83"/>
+          <p:cNvSpPr/>
+          <p:nvPr/>
+        </p:nvSpPr>
+        <p:spPr>
+          <a:xfrm>
+            <a:off x="6228184" y="3672840"/>
+            <a:ext cx="302418" cy="196257"/>
+          </a:xfrm>
+          <a:prstGeom prst="roundRect">
+            <a:avLst/>
+          </a:prstGeom>
+          <a:noFill/>
+          <a:ln>
+            <a:solidFill>
+              <a:schemeClr val="accent3">
+                <a:lumMod val="75000"/>
+              </a:schemeClr>
+            </a:solidFill>
+          </a:ln>
+        </p:spPr>
+        <p:style>
+          <a:lnRef idx="2">
+            <a:schemeClr val="accent1">
+              <a:shade val="50000"/>
+            </a:schemeClr>
+          </a:lnRef>
+          <a:fillRef idx="1">
+            <a:schemeClr val="accent1"/>
+          </a:fillRef>
+          <a:effectRef idx="0">
+            <a:schemeClr val="accent1"/>
+          </a:effectRef>
+          <a:fontRef idx="minor">
+            <a:schemeClr val="lt1"/>
+          </a:fontRef>
+        </p:style>
+        <p:txBody>
+          <a:bodyPr rtlCol="0" anchor="ctr"/>
+          <a:lstStyle/>
+          <a:p>
+            <a:pPr algn="ctr"/>
+            <a:endParaRPr lang="en-US" sz="1100" dirty="0">
+              <a:solidFill>
+                <a:schemeClr val="tx1"/>
+              </a:solidFill>
+            </a:endParaRPr>
+          </a:p>
+        </p:txBody>
+      </p:sp>
+      <p:cxnSp>
+        <p:nvCxnSpPr>
+          <p:cNvPr id="4" name="Connecteur droit 3"/>
+          <p:cNvCxnSpPr/>
+          <p:nvPr/>
+        </p:nvCxnSpPr>
+        <p:spPr>
+          <a:xfrm>
+            <a:off x="5143500" y="3261360"/>
+            <a:ext cx="1097280" cy="411480"/>
+          </a:xfrm>
+          <a:prstGeom prst="line">
+            <a:avLst/>
+          </a:prstGeom>
+          <a:ln w="19050">
+            <a:solidFill>
+              <a:schemeClr val="accent3">
+                <a:lumMod val="75000"/>
+              </a:schemeClr>
+            </a:solidFill>
+            <a:prstDash val="sysDash"/>
+          </a:ln>
+        </p:spPr>
+        <p:style>
+          <a:lnRef idx="1">
+            <a:schemeClr val="accent1"/>
+          </a:lnRef>
+          <a:fillRef idx="0">
+            <a:schemeClr val="accent1"/>
+          </a:fillRef>
+          <a:effectRef idx="0">
+            <a:schemeClr val="accent1"/>
+          </a:effectRef>
+          <a:fontRef idx="minor">
+            <a:schemeClr val="tx1"/>
+          </a:fontRef>
+        </p:style>
+      </p:cxnSp>
+      <p:cxnSp>
+        <p:nvCxnSpPr>
+          <p:cNvPr id="86" name="Connecteur droit 85"/>
+          <p:cNvCxnSpPr/>
+          <p:nvPr/>
+        </p:nvCxnSpPr>
+        <p:spPr>
+          <a:xfrm flipV="1">
+            <a:off x="5320215" y="3855720"/>
+            <a:ext cx="920565" cy="2255520"/>
+          </a:xfrm>
+          <a:prstGeom prst="line">
+            <a:avLst/>
+          </a:prstGeom>
+          <a:ln w="19050">
+            <a:solidFill>
+              <a:schemeClr val="accent3">
+                <a:lumMod val="75000"/>
+              </a:schemeClr>
+            </a:solidFill>
+            <a:prstDash val="sysDash"/>
+          </a:ln>
+        </p:spPr>
+        <p:style>
+          <a:lnRef idx="1">
+            <a:schemeClr val="accent1"/>
+          </a:lnRef>
+          <a:fillRef idx="0">
+            <a:schemeClr val="accent1"/>
+          </a:fillRef>
+          <a:effectRef idx="0">
+            <a:schemeClr val="accent1"/>
+          </a:effectRef>
+          <a:fontRef idx="minor">
+            <a:schemeClr val="tx1"/>
+          </a:fontRef>
+        </p:style>
+      </p:cxnSp>
+      <p:sp>
+        <p:nvSpPr>
+          <p:cNvPr id="91" name="Flèche à angle droit 90"/>
+          <p:cNvSpPr/>
+          <p:nvPr/>
+        </p:nvSpPr>
+        <p:spPr>
+          <a:xfrm>
+            <a:off x="1115616" y="2276872"/>
+            <a:ext cx="4638979" cy="3831664"/>
+          </a:xfrm>
+          <a:prstGeom prst="bentUpArrow">
+            <a:avLst>
+              <a:gd name="adj1" fmla="val 3757"/>
+              <a:gd name="adj2" fmla="val 3402"/>
+              <a:gd name="adj3" fmla="val 4157"/>
+            </a:avLst>
+          </a:prstGeom>
+          <a:solidFill>
+            <a:schemeClr val="accent3">
+              <a:lumMod val="20000"/>
+              <a:lumOff val="80000"/>
+            </a:schemeClr>
+          </a:solidFill>
+          <a:ln>
+            <a:solidFill>
+              <a:schemeClr val="accent3">
+                <a:lumMod val="75000"/>
+              </a:schemeClr>
+            </a:solidFill>
+          </a:ln>
+        </p:spPr>
+        <p:style>
+          <a:lnRef idx="2">
+            <a:schemeClr val="accent1">
+              <a:shade val="50000"/>
+            </a:schemeClr>
+          </a:lnRef>
+          <a:fillRef idx="1">
+            <a:schemeClr val="accent1"/>
+          </a:fillRef>
+          <a:effectRef idx="0">
+            <a:schemeClr val="accent1"/>
+          </a:effectRef>
+          <a:fontRef idx="minor">
+            <a:schemeClr val="lt1"/>
+          </a:fontRef>
+        </p:style>
+        <p:txBody>
+          <a:bodyPr rtlCol="0" anchor="ctr"/>
+          <a:lstStyle/>
+          <a:p>
+            <a:pPr algn="ctr"/>
+            <a:endParaRPr lang="fr-FR" sz="1400" dirty="0"/>
+          </a:p>
+        </p:txBody>
+      </p:sp>
+      <p:sp>
+        <p:nvSpPr>
+          <p:cNvPr id="85" name="Rectangle à coins arrondis 84"/>
+          <p:cNvSpPr/>
+          <p:nvPr/>
+        </p:nvSpPr>
+        <p:spPr>
+          <a:xfrm>
+            <a:off x="3594368" y="3246443"/>
+            <a:ext cx="1725847" cy="3123877"/>
+          </a:xfrm>
+          <a:prstGeom prst="roundRect">
+            <a:avLst/>
+          </a:prstGeom>
+          <a:noFill/>
+          <a:ln>
+            <a:solidFill>
+              <a:schemeClr val="accent3">
+                <a:lumMod val="75000"/>
+              </a:schemeClr>
+            </a:solidFill>
+          </a:ln>
+        </p:spPr>
+        <p:style>
+          <a:lnRef idx="2">
+            <a:schemeClr val="accent1">
+              <a:shade val="50000"/>
+            </a:schemeClr>
+          </a:lnRef>
+          <a:fillRef idx="1">
+            <a:schemeClr val="accent1"/>
+          </a:fillRef>
+          <a:effectRef idx="0">
+            <a:schemeClr val="accent1"/>
+          </a:effectRef>
+          <a:fontRef idx="minor">
+            <a:schemeClr val="lt1"/>
+          </a:fontRef>
+        </p:style>
+        <p:txBody>
+          <a:bodyPr rtlCol="0" anchor="ctr"/>
+          <a:lstStyle/>
+          <a:p>
+            <a:pPr algn="ctr"/>
+            <a:endParaRPr lang="en-US" sz="1100" dirty="0">
+              <a:solidFill>
+                <a:schemeClr val="tx1"/>
+              </a:solidFill>
+            </a:endParaRPr>
+          </a:p>
+        </p:txBody>
+      </p:sp>
+      <p:grpSp>
+        <p:nvGrpSpPr>
+          <p:cNvPr id="50" name="Groupe 49"/>
+          <p:cNvGrpSpPr/>
+          <p:nvPr/>
+        </p:nvGrpSpPr>
+        <p:grpSpPr>
+          <a:xfrm>
+            <a:off x="61870" y="3324885"/>
+            <a:ext cx="1512082" cy="2975610"/>
+            <a:chOff x="251520" y="2910741"/>
+            <a:chExt cx="1800200" cy="3542595"/>
+          </a:xfrm>
+        </p:grpSpPr>
+        <p:sp>
+          <p:nvSpPr>
+            <p:cNvPr id="8" name="Cylindre 7"/>
+            <p:cNvSpPr/>
+            <p:nvPr/>
+          </p:nvSpPr>
+          <p:spPr>
+            <a:xfrm>
+              <a:off x="682007" y="3889328"/>
+              <a:ext cx="939226" cy="632122"/>
+            </a:xfrm>
+            <a:prstGeom prst="can">
+              <a:avLst>
+                <a:gd name="adj" fmla="val 17342"/>
+              </a:avLst>
+            </a:prstGeom>
+            <a:solidFill>
+              <a:schemeClr val="bg1"/>
+            </a:solidFill>
+          </p:spPr>
+          <p:style>
+            <a:lnRef idx="2">
+              <a:schemeClr val="accent1">
+                <a:shade val="50000"/>
+              </a:schemeClr>
+            </a:lnRef>
+            <a:fillRef idx="1">
+              <a:schemeClr val="accent1"/>
+            </a:fillRef>
+            <a:effectRef idx="0">
+              <a:schemeClr val="accent1"/>
+            </a:effectRef>
+            <a:fontRef idx="minor">
+              <a:schemeClr val="lt1"/>
+            </a:fontRef>
+          </p:style>
+          <p:txBody>
+            <a:bodyPr rtlCol="0" anchor="ctr"/>
+            <a:lstStyle/>
+            <a:p>
+              <a:pPr algn="ctr"/>
+              <a:r>
+                <a:rPr lang="fr-FR" sz="1100" dirty="0" smtClean="0">
+                  <a:solidFill>
+                    <a:schemeClr val="tx1"/>
+                  </a:solidFill>
+                </a:rPr>
+                <a:t>OSS Code</a:t>
+              </a:r>
+            </a:p>
+            <a:p>
+              <a:pPr algn="ctr"/>
+              <a:r>
+                <a:rPr lang="fr-FR" sz="1100" dirty="0" smtClean="0">
+                  <a:solidFill>
+                    <a:schemeClr val="tx1"/>
+                  </a:solidFill>
+                </a:rPr>
+                <a:t>Model</a:t>
+              </a:r>
+            </a:p>
+          </p:txBody>
+        </p:sp>
+        <p:sp>
+          <p:nvSpPr>
+            <p:cNvPr id="9" name="Ellipse 8"/>
+            <p:cNvSpPr/>
+            <p:nvPr/>
+          </p:nvSpPr>
+          <p:spPr>
+            <a:xfrm>
+              <a:off x="251520" y="2910741"/>
+              <a:ext cx="1800200" cy="689870"/>
+            </a:xfrm>
+            <a:prstGeom prst="ellipse">
+              <a:avLst/>
+            </a:prstGeom>
+            <a:solidFill>
+              <a:schemeClr val="bg1"/>
+            </a:solidFill>
+            <a:ln>
+              <a:solidFill>
+                <a:schemeClr val="tx2"/>
+              </a:solidFill>
+            </a:ln>
+          </p:spPr>
+          <p:style>
+            <a:lnRef idx="2">
+              <a:schemeClr val="accent1">
+                <a:shade val="50000"/>
+              </a:schemeClr>
+            </a:lnRef>
+            <a:fillRef idx="1">
+              <a:schemeClr val="accent1"/>
+            </a:fillRef>
+            <a:effectRef idx="0">
+              <a:schemeClr val="accent1"/>
+            </a:effectRef>
+            <a:fontRef idx="minor">
+              <a:schemeClr val="lt1"/>
+            </a:fontRef>
+          </p:style>
+          <p:txBody>
+            <a:bodyPr rtlCol="0" anchor="ctr"/>
+            <a:lstStyle/>
+            <a:p>
+              <a:pPr algn="ctr"/>
+              <a:r>
+                <a:rPr lang="en-US" sz="1100" dirty="0">
+                  <a:solidFill>
+                    <a:schemeClr val="tx1"/>
+                  </a:solidFill>
+                </a:rPr>
+                <a:t>Design </a:t>
+              </a:r>
+              <a:r>
+                <a:rPr lang="en-US" sz="1100" dirty="0" smtClean="0">
+                  <a:solidFill>
+                    <a:schemeClr val="tx1"/>
+                  </a:solidFill>
+                </a:rPr>
+                <a:t>of OSS Code Spec. (B,EFS)</a:t>
+              </a:r>
+              <a:endParaRPr lang="en-US" sz="1100" dirty="0">
+                <a:solidFill>
+                  <a:schemeClr val="tx1"/>
+                </a:solidFill>
+              </a:endParaRPr>
+            </a:p>
+          </p:txBody>
+        </p:sp>
+        <p:sp>
+          <p:nvSpPr>
+            <p:cNvPr id="48" name="Flèche droite 47"/>
+            <p:cNvSpPr/>
+            <p:nvPr/>
+          </p:nvSpPr>
+          <p:spPr>
+            <a:xfrm rot="5400000">
+              <a:off x="491546" y="5065087"/>
+              <a:ext cx="1320149" cy="356803"/>
+            </a:xfrm>
+            <a:prstGeom prst="rightArrow">
+              <a:avLst/>
+            </a:prstGeom>
+            <a:solidFill>
+              <a:schemeClr val="tx2">
+                <a:lumMod val="20000"/>
+                <a:lumOff val="80000"/>
+              </a:schemeClr>
+            </a:solidFill>
+            <a:ln>
+              <a:solidFill>
+                <a:schemeClr val="tx2"/>
+              </a:solidFill>
+            </a:ln>
+          </p:spPr>
+          <p:style>
+            <a:lnRef idx="2">
+              <a:schemeClr val="accent1">
+                <a:shade val="50000"/>
+              </a:schemeClr>
+            </a:lnRef>
+            <a:fillRef idx="1">
+              <a:schemeClr val="accent1"/>
+            </a:fillRef>
+            <a:effectRef idx="0">
+              <a:schemeClr val="accent1"/>
+            </a:effectRef>
+            <a:fontRef idx="minor">
+              <a:schemeClr val="lt1"/>
+            </a:fontRef>
+          </p:style>
+          <p:txBody>
+            <a:bodyPr rtlCol="0" anchor="ctr"/>
+            <a:lstStyle/>
+            <a:p>
+              <a:pPr algn="ctr"/>
+              <a:endParaRPr lang="fr-FR" sz="1400"/>
+            </a:p>
+          </p:txBody>
+        </p:sp>
+        <p:grpSp>
+          <p:nvGrpSpPr>
+            <p:cNvPr id="43" name="Groupe 42"/>
+            <p:cNvGrpSpPr/>
+            <p:nvPr/>
+          </p:nvGrpSpPr>
+          <p:grpSpPr>
+            <a:xfrm>
+              <a:off x="754016" y="4837762"/>
+              <a:ext cx="795209" cy="795209"/>
+              <a:chOff x="789027" y="5072792"/>
+              <a:chExt cx="696178" cy="696178"/>
+            </a:xfrm>
+          </p:grpSpPr>
+          <p:sp>
+            <p:nvSpPr>
+              <p:cNvPr id="39" name="Ellipse 38"/>
+              <p:cNvSpPr/>
+              <p:nvPr/>
+            </p:nvSpPr>
+            <p:spPr>
+              <a:xfrm>
+                <a:off x="789027" y="5072792"/>
+                <a:ext cx="696178" cy="696178"/>
+              </a:xfrm>
+              <a:prstGeom prst="ellipse">
+                <a:avLst/>
+              </a:prstGeom>
+              <a:solidFill>
+                <a:schemeClr val="bg1"/>
+              </a:solidFill>
+            </p:spPr>
+            <p:style>
+              <a:lnRef idx="2">
+                <a:schemeClr val="accent1">
+                  <a:shade val="50000"/>
+                </a:schemeClr>
+              </a:lnRef>
+              <a:fillRef idx="1">
+                <a:schemeClr val="accent1"/>
+              </a:fillRef>
+              <a:effectRef idx="0">
+                <a:schemeClr val="accent1"/>
+              </a:effectRef>
+              <a:fontRef idx="minor">
+                <a:schemeClr val="lt1"/>
+              </a:fontRef>
+            </p:style>
+            <p:txBody>
+              <a:bodyPr rtlCol="0" anchor="ctr"/>
+              <a:lstStyle/>
+              <a:p>
+                <a:pPr algn="ctr"/>
+                <a:endParaRPr lang="en-US" sz="1100" dirty="0">
+                  <a:solidFill>
+                    <a:schemeClr val="tx1"/>
+                  </a:solidFill>
+                </a:endParaRPr>
+              </a:p>
+            </p:txBody>
+          </p:sp>
+          <p:sp>
+            <p:nvSpPr>
+              <p:cNvPr id="41" name="Rectangle 40"/>
+              <p:cNvSpPr/>
+              <p:nvPr/>
+            </p:nvSpPr>
+            <p:spPr>
+              <a:xfrm>
+                <a:off x="789027" y="5098246"/>
+                <a:ext cx="696178" cy="525423"/>
+              </a:xfrm>
+              <a:prstGeom prst="rect">
+                <a:avLst/>
+              </a:prstGeom>
+            </p:spPr>
+            <p:txBody>
+              <a:bodyPr wrap="square">
+                <a:spAutoFit/>
+              </a:bodyPr>
+              <a:lstStyle/>
+              <a:p>
+                <a:pPr algn="ctr"/>
+                <a:r>
+                  <a:rPr lang="en-US" sz="1100" dirty="0" smtClean="0"/>
+                  <a:t>OSS</a:t>
+                </a:r>
+              </a:p>
+              <a:p>
+                <a:pPr algn="ctr"/>
+                <a:r>
+                  <a:rPr lang="en-US" sz="1100" dirty="0" smtClean="0"/>
+                  <a:t>Code</a:t>
+                </a:r>
+              </a:p>
+              <a:p>
+                <a:pPr algn="ctr"/>
+                <a:r>
+                  <a:rPr lang="en-US" sz="1100" dirty="0" smtClean="0"/>
+                  <a:t>Gen.</a:t>
+                </a:r>
+                <a:endParaRPr lang="en-US" sz="1100" dirty="0"/>
+              </a:p>
+            </p:txBody>
+          </p:sp>
+        </p:grpSp>
+        <p:sp>
+          <p:nvSpPr>
+            <p:cNvPr id="46" name="Rectangle 45"/>
+            <p:cNvSpPr/>
+            <p:nvPr/>
+          </p:nvSpPr>
+          <p:spPr>
+            <a:xfrm>
+              <a:off x="682008" y="5949282"/>
+              <a:ext cx="939225" cy="504054"/>
+            </a:xfrm>
+            <a:prstGeom prst="rect">
+              <a:avLst/>
+            </a:prstGeom>
+            <a:solidFill>
+              <a:schemeClr val="bg1"/>
+            </a:solidFill>
+          </p:spPr>
+          <p:style>
+            <a:lnRef idx="2">
+              <a:schemeClr val="accent1">
+                <a:shade val="50000"/>
+              </a:schemeClr>
+            </a:lnRef>
+            <a:fillRef idx="1">
+              <a:schemeClr val="accent1"/>
+            </a:fillRef>
+            <a:effectRef idx="0">
+              <a:schemeClr val="accent1"/>
+            </a:effectRef>
+            <a:fontRef idx="minor">
+              <a:schemeClr val="lt1"/>
+            </a:fontRef>
+          </p:style>
+          <p:txBody>
+            <a:bodyPr rtlCol="0" anchor="ctr"/>
+            <a:lstStyle/>
+            <a:p>
+              <a:pPr algn="ctr"/>
+              <a:r>
+                <a:rPr lang="fr-FR" sz="1100" dirty="0" smtClean="0">
+                  <a:solidFill>
+                    <a:schemeClr val="tx1"/>
+                  </a:solidFill>
+                </a:rPr>
+                <a:t>Code SIL4</a:t>
+              </a:r>
+              <a:endParaRPr lang="fr-FR" sz="1100" dirty="0">
+                <a:solidFill>
+                  <a:schemeClr val="tx1"/>
+                </a:solidFill>
+              </a:endParaRPr>
+            </a:p>
+            <a:p>
+              <a:pPr algn="ctr"/>
+              <a:r>
+                <a:rPr lang="fr-FR" sz="1100" dirty="0">
+                  <a:solidFill>
+                    <a:schemeClr val="tx1"/>
+                  </a:solidFill>
+                </a:rPr>
+                <a:t>C,ADA,…</a:t>
+              </a:r>
+            </a:p>
+          </p:txBody>
+        </p:sp>
+        <p:sp>
+          <p:nvSpPr>
+            <p:cNvPr id="47" name="Flèche droite 46"/>
+            <p:cNvSpPr/>
+            <p:nvPr/>
+          </p:nvSpPr>
+          <p:spPr>
+            <a:xfrm rot="5400000">
+              <a:off x="987395" y="3606381"/>
+              <a:ext cx="328450" cy="356803"/>
+            </a:xfrm>
+            <a:prstGeom prst="rightArrow">
+              <a:avLst/>
+            </a:prstGeom>
+            <a:solidFill>
+              <a:schemeClr val="tx2">
+                <a:lumMod val="20000"/>
+                <a:lumOff val="80000"/>
+              </a:schemeClr>
+            </a:solidFill>
+            <a:ln>
+              <a:solidFill>
+                <a:schemeClr val="tx2"/>
+              </a:solidFill>
+            </a:ln>
+          </p:spPr>
+          <p:style>
+            <a:lnRef idx="2">
+              <a:schemeClr val="accent1">
+                <a:shade val="50000"/>
+              </a:schemeClr>
+            </a:lnRef>
+            <a:fillRef idx="1">
+              <a:schemeClr val="accent1"/>
+            </a:fillRef>
+            <a:effectRef idx="0">
+              <a:schemeClr val="accent1"/>
+            </a:effectRef>
+            <a:fontRef idx="minor">
+              <a:schemeClr val="lt1"/>
+            </a:fontRef>
+          </p:style>
+          <p:txBody>
+            <a:bodyPr rtlCol="0" anchor="ctr"/>
+            <a:lstStyle/>
+            <a:p>
+              <a:pPr algn="ctr"/>
+              <a:endParaRPr lang="fr-FR" sz="1400"/>
+            </a:p>
+          </p:txBody>
+        </p:sp>
+      </p:grpSp>
+      <p:grpSp>
+        <p:nvGrpSpPr>
+          <p:cNvPr id="51" name="Groupe 50"/>
+          <p:cNvGrpSpPr/>
+          <p:nvPr/>
+        </p:nvGrpSpPr>
+        <p:grpSpPr>
+          <a:xfrm>
+            <a:off x="1907704" y="3331285"/>
+            <a:ext cx="1484022" cy="2970233"/>
+            <a:chOff x="268223" y="2917142"/>
+            <a:chExt cx="1766794" cy="3536194"/>
+          </a:xfrm>
+        </p:grpSpPr>
+        <p:sp>
+          <p:nvSpPr>
+            <p:cNvPr id="52" name="Cylindre 51"/>
+            <p:cNvSpPr/>
+            <p:nvPr/>
+          </p:nvSpPr>
+          <p:spPr>
+            <a:xfrm>
+              <a:off x="611560" y="3889328"/>
+              <a:ext cx="1080120" cy="632122"/>
+            </a:xfrm>
+            <a:prstGeom prst="can">
+              <a:avLst>
+                <a:gd name="adj" fmla="val 17342"/>
+              </a:avLst>
+            </a:prstGeom>
+            <a:solidFill>
+              <a:schemeClr val="bg1"/>
+            </a:solidFill>
+          </p:spPr>
+          <p:style>
+            <a:lnRef idx="2">
+              <a:schemeClr val="accent1">
+                <a:shade val="50000"/>
+              </a:schemeClr>
+            </a:lnRef>
+            <a:fillRef idx="1">
+              <a:schemeClr val="accent1"/>
+            </a:fillRef>
+            <a:effectRef idx="0">
+              <a:schemeClr val="accent1"/>
+            </a:effectRef>
+            <a:fontRef idx="minor">
+              <a:schemeClr val="lt1"/>
+            </a:fontRef>
+          </p:style>
+          <p:txBody>
+            <a:bodyPr rtlCol="0" anchor="ctr"/>
+            <a:lstStyle/>
+            <a:p>
+              <a:pPr algn="ctr"/>
+              <a:r>
+                <a:rPr lang="fr-FR" sz="1100" dirty="0" err="1" smtClean="0">
+                  <a:solidFill>
+                    <a:schemeClr val="tx1"/>
+                  </a:solidFill>
+                </a:rPr>
+                <a:t>Scade</a:t>
+              </a:r>
+              <a:r>
+                <a:rPr lang="fr-FR" sz="1100" dirty="0" smtClean="0">
+                  <a:solidFill>
+                    <a:schemeClr val="tx1"/>
+                  </a:solidFill>
+                </a:rPr>
+                <a:t> Code</a:t>
+              </a:r>
+            </a:p>
+            <a:p>
+              <a:pPr algn="ctr"/>
+              <a:r>
+                <a:rPr lang="fr-FR" sz="1100" dirty="0" smtClean="0">
+                  <a:solidFill>
+                    <a:schemeClr val="tx1"/>
+                  </a:solidFill>
+                </a:rPr>
+                <a:t>Model</a:t>
+              </a:r>
+            </a:p>
+          </p:txBody>
+        </p:sp>
+        <p:sp>
+          <p:nvSpPr>
+            <p:cNvPr id="53" name="Ellipse 52"/>
+            <p:cNvSpPr/>
+            <p:nvPr/>
+          </p:nvSpPr>
+          <p:spPr>
+            <a:xfrm>
+              <a:off x="268223" y="2917142"/>
+              <a:ext cx="1766794" cy="677068"/>
+            </a:xfrm>
+            <a:prstGeom prst="ellipse">
+              <a:avLst/>
+            </a:prstGeom>
+            <a:solidFill>
+              <a:schemeClr val="bg1"/>
+            </a:solidFill>
+            <a:ln>
+              <a:solidFill>
+                <a:schemeClr val="tx2"/>
+              </a:solidFill>
+            </a:ln>
+          </p:spPr>
+          <p:style>
+            <a:lnRef idx="2">
+              <a:schemeClr val="accent1">
+                <a:shade val="50000"/>
+              </a:schemeClr>
+            </a:lnRef>
+            <a:fillRef idx="1">
+              <a:schemeClr val="accent1"/>
+            </a:fillRef>
+            <a:effectRef idx="0">
+              <a:schemeClr val="accent1"/>
+            </a:effectRef>
+            <a:fontRef idx="minor">
+              <a:schemeClr val="lt1"/>
+            </a:fontRef>
+          </p:style>
+          <p:txBody>
+            <a:bodyPr rtlCol="0" anchor="ctr"/>
+            <a:lstStyle/>
+            <a:p>
+              <a:pPr algn="ctr"/>
+              <a:r>
+                <a:rPr lang="en-US" sz="1100" dirty="0">
+                  <a:solidFill>
+                    <a:schemeClr val="tx1"/>
+                  </a:solidFill>
+                </a:rPr>
+                <a:t>Design </a:t>
+              </a:r>
+              <a:r>
+                <a:rPr lang="en-US" sz="1100" dirty="0" smtClean="0">
+                  <a:solidFill>
+                    <a:schemeClr val="tx1"/>
+                  </a:solidFill>
+                </a:rPr>
+                <a:t>of </a:t>
+              </a:r>
+              <a:r>
+                <a:rPr lang="en-US" sz="1100" dirty="0" err="1" smtClean="0">
+                  <a:solidFill>
+                    <a:schemeClr val="tx1"/>
+                  </a:solidFill>
+                </a:rPr>
+                <a:t>Scade</a:t>
+              </a:r>
+              <a:r>
+                <a:rPr lang="en-US" sz="1100" dirty="0" smtClean="0">
+                  <a:solidFill>
+                    <a:schemeClr val="tx1"/>
+                  </a:solidFill>
+                </a:rPr>
+                <a:t> Code Spec.</a:t>
+              </a:r>
+              <a:endParaRPr lang="en-US" sz="1100" dirty="0">
+                <a:solidFill>
+                  <a:schemeClr val="tx1"/>
+                </a:solidFill>
+              </a:endParaRPr>
+            </a:p>
+          </p:txBody>
+        </p:sp>
+        <p:sp>
+          <p:nvSpPr>
+            <p:cNvPr id="54" name="Flèche droite 53"/>
+            <p:cNvSpPr/>
+            <p:nvPr/>
+          </p:nvSpPr>
+          <p:spPr>
+            <a:xfrm rot="5400000">
+              <a:off x="491546" y="5065087"/>
+              <a:ext cx="1320149" cy="356803"/>
+            </a:xfrm>
+            <a:prstGeom prst="rightArrow">
+              <a:avLst/>
+            </a:prstGeom>
+            <a:solidFill>
+              <a:schemeClr val="tx2">
+                <a:lumMod val="20000"/>
+                <a:lumOff val="80000"/>
+              </a:schemeClr>
+            </a:solidFill>
+            <a:ln>
+              <a:solidFill>
+                <a:schemeClr val="tx2"/>
+              </a:solidFill>
+            </a:ln>
+          </p:spPr>
+          <p:style>
+            <a:lnRef idx="2">
+              <a:schemeClr val="accent1">
+                <a:shade val="50000"/>
+              </a:schemeClr>
+            </a:lnRef>
+            <a:fillRef idx="1">
+              <a:schemeClr val="accent1"/>
+            </a:fillRef>
+            <a:effectRef idx="0">
+              <a:schemeClr val="accent1"/>
+            </a:effectRef>
+            <a:fontRef idx="minor">
+              <a:schemeClr val="lt1"/>
+            </a:fontRef>
+          </p:style>
+          <p:txBody>
+            <a:bodyPr rtlCol="0" anchor="ctr"/>
+            <a:lstStyle/>
+            <a:p>
+              <a:pPr algn="ctr"/>
+              <a:endParaRPr lang="fr-FR" sz="1400"/>
+            </a:p>
+          </p:txBody>
+        </p:sp>
+        <p:grpSp>
+          <p:nvGrpSpPr>
+            <p:cNvPr id="55" name="Groupe 54"/>
+            <p:cNvGrpSpPr/>
+            <p:nvPr/>
+          </p:nvGrpSpPr>
+          <p:grpSpPr>
+            <a:xfrm>
+              <a:off x="754016" y="4837762"/>
+              <a:ext cx="795209" cy="795209"/>
+              <a:chOff x="789027" y="5072792"/>
+              <a:chExt cx="696178" cy="696178"/>
+            </a:xfrm>
+          </p:grpSpPr>
+          <p:sp>
+            <p:nvSpPr>
+              <p:cNvPr id="58" name="Ellipse 57"/>
+              <p:cNvSpPr/>
+              <p:nvPr/>
+            </p:nvSpPr>
+            <p:spPr>
+              <a:xfrm>
+                <a:off x="789027" y="5072792"/>
+                <a:ext cx="696178" cy="696178"/>
+              </a:xfrm>
+              <a:prstGeom prst="ellipse">
+                <a:avLst/>
+              </a:prstGeom>
+              <a:solidFill>
+                <a:schemeClr val="bg1"/>
+              </a:solidFill>
+            </p:spPr>
+            <p:style>
+              <a:lnRef idx="2">
+                <a:schemeClr val="accent1">
+                  <a:shade val="50000"/>
+                </a:schemeClr>
+              </a:lnRef>
+              <a:fillRef idx="1">
+                <a:schemeClr val="accent1"/>
+              </a:fillRef>
+              <a:effectRef idx="0">
+                <a:schemeClr val="accent1"/>
+              </a:effectRef>
+              <a:fontRef idx="minor">
+                <a:schemeClr val="lt1"/>
+              </a:fontRef>
+            </p:style>
+            <p:txBody>
+              <a:bodyPr rtlCol="0" anchor="ctr"/>
+              <a:lstStyle/>
+              <a:p>
+                <a:pPr algn="ctr"/>
+                <a:endParaRPr lang="en-US" sz="1100" dirty="0">
+                  <a:solidFill>
+                    <a:schemeClr val="tx1"/>
+                  </a:solidFill>
+                </a:endParaRPr>
+              </a:p>
+            </p:txBody>
+          </p:sp>
+          <p:sp>
+            <p:nvSpPr>
+              <p:cNvPr id="59" name="Rectangle 58"/>
+              <p:cNvSpPr/>
+              <p:nvPr/>
+            </p:nvSpPr>
+            <p:spPr>
+              <a:xfrm>
+                <a:off x="789027" y="5098246"/>
+                <a:ext cx="696178" cy="525423"/>
+              </a:xfrm>
+              <a:prstGeom prst="rect">
+                <a:avLst/>
+              </a:prstGeom>
+            </p:spPr>
+            <p:txBody>
+              <a:bodyPr wrap="square">
+                <a:spAutoFit/>
+              </a:bodyPr>
+              <a:lstStyle/>
+              <a:p>
+                <a:pPr algn="ctr"/>
+                <a:r>
+                  <a:rPr lang="en-US" sz="1100" dirty="0" err="1" smtClean="0"/>
+                  <a:t>Scade</a:t>
+                </a:r>
+                <a:endParaRPr lang="en-US" sz="1100" dirty="0" smtClean="0"/>
+              </a:p>
+              <a:p>
+                <a:pPr algn="ctr"/>
+                <a:r>
+                  <a:rPr lang="en-US" sz="1100" dirty="0" smtClean="0"/>
+                  <a:t>Code</a:t>
+                </a:r>
+              </a:p>
+              <a:p>
+                <a:pPr algn="ctr"/>
+                <a:r>
+                  <a:rPr lang="en-US" sz="1100" dirty="0" smtClean="0"/>
+                  <a:t>Gen.</a:t>
+                </a:r>
+                <a:endParaRPr lang="en-US" sz="1100" dirty="0"/>
+              </a:p>
+            </p:txBody>
+          </p:sp>
+        </p:grpSp>
+        <p:sp>
+          <p:nvSpPr>
+            <p:cNvPr id="56" name="Rectangle 55"/>
+            <p:cNvSpPr/>
+            <p:nvPr/>
+          </p:nvSpPr>
+          <p:spPr>
+            <a:xfrm>
+              <a:off x="682008" y="5949282"/>
+              <a:ext cx="939225" cy="504054"/>
+            </a:xfrm>
+            <a:prstGeom prst="rect">
+              <a:avLst/>
+            </a:prstGeom>
+            <a:solidFill>
+              <a:schemeClr val="bg1"/>
+            </a:solidFill>
+          </p:spPr>
+          <p:style>
+            <a:lnRef idx="2">
+              <a:schemeClr val="accent1">
+                <a:shade val="50000"/>
+              </a:schemeClr>
+            </a:lnRef>
+            <a:fillRef idx="1">
+              <a:schemeClr val="accent1"/>
+            </a:fillRef>
+            <a:effectRef idx="0">
+              <a:schemeClr val="accent1"/>
+            </a:effectRef>
+            <a:fontRef idx="minor">
+              <a:schemeClr val="lt1"/>
+            </a:fontRef>
+          </p:style>
+          <p:txBody>
+            <a:bodyPr rtlCol="0" anchor="ctr"/>
+            <a:lstStyle/>
+            <a:p>
+              <a:pPr algn="ctr"/>
+              <a:r>
+                <a:rPr lang="fr-FR" sz="1100" dirty="0" smtClean="0">
+                  <a:solidFill>
+                    <a:schemeClr val="tx1"/>
+                  </a:solidFill>
+                </a:rPr>
+                <a:t>Code SIL4</a:t>
+              </a:r>
+              <a:endParaRPr lang="fr-FR" sz="1100" dirty="0">
+                <a:solidFill>
+                  <a:schemeClr val="tx1"/>
+                </a:solidFill>
+              </a:endParaRPr>
+            </a:p>
+            <a:p>
+              <a:pPr algn="ctr"/>
+              <a:r>
+                <a:rPr lang="fr-FR" sz="1100" dirty="0">
+                  <a:solidFill>
+                    <a:schemeClr val="tx1"/>
+                  </a:solidFill>
+                </a:rPr>
+                <a:t>C,ADA,…</a:t>
+              </a:r>
+            </a:p>
+          </p:txBody>
+        </p:sp>
+        <p:sp>
+          <p:nvSpPr>
+            <p:cNvPr id="57" name="Flèche droite 56"/>
+            <p:cNvSpPr/>
+            <p:nvPr/>
+          </p:nvSpPr>
+          <p:spPr>
+            <a:xfrm rot="5400000">
+              <a:off x="987395" y="3606381"/>
+              <a:ext cx="328450" cy="356803"/>
+            </a:xfrm>
+            <a:prstGeom prst="rightArrow">
+              <a:avLst/>
+            </a:prstGeom>
+            <a:solidFill>
+              <a:schemeClr val="tx2">
+                <a:lumMod val="20000"/>
+                <a:lumOff val="80000"/>
+              </a:schemeClr>
+            </a:solidFill>
+            <a:ln>
+              <a:solidFill>
+                <a:schemeClr val="tx2"/>
+              </a:solidFill>
+            </a:ln>
+          </p:spPr>
+          <p:style>
+            <a:lnRef idx="2">
+              <a:schemeClr val="accent1">
+                <a:shade val="50000"/>
+              </a:schemeClr>
+            </a:lnRef>
+            <a:fillRef idx="1">
+              <a:schemeClr val="accent1"/>
+            </a:fillRef>
+            <a:effectRef idx="0">
+              <a:schemeClr val="accent1"/>
+            </a:effectRef>
+            <a:fontRef idx="minor">
+              <a:schemeClr val="lt1"/>
+            </a:fontRef>
+          </p:style>
+          <p:txBody>
+            <a:bodyPr rtlCol="0" anchor="ctr"/>
+            <a:lstStyle/>
+            <a:p>
+              <a:pPr algn="ctr"/>
+              <a:endParaRPr lang="fr-FR" sz="1400"/>
+            </a:p>
+          </p:txBody>
+        </p:sp>
+      </p:grpSp>
+      <p:grpSp>
+        <p:nvGrpSpPr>
+          <p:cNvPr id="75" name="Groupe 74"/>
+          <p:cNvGrpSpPr/>
+          <p:nvPr/>
+        </p:nvGrpSpPr>
+        <p:grpSpPr>
+          <a:xfrm>
+            <a:off x="3736050" y="3339087"/>
+            <a:ext cx="1484022" cy="2970233"/>
+            <a:chOff x="268223" y="2917142"/>
+            <a:chExt cx="1766794" cy="3536194"/>
+          </a:xfrm>
+        </p:grpSpPr>
+        <p:sp>
+          <p:nvSpPr>
+            <p:cNvPr id="76" name="Cylindre 75"/>
+            <p:cNvSpPr/>
+            <p:nvPr/>
+          </p:nvSpPr>
+          <p:spPr>
+            <a:xfrm>
+              <a:off x="611561" y="3889329"/>
+              <a:ext cx="1080120" cy="684796"/>
+            </a:xfrm>
+            <a:prstGeom prst="can">
+              <a:avLst>
+                <a:gd name="adj" fmla="val 17342"/>
+              </a:avLst>
+            </a:prstGeom>
+            <a:solidFill>
+              <a:schemeClr val="bg1"/>
+            </a:solidFill>
+          </p:spPr>
+          <p:style>
+            <a:lnRef idx="2">
+              <a:schemeClr val="accent1">
+                <a:shade val="50000"/>
+              </a:schemeClr>
+            </a:lnRef>
+            <a:fillRef idx="1">
+              <a:schemeClr val="accent1"/>
+            </a:fillRef>
+            <a:effectRef idx="0">
+              <a:schemeClr val="accent1"/>
+            </a:effectRef>
+            <a:fontRef idx="minor">
+              <a:schemeClr val="lt1"/>
+            </a:fontRef>
+          </p:style>
+          <p:txBody>
+            <a:bodyPr rtlCol="0" anchor="ctr"/>
+            <a:lstStyle/>
+            <a:p>
+              <a:pPr algn="ctr"/>
+              <a:r>
+                <a:rPr lang="fr-FR" sz="1100" dirty="0" smtClean="0">
+                  <a:solidFill>
+                    <a:schemeClr val="tx1"/>
+                  </a:solidFill>
+                </a:rPr>
+                <a:t>EFS Code</a:t>
+              </a:r>
+            </a:p>
+            <a:p>
+              <a:pPr algn="ctr"/>
+              <a:r>
+                <a:rPr lang="fr-FR" sz="1100" dirty="0" smtClean="0">
+                  <a:solidFill>
+                    <a:schemeClr val="tx1"/>
+                  </a:solidFill>
+                </a:rPr>
+                <a:t>Semi-</a:t>
+              </a:r>
+              <a:r>
+                <a:rPr lang="fr-FR" sz="1100" dirty="0" err="1">
+                  <a:solidFill>
+                    <a:schemeClr val="tx1"/>
+                  </a:solidFill>
+                </a:rPr>
+                <a:t>f</a:t>
+              </a:r>
+              <a:r>
+                <a:rPr lang="fr-FR" sz="1100" dirty="0" err="1" smtClean="0">
+                  <a:solidFill>
+                    <a:schemeClr val="tx1"/>
+                  </a:solidFill>
+                </a:rPr>
+                <a:t>ormal</a:t>
+              </a:r>
+              <a:r>
+                <a:rPr lang="fr-FR" sz="1100" dirty="0" smtClean="0">
+                  <a:solidFill>
+                    <a:schemeClr val="tx1"/>
+                  </a:solidFill>
+                </a:rPr>
+                <a:t> Model</a:t>
+              </a:r>
+            </a:p>
+          </p:txBody>
+        </p:sp>
+        <p:sp>
+          <p:nvSpPr>
+            <p:cNvPr id="77" name="Ellipse 76"/>
+            <p:cNvSpPr/>
+            <p:nvPr/>
+          </p:nvSpPr>
+          <p:spPr>
+            <a:xfrm>
+              <a:off x="268223" y="2917142"/>
+              <a:ext cx="1766794" cy="677068"/>
+            </a:xfrm>
+            <a:prstGeom prst="ellipse">
+              <a:avLst/>
+            </a:prstGeom>
+            <a:solidFill>
+              <a:schemeClr val="bg1"/>
+            </a:solidFill>
+            <a:ln>
+              <a:solidFill>
+                <a:schemeClr val="tx2"/>
+              </a:solidFill>
+            </a:ln>
+          </p:spPr>
+          <p:style>
+            <a:lnRef idx="2">
+              <a:schemeClr val="accent1">
+                <a:shade val="50000"/>
+              </a:schemeClr>
+            </a:lnRef>
+            <a:fillRef idx="1">
+              <a:schemeClr val="accent1"/>
+            </a:fillRef>
+            <a:effectRef idx="0">
+              <a:schemeClr val="accent1"/>
+            </a:effectRef>
+            <a:fontRef idx="minor">
+              <a:schemeClr val="lt1"/>
+            </a:fontRef>
+          </p:style>
+          <p:txBody>
+            <a:bodyPr rtlCol="0" anchor="ctr"/>
+            <a:lstStyle/>
+            <a:p>
+              <a:pPr algn="ctr"/>
+              <a:r>
+                <a:rPr lang="en-US" sz="1100" dirty="0">
+                  <a:solidFill>
+                    <a:schemeClr val="tx1"/>
+                  </a:solidFill>
+                </a:rPr>
+                <a:t>Design </a:t>
+              </a:r>
+              <a:r>
+                <a:rPr lang="en-US" sz="1100" dirty="0" smtClean="0">
+                  <a:solidFill>
+                    <a:schemeClr val="tx1"/>
+                  </a:solidFill>
+                </a:rPr>
+                <a:t>of EFS Code Spec.</a:t>
+              </a:r>
+              <a:endParaRPr lang="en-US" sz="1100" dirty="0">
+                <a:solidFill>
+                  <a:schemeClr val="tx1"/>
+                </a:solidFill>
+              </a:endParaRPr>
+            </a:p>
+          </p:txBody>
+        </p:sp>
+        <p:sp>
+          <p:nvSpPr>
+            <p:cNvPr id="78" name="Flèche droite 77"/>
+            <p:cNvSpPr/>
+            <p:nvPr/>
+          </p:nvSpPr>
+          <p:spPr>
+            <a:xfrm rot="5400000">
+              <a:off x="527605" y="5101146"/>
+              <a:ext cx="1248032" cy="356803"/>
+            </a:xfrm>
+            <a:prstGeom prst="rightArrow">
+              <a:avLst/>
+            </a:prstGeom>
+            <a:solidFill>
+              <a:schemeClr val="tx2">
+                <a:lumMod val="20000"/>
+                <a:lumOff val="80000"/>
+              </a:schemeClr>
+            </a:solidFill>
+            <a:ln>
+              <a:solidFill>
+                <a:schemeClr val="tx2"/>
+              </a:solidFill>
+            </a:ln>
+          </p:spPr>
+          <p:style>
+            <a:lnRef idx="2">
+              <a:schemeClr val="accent1">
+                <a:shade val="50000"/>
+              </a:schemeClr>
+            </a:lnRef>
+            <a:fillRef idx="1">
+              <a:schemeClr val="accent1"/>
+            </a:fillRef>
+            <a:effectRef idx="0">
+              <a:schemeClr val="accent1"/>
+            </a:effectRef>
+            <a:fontRef idx="minor">
+              <a:schemeClr val="lt1"/>
+            </a:fontRef>
+          </p:style>
+          <p:txBody>
+            <a:bodyPr rtlCol="0" anchor="ctr"/>
+            <a:lstStyle/>
+            <a:p>
+              <a:pPr algn="ctr"/>
+              <a:endParaRPr lang="fr-FR" sz="1400"/>
+            </a:p>
+          </p:txBody>
+        </p:sp>
+        <p:grpSp>
+          <p:nvGrpSpPr>
+            <p:cNvPr id="79" name="Groupe 78"/>
+            <p:cNvGrpSpPr/>
+            <p:nvPr/>
+          </p:nvGrpSpPr>
+          <p:grpSpPr>
+            <a:xfrm>
+              <a:off x="754016" y="4837762"/>
+              <a:ext cx="795209" cy="795209"/>
+              <a:chOff x="789027" y="5072792"/>
+              <a:chExt cx="696178" cy="696178"/>
+            </a:xfrm>
+          </p:grpSpPr>
+          <p:sp>
+            <p:nvSpPr>
+              <p:cNvPr id="82" name="Ellipse 81"/>
+              <p:cNvSpPr/>
+              <p:nvPr/>
+            </p:nvSpPr>
+            <p:spPr>
+              <a:xfrm>
+                <a:off x="789027" y="5072792"/>
+                <a:ext cx="696178" cy="696178"/>
+              </a:xfrm>
+              <a:prstGeom prst="ellipse">
+                <a:avLst/>
+              </a:prstGeom>
+              <a:solidFill>
+                <a:schemeClr val="bg1"/>
+              </a:solidFill>
+            </p:spPr>
+            <p:style>
+              <a:lnRef idx="2">
+                <a:schemeClr val="accent1">
+                  <a:shade val="50000"/>
+                </a:schemeClr>
+              </a:lnRef>
+              <a:fillRef idx="1">
+                <a:schemeClr val="accent1"/>
+              </a:fillRef>
+              <a:effectRef idx="0">
+                <a:schemeClr val="accent1"/>
+              </a:effectRef>
+              <a:fontRef idx="minor">
+                <a:schemeClr val="lt1"/>
+              </a:fontRef>
+            </p:style>
+            <p:txBody>
+              <a:bodyPr rtlCol="0" anchor="ctr"/>
+              <a:lstStyle/>
+              <a:p>
+                <a:pPr algn="ctr"/>
+                <a:endParaRPr lang="en-US" sz="1100" dirty="0">
+                  <a:solidFill>
+                    <a:schemeClr val="tx1"/>
+                  </a:solidFill>
+                </a:endParaRPr>
+              </a:p>
+            </p:txBody>
+          </p:sp>
+          <p:sp>
+            <p:nvSpPr>
+              <p:cNvPr id="83" name="Rectangle 82"/>
+              <p:cNvSpPr/>
+              <p:nvPr/>
+            </p:nvSpPr>
+            <p:spPr>
+              <a:xfrm>
+                <a:off x="789027" y="5098246"/>
+                <a:ext cx="696178" cy="525423"/>
+              </a:xfrm>
+              <a:prstGeom prst="rect">
+                <a:avLst/>
+              </a:prstGeom>
+            </p:spPr>
+            <p:txBody>
+              <a:bodyPr wrap="square">
+                <a:spAutoFit/>
+              </a:bodyPr>
+              <a:lstStyle/>
+              <a:p>
+                <a:pPr algn="ctr"/>
+                <a:r>
+                  <a:rPr lang="en-US" sz="1100" dirty="0" err="1" smtClean="0"/>
+                  <a:t>Scade</a:t>
+                </a:r>
+                <a:endParaRPr lang="en-US" sz="1100" dirty="0" smtClean="0"/>
+              </a:p>
+              <a:p>
+                <a:pPr algn="ctr"/>
+                <a:r>
+                  <a:rPr lang="en-US" sz="1100" dirty="0" smtClean="0"/>
+                  <a:t>Code</a:t>
+                </a:r>
+              </a:p>
+              <a:p>
+                <a:pPr algn="ctr"/>
+                <a:r>
+                  <a:rPr lang="en-US" sz="1100" dirty="0" smtClean="0"/>
+                  <a:t>Gen.</a:t>
+                </a:r>
+                <a:endParaRPr lang="en-US" sz="1100" dirty="0"/>
+              </a:p>
+            </p:txBody>
+          </p:sp>
+        </p:grpSp>
+        <p:sp>
+          <p:nvSpPr>
+            <p:cNvPr id="80" name="Rectangle 79"/>
+            <p:cNvSpPr/>
+            <p:nvPr/>
+          </p:nvSpPr>
+          <p:spPr>
+            <a:xfrm>
+              <a:off x="682008" y="5949282"/>
+              <a:ext cx="939225" cy="504054"/>
+            </a:xfrm>
+            <a:prstGeom prst="rect">
+              <a:avLst/>
+            </a:prstGeom>
+            <a:solidFill>
+              <a:schemeClr val="bg1"/>
+            </a:solidFill>
+          </p:spPr>
+          <p:style>
+            <a:lnRef idx="2">
+              <a:schemeClr val="accent1">
+                <a:shade val="50000"/>
+              </a:schemeClr>
+            </a:lnRef>
+            <a:fillRef idx="1">
+              <a:schemeClr val="accent1"/>
+            </a:fillRef>
+            <a:effectRef idx="0">
+              <a:schemeClr val="accent1"/>
+            </a:effectRef>
+            <a:fontRef idx="minor">
+              <a:schemeClr val="lt1"/>
+            </a:fontRef>
+          </p:style>
+          <p:txBody>
+            <a:bodyPr rtlCol="0" anchor="ctr"/>
+            <a:lstStyle/>
+            <a:p>
+              <a:pPr algn="ctr"/>
+              <a:r>
+                <a:rPr lang="fr-FR" sz="1100" dirty="0" smtClean="0">
+                  <a:solidFill>
+                    <a:schemeClr val="tx1"/>
+                  </a:solidFill>
+                </a:rPr>
+                <a:t>Code no SIL4 C</a:t>
+              </a:r>
+              <a:endParaRPr lang="fr-FR" sz="1100" dirty="0">
+                <a:solidFill>
+                  <a:schemeClr val="tx1"/>
+                </a:solidFill>
+              </a:endParaRPr>
+            </a:p>
+          </p:txBody>
+        </p:sp>
+        <p:sp>
+          <p:nvSpPr>
+            <p:cNvPr id="81" name="Flèche droite 80"/>
+            <p:cNvSpPr/>
+            <p:nvPr/>
+          </p:nvSpPr>
+          <p:spPr>
+            <a:xfrm rot="5400000">
+              <a:off x="987395" y="3606381"/>
+              <a:ext cx="328450" cy="356803"/>
+            </a:xfrm>
+            <a:prstGeom prst="rightArrow">
+              <a:avLst/>
+            </a:prstGeom>
+            <a:solidFill>
+              <a:schemeClr val="tx2">
+                <a:lumMod val="20000"/>
+                <a:lumOff val="80000"/>
+              </a:schemeClr>
+            </a:solidFill>
+            <a:ln>
+              <a:solidFill>
+                <a:schemeClr val="tx2"/>
+              </a:solidFill>
+            </a:ln>
+          </p:spPr>
+          <p:style>
+            <a:lnRef idx="2">
+              <a:schemeClr val="accent1">
+                <a:shade val="50000"/>
+              </a:schemeClr>
+            </a:lnRef>
+            <a:fillRef idx="1">
+              <a:schemeClr val="accent1"/>
+            </a:fillRef>
+            <a:effectRef idx="0">
+              <a:schemeClr val="accent1"/>
+            </a:effectRef>
+            <a:fontRef idx="minor">
+              <a:schemeClr val="lt1"/>
+            </a:fontRef>
+          </p:style>
+          <p:txBody>
+            <a:bodyPr rtlCol="0" anchor="ctr"/>
+            <a:lstStyle/>
+            <a:p>
+              <a:pPr algn="ctr"/>
+              <a:endParaRPr lang="fr-FR" sz="1400"/>
+            </a:p>
+          </p:txBody>
+        </p:sp>
+      </p:grpSp>
+      <p:grpSp>
+        <p:nvGrpSpPr>
+          <p:cNvPr id="20" name="Groupe 19"/>
+          <p:cNvGrpSpPr/>
+          <p:nvPr/>
+        </p:nvGrpSpPr>
+        <p:grpSpPr>
+          <a:xfrm>
+            <a:off x="1619672" y="2852936"/>
+            <a:ext cx="5688632" cy="3994382"/>
+            <a:chOff x="121077" y="3418904"/>
+            <a:chExt cx="6772576" cy="3429000"/>
+          </a:xfrm>
+        </p:grpSpPr>
+        <p:cxnSp>
+          <p:nvCxnSpPr>
+            <p:cNvPr id="13" name="Connecteur droit 12"/>
+            <p:cNvCxnSpPr/>
+            <p:nvPr/>
+          </p:nvCxnSpPr>
+          <p:spPr>
+            <a:xfrm>
+              <a:off x="2378603" y="3418904"/>
+              <a:ext cx="0" cy="3429000"/>
+            </a:xfrm>
+            <a:prstGeom prst="line">
+              <a:avLst/>
+            </a:prstGeom>
+            <a:ln w="28575">
+              <a:solidFill>
+                <a:schemeClr val="tx1"/>
+              </a:solidFill>
+            </a:ln>
+          </p:spPr>
+          <p:style>
+            <a:lnRef idx="1">
+              <a:schemeClr val="accent1"/>
+            </a:lnRef>
+            <a:fillRef idx="0">
+              <a:schemeClr val="accent1"/>
+            </a:fillRef>
+            <a:effectRef idx="0">
+              <a:schemeClr val="accent1"/>
+            </a:effectRef>
+            <a:fontRef idx="minor">
+              <a:schemeClr val="tx1"/>
+            </a:fontRef>
+          </p:style>
+        </p:cxnSp>
+        <p:cxnSp>
+          <p:nvCxnSpPr>
+            <p:cNvPr id="15" name="Connecteur droit 14"/>
+            <p:cNvCxnSpPr/>
+            <p:nvPr/>
+          </p:nvCxnSpPr>
+          <p:spPr>
+            <a:xfrm>
+              <a:off x="4636128" y="3418904"/>
+              <a:ext cx="0" cy="3429000"/>
+            </a:xfrm>
+            <a:prstGeom prst="line">
+              <a:avLst/>
+            </a:prstGeom>
+            <a:ln w="28575">
+              <a:solidFill>
+                <a:schemeClr val="tx1"/>
+              </a:solidFill>
+            </a:ln>
+          </p:spPr>
+          <p:style>
+            <a:lnRef idx="1">
+              <a:schemeClr val="accent1"/>
+            </a:lnRef>
+            <a:fillRef idx="0">
+              <a:schemeClr val="accent1"/>
+            </a:fillRef>
+            <a:effectRef idx="0">
+              <a:schemeClr val="accent1"/>
+            </a:effectRef>
+            <a:fontRef idx="minor">
+              <a:schemeClr val="tx1"/>
+            </a:fontRef>
+          </p:style>
+        </p:cxnSp>
+        <p:cxnSp>
+          <p:nvCxnSpPr>
+            <p:cNvPr id="16" name="Connecteur droit 15"/>
+            <p:cNvCxnSpPr/>
+            <p:nvPr/>
+          </p:nvCxnSpPr>
+          <p:spPr>
+            <a:xfrm>
+              <a:off x="6893653" y="3418904"/>
+              <a:ext cx="0" cy="3429000"/>
+            </a:xfrm>
+            <a:prstGeom prst="line">
+              <a:avLst/>
+            </a:prstGeom>
+            <a:ln w="28575">
+              <a:solidFill>
+                <a:schemeClr val="tx1"/>
+              </a:solidFill>
+            </a:ln>
+          </p:spPr>
+          <p:style>
+            <a:lnRef idx="1">
+              <a:schemeClr val="accent1"/>
+            </a:lnRef>
+            <a:fillRef idx="0">
+              <a:schemeClr val="accent1"/>
+            </a:fillRef>
+            <a:effectRef idx="0">
+              <a:schemeClr val="accent1"/>
+            </a:effectRef>
+            <a:fontRef idx="minor">
+              <a:schemeClr val="tx1"/>
+            </a:fontRef>
+          </p:style>
+        </p:cxnSp>
+        <p:cxnSp>
+          <p:nvCxnSpPr>
+            <p:cNvPr id="60" name="Connecteur droit 59"/>
+            <p:cNvCxnSpPr/>
+            <p:nvPr/>
+          </p:nvCxnSpPr>
+          <p:spPr>
+            <a:xfrm>
+              <a:off x="121077" y="3418904"/>
+              <a:ext cx="0" cy="3429000"/>
+            </a:xfrm>
+            <a:prstGeom prst="line">
+              <a:avLst/>
+            </a:prstGeom>
+            <a:ln w="28575">
+              <a:solidFill>
+                <a:schemeClr val="tx1"/>
+              </a:solidFill>
+            </a:ln>
+          </p:spPr>
+          <p:style>
+            <a:lnRef idx="1">
+              <a:schemeClr val="accent1"/>
+            </a:lnRef>
+            <a:fillRef idx="0">
+              <a:schemeClr val="accent1"/>
+            </a:fillRef>
+            <a:effectRef idx="0">
+              <a:schemeClr val="accent1"/>
+            </a:effectRef>
+            <a:fontRef idx="minor">
+              <a:schemeClr val="tx1"/>
+            </a:fontRef>
+          </p:style>
+        </p:cxnSp>
+      </p:grpSp>
+      <p:sp>
+        <p:nvSpPr>
+          <p:cNvPr id="69" name="Chevron 68"/>
+          <p:cNvSpPr/>
+          <p:nvPr/>
+        </p:nvSpPr>
+        <p:spPr>
+          <a:xfrm rot="10800000">
+            <a:off x="1491328" y="3429000"/>
+            <a:ext cx="416376" cy="409984"/>
+          </a:xfrm>
+          <a:prstGeom prst="chevron">
+            <a:avLst/>
+          </a:prstGeom>
+          <a:solidFill>
+            <a:schemeClr val="bg1"/>
+          </a:solidFill>
+          <a:ln>
+            <a:solidFill>
+              <a:schemeClr val="tx2">
+                <a:lumMod val="40000"/>
+                <a:lumOff val="60000"/>
+              </a:schemeClr>
+            </a:solidFill>
+          </a:ln>
+        </p:spPr>
+        <p:style>
+          <a:lnRef idx="2">
+            <a:schemeClr val="accent1">
+              <a:shade val="50000"/>
+            </a:schemeClr>
+          </a:lnRef>
+          <a:fillRef idx="1">
+            <a:schemeClr val="accent1"/>
+          </a:fillRef>
+          <a:effectRef idx="0">
+            <a:schemeClr val="accent1"/>
+          </a:effectRef>
+          <a:fontRef idx="minor">
+            <a:schemeClr val="lt1"/>
+          </a:fontRef>
+        </p:style>
+        <p:txBody>
+          <a:bodyPr rtlCol="0" anchor="ctr"/>
+          <a:lstStyle/>
+          <a:p>
+            <a:pPr algn="ctr"/>
+            <a:endParaRPr lang="fr-FR" sz="1400">
+              <a:solidFill>
+                <a:schemeClr val="tx1"/>
+              </a:solidFill>
+            </a:endParaRPr>
+          </a:p>
+        </p:txBody>
+      </p:sp>
+      <p:sp>
+        <p:nvSpPr>
+          <p:cNvPr id="71" name="Chevron 70"/>
+          <p:cNvSpPr/>
+          <p:nvPr/>
+        </p:nvSpPr>
+        <p:spPr>
+          <a:xfrm rot="10800000">
+            <a:off x="1419320" y="4243152"/>
+            <a:ext cx="416376" cy="409984"/>
+          </a:xfrm>
+          <a:prstGeom prst="chevron">
+            <a:avLst/>
+          </a:prstGeom>
+          <a:solidFill>
+            <a:schemeClr val="bg1"/>
+          </a:solidFill>
+          <a:ln>
+            <a:solidFill>
+              <a:schemeClr val="tx2">
+                <a:lumMod val="40000"/>
+                <a:lumOff val="60000"/>
+              </a:schemeClr>
+            </a:solidFill>
+          </a:ln>
+        </p:spPr>
+        <p:style>
+          <a:lnRef idx="2">
+            <a:schemeClr val="accent1">
+              <a:shade val="50000"/>
+            </a:schemeClr>
+          </a:lnRef>
+          <a:fillRef idx="1">
+            <a:schemeClr val="accent1"/>
+          </a:fillRef>
+          <a:effectRef idx="0">
+            <a:schemeClr val="accent1"/>
+          </a:effectRef>
+          <a:fontRef idx="minor">
+            <a:schemeClr val="lt1"/>
+          </a:fontRef>
+        </p:style>
+        <p:txBody>
+          <a:bodyPr rtlCol="0" anchor="ctr"/>
+          <a:lstStyle/>
+          <a:p>
+            <a:pPr algn="ctr"/>
+            <a:endParaRPr lang="fr-FR" sz="1400">
+              <a:solidFill>
+                <a:schemeClr val="tx1"/>
+              </a:solidFill>
+            </a:endParaRPr>
+          </a:p>
+        </p:txBody>
+      </p:sp>
+      <p:grpSp>
+        <p:nvGrpSpPr>
+          <p:cNvPr id="73" name="Groupe 72"/>
+          <p:cNvGrpSpPr/>
+          <p:nvPr/>
+        </p:nvGrpSpPr>
+        <p:grpSpPr>
+          <a:xfrm>
+            <a:off x="1187624" y="5107248"/>
+            <a:ext cx="1007893" cy="409984"/>
+            <a:chOff x="1763689" y="4013843"/>
+            <a:chExt cx="1084638" cy="488104"/>
+          </a:xfrm>
+        </p:grpSpPr>
+        <p:sp>
+          <p:nvSpPr>
+            <p:cNvPr id="70" name="Chevron 69"/>
+            <p:cNvSpPr/>
+            <p:nvPr/>
+          </p:nvSpPr>
+          <p:spPr>
+            <a:xfrm rot="10800000">
+              <a:off x="1763689" y="4013843"/>
+              <a:ext cx="1084638" cy="488104"/>
+            </a:xfrm>
+            <a:prstGeom prst="chevron">
+              <a:avLst>
+                <a:gd name="adj" fmla="val 35950"/>
+              </a:avLst>
+            </a:prstGeom>
+            <a:solidFill>
+              <a:schemeClr val="bg1"/>
+            </a:solidFill>
+            <a:ln>
+              <a:solidFill>
+                <a:schemeClr val="tx2">
+                  <a:lumMod val="40000"/>
+                  <a:lumOff val="60000"/>
+                </a:schemeClr>
+              </a:solidFill>
+            </a:ln>
+          </p:spPr>
+          <p:style>
+            <a:lnRef idx="2">
+              <a:schemeClr val="accent1">
+                <a:shade val="50000"/>
+              </a:schemeClr>
+            </a:lnRef>
+            <a:fillRef idx="1">
+              <a:schemeClr val="accent1"/>
+            </a:fillRef>
+            <a:effectRef idx="0">
+              <a:schemeClr val="accent1"/>
+            </a:effectRef>
+            <a:fontRef idx="minor">
+              <a:schemeClr val="lt1"/>
+            </a:fontRef>
+          </p:style>
+          <p:txBody>
+            <a:bodyPr vert="horz" rtlCol="0" anchor="ctr"/>
+            <a:lstStyle/>
+            <a:p>
+              <a:pPr algn="ctr"/>
+              <a:endParaRPr lang="en-US" sz="1100" dirty="0">
+                <a:solidFill>
+                  <a:schemeClr val="tx1"/>
+                </a:solidFill>
+              </a:endParaRPr>
+            </a:p>
+          </p:txBody>
+        </p:sp>
+        <p:sp>
+          <p:nvSpPr>
+            <p:cNvPr id="72" name="ZoneTexte 71"/>
+            <p:cNvSpPr txBox="1"/>
+            <p:nvPr/>
+          </p:nvSpPr>
+          <p:spPr>
+            <a:xfrm>
+              <a:off x="1837465" y="4027063"/>
+              <a:ext cx="895753" cy="430887"/>
+            </a:xfrm>
+            <a:prstGeom prst="rect">
+              <a:avLst/>
+            </a:prstGeom>
+            <a:noFill/>
+          </p:spPr>
+          <p:txBody>
+            <a:bodyPr wrap="none" rtlCol="0">
+              <a:spAutoFit/>
+            </a:bodyPr>
+            <a:lstStyle/>
+            <a:p>
+              <a:pPr algn="ctr"/>
+              <a:r>
+                <a:rPr lang="en-US" sz="1050" dirty="0" smtClean="0"/>
+                <a:t>OSS migration</a:t>
+              </a:r>
+            </a:p>
+            <a:p>
+              <a:pPr algn="ctr"/>
+              <a:r>
+                <a:rPr lang="en-US" sz="1050" dirty="0" smtClean="0"/>
+                <a:t>(long term)</a:t>
+              </a:r>
+              <a:endParaRPr lang="en-US" sz="1050" dirty="0"/>
+            </a:p>
+          </p:txBody>
+        </p:sp>
+      </p:grpSp>
+      <p:sp>
+        <p:nvSpPr>
+          <p:cNvPr id="88" name="Hexagone 87"/>
+          <p:cNvSpPr/>
+          <p:nvPr/>
+        </p:nvSpPr>
+        <p:spPr>
+          <a:xfrm>
+            <a:off x="3203848" y="5949280"/>
+            <a:ext cx="712871" cy="248163"/>
+          </a:xfrm>
+          <a:prstGeom prst="hexagon">
+            <a:avLst/>
+          </a:prstGeom>
+          <a:solidFill>
+            <a:schemeClr val="bg1"/>
+          </a:solidFill>
+          <a:ln>
+            <a:solidFill>
+              <a:schemeClr val="accent3">
+                <a:lumMod val="75000"/>
+              </a:schemeClr>
+            </a:solidFill>
+          </a:ln>
+        </p:spPr>
+        <p:style>
+          <a:lnRef idx="2">
+            <a:schemeClr val="accent1">
+              <a:shade val="50000"/>
+            </a:schemeClr>
+          </a:lnRef>
+          <a:fillRef idx="1">
+            <a:schemeClr val="accent1"/>
+          </a:fillRef>
+          <a:effectRef idx="0">
+            <a:schemeClr val="accent1"/>
+          </a:effectRef>
+          <a:fontRef idx="minor">
+            <a:schemeClr val="lt1"/>
+          </a:fontRef>
+        </p:style>
+        <p:txBody>
+          <a:bodyPr rtlCol="0" anchor="ctr"/>
+          <a:lstStyle/>
+          <a:p>
+            <a:pPr algn="ctr"/>
+            <a:r>
+              <a:rPr lang="fr-FR" sz="1100" dirty="0" smtClean="0">
+                <a:solidFill>
+                  <a:schemeClr val="tx1"/>
+                </a:solidFill>
+              </a:rPr>
+              <a:t>V&amp;V</a:t>
+            </a:r>
+            <a:endParaRPr lang="fr-FR" sz="1100" dirty="0">
+              <a:solidFill>
+                <a:schemeClr val="tx1"/>
+              </a:solidFill>
+            </a:endParaRPr>
+          </a:p>
+        </p:txBody>
+      </p:sp>
+      <p:sp>
+        <p:nvSpPr>
+          <p:cNvPr id="89" name="Hexagone 88"/>
+          <p:cNvSpPr/>
+          <p:nvPr/>
+        </p:nvSpPr>
+        <p:spPr>
+          <a:xfrm>
+            <a:off x="3196247" y="5125053"/>
+            <a:ext cx="712871" cy="248163"/>
+          </a:xfrm>
+          <a:prstGeom prst="hexagon">
+            <a:avLst/>
+          </a:prstGeom>
+          <a:solidFill>
+            <a:schemeClr val="bg1"/>
+          </a:solidFill>
+          <a:ln>
+            <a:solidFill>
+              <a:schemeClr val="accent3">
+                <a:lumMod val="75000"/>
+              </a:schemeClr>
+            </a:solidFill>
+          </a:ln>
+        </p:spPr>
+        <p:style>
+          <a:lnRef idx="2">
+            <a:schemeClr val="accent1">
+              <a:shade val="50000"/>
+            </a:schemeClr>
+          </a:lnRef>
+          <a:fillRef idx="1">
+            <a:schemeClr val="accent1"/>
+          </a:fillRef>
+          <a:effectRef idx="0">
+            <a:schemeClr val="accent1"/>
+          </a:effectRef>
+          <a:fontRef idx="minor">
+            <a:schemeClr val="lt1"/>
+          </a:fontRef>
+        </p:style>
+        <p:txBody>
+          <a:bodyPr rtlCol="0" anchor="ctr"/>
+          <a:lstStyle/>
+          <a:p>
+            <a:pPr algn="ctr"/>
+            <a:r>
+              <a:rPr lang="fr-FR" sz="1100" dirty="0" smtClean="0">
+                <a:solidFill>
+                  <a:schemeClr val="tx1"/>
+                </a:solidFill>
+              </a:rPr>
+              <a:t>V&amp;V</a:t>
+            </a:r>
+            <a:endParaRPr lang="fr-FR" sz="1100" dirty="0">
+              <a:solidFill>
+                <a:schemeClr val="tx1"/>
+              </a:solidFill>
+            </a:endParaRPr>
+          </a:p>
+        </p:txBody>
+      </p:sp>
+      <p:sp>
+        <p:nvSpPr>
+          <p:cNvPr id="90" name="Hexagone 89"/>
+          <p:cNvSpPr/>
+          <p:nvPr/>
+        </p:nvSpPr>
+        <p:spPr>
+          <a:xfrm>
+            <a:off x="3188646" y="4293096"/>
+            <a:ext cx="712871" cy="248163"/>
+          </a:xfrm>
+          <a:prstGeom prst="hexagon">
+            <a:avLst/>
+          </a:prstGeom>
+          <a:solidFill>
+            <a:schemeClr val="bg1"/>
+          </a:solidFill>
+          <a:ln>
+            <a:solidFill>
+              <a:schemeClr val="accent3">
+                <a:lumMod val="75000"/>
+              </a:schemeClr>
+            </a:solidFill>
+          </a:ln>
+        </p:spPr>
+        <p:style>
+          <a:lnRef idx="2">
+            <a:schemeClr val="accent1">
+              <a:shade val="50000"/>
+            </a:schemeClr>
+          </a:lnRef>
+          <a:fillRef idx="1">
+            <a:schemeClr val="accent1"/>
+          </a:fillRef>
+          <a:effectRef idx="0">
+            <a:schemeClr val="accent1"/>
+          </a:effectRef>
+          <a:fontRef idx="minor">
+            <a:schemeClr val="lt1"/>
+          </a:fontRef>
+        </p:style>
+        <p:txBody>
+          <a:bodyPr rtlCol="0" anchor="ctr"/>
+          <a:lstStyle/>
+          <a:p>
+            <a:pPr algn="ctr"/>
+            <a:r>
+              <a:rPr lang="fr-FR" sz="1100" dirty="0" smtClean="0">
+                <a:solidFill>
+                  <a:schemeClr val="tx1"/>
+                </a:solidFill>
+              </a:rPr>
+              <a:t>V&amp;V</a:t>
+            </a:r>
+            <a:endParaRPr lang="fr-FR" sz="1100" dirty="0">
+              <a:solidFill>
+                <a:schemeClr val="tx1"/>
+              </a:solidFill>
+            </a:endParaRPr>
+          </a:p>
+        </p:txBody>
+      </p:sp>
+    </p:spTree>
+    <p:extLst>
+      <p:ext uri="{BB962C8B-B14F-4D97-AF65-F5344CB8AC3E}">
+        <p14:creationId xmlns:p14="http://schemas.microsoft.com/office/powerpoint/2010/main" val="2521178124"/>
       </p:ext>
     </p:extLst>
   </p:cSld>

</xml_diff>